<commit_message>
Modified Design and Kernel slides and added a section for me in Presentation Breakdown.
</commit_message>
<xml_diff>
--- a/Project/Final_Project_Presentation_Fasburg_Reiff_Thomas.pptx
+++ b/Project/Final_Project_Presentation_Fasburg_Reiff_Thomas.pptx
@@ -5,7 +5,7 @@
     <p:sldMasterId id="2147483785" r:id="rId1"/>
   </p:sldMasterIdLst>
   <p:notesMasterIdLst>
-    <p:notesMasterId r:id="rId19"/>
+    <p:notesMasterId r:id="rId20"/>
   </p:notesMasterIdLst>
   <p:sldIdLst>
     <p:sldId id="256" r:id="rId2"/>
@@ -14,17 +14,18 @@
     <p:sldId id="276" r:id="rId5"/>
     <p:sldId id="277" r:id="rId6"/>
     <p:sldId id="278" r:id="rId7"/>
-    <p:sldId id="279" r:id="rId8"/>
+    <p:sldId id="289" r:id="rId8"/>
     <p:sldId id="280" r:id="rId9"/>
-    <p:sldId id="281" r:id="rId10"/>
-    <p:sldId id="282" r:id="rId11"/>
-    <p:sldId id="283" r:id="rId12"/>
-    <p:sldId id="284" r:id="rId13"/>
-    <p:sldId id="285" r:id="rId14"/>
-    <p:sldId id="286" r:id="rId15"/>
-    <p:sldId id="287" r:id="rId16"/>
-    <p:sldId id="274" r:id="rId17"/>
-    <p:sldId id="275" r:id="rId18"/>
+    <p:sldId id="290" r:id="rId10"/>
+    <p:sldId id="291" r:id="rId11"/>
+    <p:sldId id="282" r:id="rId12"/>
+    <p:sldId id="283" r:id="rId13"/>
+    <p:sldId id="284" r:id="rId14"/>
+    <p:sldId id="285" r:id="rId15"/>
+    <p:sldId id="286" r:id="rId16"/>
+    <p:sldId id="287" r:id="rId17"/>
+    <p:sldId id="274" r:id="rId18"/>
+    <p:sldId id="275" r:id="rId19"/>
   </p:sldIdLst>
   <p:sldSz cx="9144000" cy="6858000" type="screen4x3"/>
   <p:notesSz cx="6858000" cy="9144000"/>
@@ -125,7 +126,7 @@
   </p:defaultTextStyle>
   <p:extLst>
     <p:ext uri="{EFAFB233-063F-42B5-8137-9DF3F51BA10A}">
-      <p15:sldGuideLst xmlns:p15="http://schemas.microsoft.com/office/powerpoint/2012/main" xmlns="">
+      <p15:sldGuideLst xmlns:p15="http://schemas.microsoft.com/office/powerpoint/2012/main">
         <p15:guide id="1" orient="horz" pos="2160">
           <p15:clr>
             <a:srgbClr val="A4A3A4"/>
@@ -620,6 +621,102 @@
           <a:bodyPr/>
           <a:lstStyle/>
           <a:p>
+            <a:r>
+              <a:rPr lang="en-US" u="sng" dirty="0" err="1" smtClean="0"/>
+              <a:t>call_usermodehelper</a:t>
+            </a:r>
+            <a:r>
+              <a:rPr lang="en-US" u="sng" dirty="0" smtClean="0"/>
+              <a:t> function</a:t>
+            </a:r>
+          </a:p>
+          <a:p>
+            <a:pPr marL="171450" indent="-171450">
+              <a:buFont typeface="Arial" panose="020B0604020202020204" pitchFamily="34" charset="0"/>
+              <a:buChar char="•"/>
+            </a:pPr>
+            <a:r>
+              <a:rPr lang="en-US" u="none" baseline="0" dirty="0" smtClean="0"/>
+              <a:t>Purpose: allows a user space application to be invoked from the kernel (prepares the process handle and executes the call)</a:t>
+            </a:r>
+          </a:p>
+          <a:p>
+            <a:pPr marL="171450" indent="-171450">
+              <a:buFont typeface="Arial" panose="020B0604020202020204" pitchFamily="34" charset="0"/>
+              <a:buChar char="•"/>
+            </a:pPr>
+            <a:r>
+              <a:rPr lang="en-US" u="none" baseline="0" dirty="0" smtClean="0"/>
+              <a:t>Inputs:</a:t>
+            </a:r>
+          </a:p>
+          <a:p>
+            <a:pPr marL="628650" lvl="1" indent="-171450">
+              <a:buFont typeface="Arial" panose="020B0604020202020204" pitchFamily="34" charset="0"/>
+              <a:buChar char="•"/>
+            </a:pPr>
+            <a:r>
+              <a:rPr lang="en-US" u="none" baseline="0" dirty="0" smtClean="0"/>
+              <a:t>The path to be the program to be executed</a:t>
+            </a:r>
+          </a:p>
+          <a:p>
+            <a:pPr marL="628650" lvl="1" indent="-171450">
+              <a:buFont typeface="Arial" panose="020B0604020202020204" pitchFamily="34" charset="0"/>
+              <a:buChar char="•"/>
+            </a:pPr>
+            <a:r>
+              <a:rPr lang="en-US" u="none" baseline="0" dirty="0" smtClean="0"/>
+              <a:t>The null terminated list of program arguments, including the name of the program at the zeroth index</a:t>
+            </a:r>
+          </a:p>
+          <a:p>
+            <a:pPr marL="628650" lvl="1" indent="-171450">
+              <a:buFont typeface="Arial" panose="020B0604020202020204" pitchFamily="34" charset="0"/>
+              <a:buChar char="•"/>
+            </a:pPr>
+            <a:r>
+              <a:rPr lang="en-US" u="none" baseline="0" dirty="0" smtClean="0"/>
+              <a:t>The null terminated list containing environment information</a:t>
+            </a:r>
+          </a:p>
+          <a:p>
+            <a:pPr marL="628650" lvl="1" indent="-171450">
+              <a:buFont typeface="Arial" panose="020B0604020202020204" pitchFamily="34" charset="0"/>
+              <a:buChar char="•"/>
+            </a:pPr>
+            <a:r>
+              <a:rPr lang="en-US" u="none" baseline="0" dirty="0" smtClean="0"/>
+              <a:t>UMH_WAIT_EXEC to wait for the user space application to be invoked before continuing,</a:t>
+            </a:r>
+            <a:br>
+              <a:rPr lang="en-US" u="none" baseline="0" dirty="0" smtClean="0"/>
+            </a:br>
+            <a:r>
+              <a:rPr lang="en-US" u="none" baseline="0" dirty="0" smtClean="0"/>
+              <a:t>UMH_WAIT_PROC to wait for the entire process (including the application running in user space) to complete,</a:t>
+            </a:r>
+            <a:br>
+              <a:rPr lang="en-US" u="none" baseline="0" dirty="0" smtClean="0"/>
+            </a:br>
+            <a:r>
+              <a:rPr lang="en-US" u="none" baseline="0" dirty="0" smtClean="0"/>
+              <a:t>UMH_NO_WAIT to include no wait time</a:t>
+            </a:r>
+            <a:r>
+              <a:rPr lang="en-US" baseline="0" dirty="0" smtClean="0"/>
+              <a:t/>
+            </a:r>
+            <a:br>
+              <a:rPr lang="en-US" baseline="0" dirty="0" smtClean="0"/>
+            </a:br>
+            <a:endParaRPr lang="en-US" baseline="0" dirty="0" smtClean="0"/>
+          </a:p>
+          <a:p>
+            <a:pPr marL="171450" indent="-171450">
+              <a:buFont typeface="Arial" panose="020B0604020202020204" pitchFamily="34" charset="0"/>
+              <a:buChar char="•"/>
+            </a:pPr>
             <a:endParaRPr lang="en-US" dirty="0"/>
           </a:p>
         </p:txBody>
@@ -640,17 +737,26 @@
           <a:lstStyle/>
           <a:p>
             <a:fld id="{B8B3BC3C-0900-4ACD-9030-5BE6C2442A68}" type="slidenum">
-              <a:rPr lang="en-US" smtClean="0"/>
+              <a:rPr lang="en-US" smtClean="0">
+                <a:solidFill>
+                  <a:prstClr val="black"/>
+                </a:solidFill>
+              </a:rPr>
+              <a:pPr/>
               <a:t>10</a:t>
             </a:fld>
-            <a:endParaRPr lang="en-US" dirty="0"/>
+            <a:endParaRPr lang="en-US" dirty="0">
+              <a:solidFill>
+                <a:prstClr val="black"/>
+              </a:solidFill>
+            </a:endParaRPr>
           </a:p>
         </p:txBody>
       </p:sp>
     </p:spTree>
     <p:extLst>
       <p:ext uri="{BB962C8B-B14F-4D97-AF65-F5344CB8AC3E}">
-        <p14:creationId xmlns:p14="http://schemas.microsoft.com/office/powerpoint/2010/main" val="3352367101"/>
+        <p14:creationId xmlns:p14="http://schemas.microsoft.com/office/powerpoint/2010/main" val="1992650313"/>
       </p:ext>
     </p:extLst>
   </p:cSld>
@@ -1080,6 +1186,90 @@
 </p:notes>
 </file>
 
+<file path=ppt/notesSlides/notesSlide16.xml><?xml version="1.0" encoding="utf-8"?>
+<p:notes xmlns:a="http://schemas.openxmlformats.org/drawingml/2006/main" xmlns:r="http://schemas.openxmlformats.org/officeDocument/2006/relationships" xmlns:p="http://schemas.openxmlformats.org/presentationml/2006/main">
+  <p:cSld>
+    <p:spTree>
+      <p:nvGrpSpPr>
+        <p:cNvPr id="1" name=""/>
+        <p:cNvGrpSpPr/>
+        <p:nvPr/>
+      </p:nvGrpSpPr>
+      <p:grpSpPr>
+        <a:xfrm>
+          <a:off x="0" y="0"/>
+          <a:ext cx="0" cy="0"/>
+          <a:chOff x="0" y="0"/>
+          <a:chExt cx="0" cy="0"/>
+        </a:xfrm>
+      </p:grpSpPr>
+      <p:sp>
+        <p:nvSpPr>
+          <p:cNvPr id="2" name="Slide Image Placeholder 1"/>
+          <p:cNvSpPr>
+            <a:spLocks noGrp="1" noRot="1" noChangeAspect="1"/>
+          </p:cNvSpPr>
+          <p:nvPr>
+            <p:ph type="sldImg"/>
+          </p:nvPr>
+        </p:nvSpPr>
+        <p:spPr/>
+      </p:sp>
+      <p:sp>
+        <p:nvSpPr>
+          <p:cNvPr id="3" name="Notes Placeholder 2"/>
+          <p:cNvSpPr>
+            <a:spLocks noGrp="1"/>
+          </p:cNvSpPr>
+          <p:nvPr>
+            <p:ph type="body" idx="1"/>
+          </p:nvPr>
+        </p:nvSpPr>
+        <p:spPr/>
+        <p:txBody>
+          <a:bodyPr/>
+          <a:lstStyle/>
+          <a:p>
+            <a:endParaRPr lang="en-US" dirty="0"/>
+          </a:p>
+        </p:txBody>
+      </p:sp>
+      <p:sp>
+        <p:nvSpPr>
+          <p:cNvPr id="4" name="Slide Number Placeholder 3"/>
+          <p:cNvSpPr>
+            <a:spLocks noGrp="1"/>
+          </p:cNvSpPr>
+          <p:nvPr>
+            <p:ph type="sldNum" sz="quarter" idx="10"/>
+          </p:nvPr>
+        </p:nvSpPr>
+        <p:spPr/>
+        <p:txBody>
+          <a:bodyPr/>
+          <a:lstStyle/>
+          <a:p>
+            <a:fld id="{B8B3BC3C-0900-4ACD-9030-5BE6C2442A68}" type="slidenum">
+              <a:rPr lang="en-US" smtClean="0"/>
+              <a:t>16</a:t>
+            </a:fld>
+            <a:endParaRPr lang="en-US" dirty="0"/>
+          </a:p>
+        </p:txBody>
+      </p:sp>
+    </p:spTree>
+    <p:extLst>
+      <p:ext uri="{BB962C8B-B14F-4D97-AF65-F5344CB8AC3E}">
+        <p14:creationId xmlns:p14="http://schemas.microsoft.com/office/powerpoint/2010/main" val="3352367101"/>
+      </p:ext>
+    </p:extLst>
+  </p:cSld>
+  <p:clrMapOvr>
+    <a:masterClrMapping/>
+  </p:clrMapOvr>
+</p:notes>
+</file>
+
 <file path=ppt/notesSlides/notesSlide2.xml><?xml version="1.0" encoding="utf-8"?>
 <p:notes xmlns:a="http://schemas.openxmlformats.org/drawingml/2006/main" xmlns:r="http://schemas.openxmlformats.org/officeDocument/2006/relationships" xmlns:p="http://schemas.openxmlformats.org/presentationml/2006/main">
   <p:cSld>
@@ -1544,6 +1734,103 @@
           <a:bodyPr/>
           <a:lstStyle/>
           <a:p>
+            <a:r>
+              <a:rPr lang="en-US" u="sng" dirty="0" smtClean="0"/>
+              <a:t>Diagram Note</a:t>
+            </a:r>
+            <a:r>
+              <a:rPr lang="en-US" dirty="0" smtClean="0"/>
+              <a:t>:</a:t>
+            </a:r>
+            <a:r>
+              <a:rPr lang="en-US" baseline="0" dirty="0" smtClean="0"/>
+              <a:t> each color represents a different process</a:t>
+            </a:r>
+          </a:p>
+          <a:p>
+            <a:endParaRPr lang="en-US" baseline="0" dirty="0" smtClean="0"/>
+          </a:p>
+          <a:p>
+            <a:r>
+              <a:rPr lang="en-US" u="sng" baseline="0" dirty="0" smtClean="0"/>
+              <a:t>Design Notes</a:t>
+            </a:r>
+            <a:r>
+              <a:rPr lang="en-US" baseline="0" dirty="0" smtClean="0"/>
+              <a:t>:</a:t>
+            </a:r>
+          </a:p>
+          <a:p>
+            <a:pPr marL="171450" indent="-171450">
+              <a:buFont typeface="Arial" panose="020B0604020202020204" pitchFamily="34" charset="0"/>
+              <a:buChar char="•"/>
+            </a:pPr>
+            <a:r>
+              <a:rPr lang="en-US" baseline="0" dirty="0" smtClean="0"/>
+              <a:t>The system will not block on script execution due to the creation of a separate thread to run the shell commands</a:t>
+            </a:r>
+          </a:p>
+          <a:p>
+            <a:pPr marL="171450" indent="-171450">
+              <a:buFont typeface="Arial" panose="020B0604020202020204" pitchFamily="34" charset="0"/>
+              <a:buChar char="•"/>
+            </a:pPr>
+            <a:r>
+              <a:rPr lang="en-US" baseline="0" dirty="0" smtClean="0"/>
+              <a:t>Restriction of keyboard and mouse functionality:</a:t>
+            </a:r>
+          </a:p>
+          <a:p>
+            <a:pPr marL="628650" lvl="1" indent="-171450">
+              <a:buFont typeface="Arial" panose="020B0604020202020204" pitchFamily="34" charset="0"/>
+              <a:buChar char="•"/>
+            </a:pPr>
+            <a:r>
+              <a:rPr lang="en-US" baseline="0" dirty="0" smtClean="0"/>
+              <a:t>All mouse buttons are disabled</a:t>
+            </a:r>
+          </a:p>
+          <a:p>
+            <a:pPr marL="628650" lvl="1" indent="-171450">
+              <a:buFont typeface="Arial" panose="020B0604020202020204" pitchFamily="34" charset="0"/>
+              <a:buChar char="•"/>
+            </a:pPr>
+            <a:r>
+              <a:rPr lang="en-US" baseline="0" dirty="0" smtClean="0"/>
+              <a:t>Only alphanumeric keys, the shift key, and the enter key allowed on the keyboard</a:t>
+            </a:r>
+          </a:p>
+          <a:p>
+            <a:pPr marL="171450" lvl="0" indent="-171450">
+              <a:buFont typeface="Arial" panose="020B0604020202020204" pitchFamily="34" charset="0"/>
+              <a:buChar char="•"/>
+            </a:pPr>
+            <a:r>
+              <a:rPr lang="en-US" baseline="0" dirty="0" smtClean="0"/>
+              <a:t>CAPTCHA GUI </a:t>
+            </a:r>
+          </a:p>
+          <a:p>
+            <a:pPr marL="628650" lvl="1" indent="-171450">
+              <a:buFont typeface="Arial" panose="020B0604020202020204" pitchFamily="34" charset="0"/>
+              <a:buChar char="•"/>
+            </a:pPr>
+            <a:r>
+              <a:rPr lang="en-US" baseline="0" dirty="0" smtClean="0"/>
+              <a:t>Causes the shell script process to block</a:t>
+            </a:r>
+          </a:p>
+          <a:p>
+            <a:pPr marL="628650" lvl="1" indent="-171450">
+              <a:buFont typeface="Arial" panose="020B0604020202020204" pitchFamily="34" charset="0"/>
+              <a:buChar char="•"/>
+            </a:pPr>
+            <a:r>
+              <a:rPr lang="en-US" baseline="0" dirty="0" smtClean="0"/>
+              <a:t>Holds application focus and stays “on top” of other applications on screen</a:t>
+            </a:r>
+          </a:p>
+          <a:p>
             <a:endParaRPr lang="en-US" dirty="0"/>
           </a:p>
         </p:txBody>
@@ -1564,17 +1851,26 @@
           <a:lstStyle/>
           <a:p>
             <a:fld id="{B8B3BC3C-0900-4ACD-9030-5BE6C2442A68}" type="slidenum">
-              <a:rPr lang="en-US" smtClean="0"/>
+              <a:rPr lang="en-US" smtClean="0">
+                <a:solidFill>
+                  <a:prstClr val="black"/>
+                </a:solidFill>
+              </a:rPr>
+              <a:pPr/>
               <a:t>7</a:t>
             </a:fld>
-            <a:endParaRPr lang="en-US" dirty="0"/>
+            <a:endParaRPr lang="en-US" dirty="0">
+              <a:solidFill>
+                <a:prstClr val="black"/>
+              </a:solidFill>
+            </a:endParaRPr>
           </a:p>
         </p:txBody>
       </p:sp>
     </p:spTree>
     <p:extLst>
       <p:ext uri="{BB962C8B-B14F-4D97-AF65-F5344CB8AC3E}">
-        <p14:creationId xmlns:p14="http://schemas.microsoft.com/office/powerpoint/2010/main" val="3352367101"/>
+        <p14:creationId xmlns:p14="http://schemas.microsoft.com/office/powerpoint/2010/main" val="1508092456"/>
       </p:ext>
     </p:extLst>
   </p:cSld>
@@ -1712,6 +2008,68 @@
           <a:bodyPr/>
           <a:lstStyle/>
           <a:p>
+            <a:r>
+              <a:rPr lang="en-US" dirty="0" smtClean="0"/>
+              <a:t>Red Boxes = new</a:t>
+            </a:r>
+            <a:r>
+              <a:rPr lang="en-US" baseline="0" dirty="0" smtClean="0"/>
+              <a:t> additions</a:t>
+            </a:r>
+            <a:endParaRPr lang="en-US" dirty="0" smtClean="0"/>
+          </a:p>
+          <a:p>
+            <a:endParaRPr lang="en-US" dirty="0" smtClean="0"/>
+          </a:p>
+          <a:p>
+            <a:r>
+              <a:rPr lang="en-US" dirty="0" smtClean="0"/>
+              <a:t>Makefile</a:t>
+            </a:r>
+            <a:r>
+              <a:rPr lang="en-US" baseline="0" dirty="0" smtClean="0"/>
+              <a:t> target explanation:</a:t>
+            </a:r>
+          </a:p>
+          <a:p>
+            <a:pPr marL="171450" indent="-171450">
+              <a:buFont typeface="Arial" panose="020B0604020202020204" pitchFamily="34" charset="0"/>
+              <a:buChar char="•"/>
+            </a:pPr>
+            <a:r>
+              <a:rPr lang="en-US" baseline="0" dirty="0" smtClean="0"/>
+              <a:t>KVERSION: the current kernel release</a:t>
+            </a:r>
+          </a:p>
+          <a:p>
+            <a:pPr marL="171450" indent="-171450">
+              <a:buFont typeface="Arial" panose="020B0604020202020204" pitchFamily="34" charset="0"/>
+              <a:buChar char="•"/>
+            </a:pPr>
+            <a:r>
+              <a:rPr lang="en-US" baseline="0" dirty="0" smtClean="0"/>
+              <a:t>“-c”: the path to the kernel source</a:t>
+            </a:r>
+          </a:p>
+          <a:p>
+            <a:pPr marL="171450" indent="-171450">
+              <a:buFont typeface="Arial" panose="020B0604020202020204" pitchFamily="34" charset="0"/>
+              <a:buChar char="•"/>
+            </a:pPr>
+            <a:r>
+              <a:rPr lang="en-US" baseline="0" dirty="0" smtClean="0"/>
+              <a:t>“M=&lt;directory&gt;”: provides the absolute path to the external module being built </a:t>
+            </a:r>
+            <a:br>
+              <a:rPr lang="en-US" baseline="0" dirty="0" smtClean="0"/>
+            </a:br>
+            <a:endParaRPr lang="en-US" baseline="0" dirty="0" smtClean="0"/>
+          </a:p>
+          <a:p>
+            <a:pPr marL="171450" indent="-171450">
+              <a:buFont typeface="Arial" panose="020B0604020202020204" pitchFamily="34" charset="0"/>
+              <a:buChar char="•"/>
+            </a:pPr>
             <a:endParaRPr lang="en-US" dirty="0"/>
           </a:p>
         </p:txBody>
@@ -1732,17 +2090,26 @@
           <a:lstStyle/>
           <a:p>
             <a:fld id="{B8B3BC3C-0900-4ACD-9030-5BE6C2442A68}" type="slidenum">
-              <a:rPr lang="en-US" smtClean="0"/>
+              <a:rPr lang="en-US" smtClean="0">
+                <a:solidFill>
+                  <a:prstClr val="black"/>
+                </a:solidFill>
+              </a:rPr>
+              <a:pPr/>
               <a:t>9</a:t>
             </a:fld>
-            <a:endParaRPr lang="en-US" dirty="0"/>
+            <a:endParaRPr lang="en-US" dirty="0">
+              <a:solidFill>
+                <a:prstClr val="black"/>
+              </a:solidFill>
+            </a:endParaRPr>
           </a:p>
         </p:txBody>
       </p:sp>
     </p:spTree>
     <p:extLst>
       <p:ext uri="{BB962C8B-B14F-4D97-AF65-F5344CB8AC3E}">
-        <p14:creationId xmlns:p14="http://schemas.microsoft.com/office/powerpoint/2010/main" val="3352367101"/>
+        <p14:creationId xmlns:p14="http://schemas.microsoft.com/office/powerpoint/2010/main" val="1236960777"/>
       </p:ext>
     </p:extLst>
   </p:cSld>
@@ -6280,11 +6647,7 @@
           <a:p>
             <a:r>
               <a:rPr lang="en-US" dirty="0" smtClean="0"/>
-              <a:t>CAPTCHA-Enabled HID Driver for Prevention of USB Keyboard and Mouse </a:t>
-            </a:r>
-            <a:r>
-              <a:rPr lang="en-US" dirty="0" smtClean="0"/>
-              <a:t>Emulation</a:t>
+              <a:t>CAPTCHA-Enabled HID Driver for Prevention of USB Keyboard and Mouse Emulation</a:t>
             </a:r>
             <a:endParaRPr lang="en-US" dirty="0"/>
           </a:p>
@@ -6314,11 +6677,7 @@
           <a:p>
             <a:r>
               <a:rPr lang="en-US" dirty="0" smtClean="0"/>
-              <a:t>Vince </a:t>
-            </a:r>
-            <a:r>
-              <a:rPr lang="en-US" dirty="0" smtClean="0"/>
-              <a:t>Fasburg, Bonnie Reiff, and Josh Thomas</a:t>
+              <a:t>Vince Fasburg, Bonnie Reiff, and Josh Thomas</a:t>
             </a:r>
             <a:endParaRPr lang="en-US" dirty="0"/>
           </a:p>
@@ -6363,6 +6722,315 @@
       </p:grpSpPr>
       <p:sp>
         <p:nvSpPr>
+          <p:cNvPr id="2" name="Title 1"/>
+          <p:cNvSpPr>
+            <a:spLocks noGrp="1"/>
+          </p:cNvSpPr>
+          <p:nvPr>
+            <p:ph type="title"/>
+          </p:nvPr>
+        </p:nvSpPr>
+        <p:spPr/>
+        <p:txBody>
+          <a:bodyPr/>
+          <a:lstStyle/>
+          <a:p>
+            <a:r>
+              <a:rPr lang="en-US" dirty="0" smtClean="0"/>
+              <a:t>K</a:t>
+            </a:r>
+            <a:r>
+              <a:rPr lang="en-US" dirty="0" smtClean="0"/>
+              <a:t>ernel: Driver Modification</a:t>
+            </a:r>
+            <a:endParaRPr lang="en-US" dirty="0"/>
+          </a:p>
+        </p:txBody>
+      </p:sp>
+      <p:pic>
+        <p:nvPicPr>
+          <p:cNvPr id="6" name="Picture 5"/>
+          <p:cNvPicPr>
+            <a:picLocks noChangeAspect="1"/>
+          </p:cNvPicPr>
+          <p:nvPr/>
+        </p:nvPicPr>
+        <p:blipFill>
+          <a:blip r:embed="rId3"/>
+          <a:stretch>
+            <a:fillRect/>
+          </a:stretch>
+        </p:blipFill>
+        <p:spPr>
+          <a:xfrm>
+            <a:off x="762000" y="2209800"/>
+            <a:ext cx="8039100" cy="2619375"/>
+          </a:xfrm>
+          <a:prstGeom prst="rect">
+            <a:avLst/>
+          </a:prstGeom>
+        </p:spPr>
+      </p:pic>
+      <p:cxnSp>
+        <p:nvCxnSpPr>
+          <p:cNvPr id="9" name="Elbow Connector 8"/>
+          <p:cNvCxnSpPr>
+            <a:stCxn id="22" idx="1"/>
+          </p:cNvCxnSpPr>
+          <p:nvPr/>
+        </p:nvCxnSpPr>
+        <p:spPr>
+          <a:xfrm rot="10800000" flipV="1">
+            <a:off x="1447800" y="1754832"/>
+            <a:ext cx="1447800" cy="378767"/>
+          </a:xfrm>
+          <a:prstGeom prst="bentConnector3">
+            <a:avLst>
+              <a:gd name="adj1" fmla="val 100222"/>
+            </a:avLst>
+          </a:prstGeom>
+          <a:ln>
+            <a:tailEnd type="triangle"/>
+          </a:ln>
+        </p:spPr>
+        <p:style>
+          <a:lnRef idx="1">
+            <a:schemeClr val="accent1"/>
+          </a:lnRef>
+          <a:fillRef idx="0">
+            <a:schemeClr val="accent1"/>
+          </a:fillRef>
+          <a:effectRef idx="0">
+            <a:schemeClr val="accent1"/>
+          </a:effectRef>
+          <a:fontRef idx="minor">
+            <a:schemeClr val="tx1"/>
+          </a:fontRef>
+        </p:style>
+      </p:cxnSp>
+      <p:sp>
+        <p:nvSpPr>
+          <p:cNvPr id="22" name="TextBox 21"/>
+          <p:cNvSpPr txBox="1"/>
+          <p:nvPr/>
+        </p:nvSpPr>
+        <p:spPr>
+          <a:xfrm>
+            <a:off x="2895600" y="1524000"/>
+            <a:ext cx="2819400" cy="461665"/>
+          </a:xfrm>
+          <a:prstGeom prst="rect">
+            <a:avLst/>
+          </a:prstGeom>
+          <a:noFill/>
+        </p:spPr>
+        <p:txBody>
+          <a:bodyPr wrap="square" rtlCol="0">
+            <a:spAutoFit/>
+          </a:bodyPr>
+          <a:lstStyle/>
+          <a:p>
+            <a:r>
+              <a:rPr lang="en-US" sz="1200" dirty="0" smtClean="0">
+                <a:solidFill>
+                  <a:prstClr val="black"/>
+                </a:solidFill>
+              </a:rPr>
+              <a:t>Generic function for all USB-HID devices found in hid-core.c</a:t>
+            </a:r>
+            <a:endParaRPr lang="en-US" sz="1200" dirty="0">
+              <a:solidFill>
+                <a:prstClr val="black"/>
+              </a:solidFill>
+            </a:endParaRPr>
+          </a:p>
+        </p:txBody>
+      </p:sp>
+      <p:cxnSp>
+        <p:nvCxnSpPr>
+          <p:cNvPr id="26" name="Elbow Connector 25"/>
+          <p:cNvCxnSpPr/>
+          <p:nvPr/>
+        </p:nvCxnSpPr>
+        <p:spPr>
+          <a:xfrm rot="10800000">
+            <a:off x="7086600" y="4419601"/>
+            <a:ext cx="1143000" cy="987037"/>
+          </a:xfrm>
+          <a:prstGeom prst="bentConnector3">
+            <a:avLst>
+              <a:gd name="adj1" fmla="val -556"/>
+            </a:avLst>
+          </a:prstGeom>
+          <a:ln>
+            <a:tailEnd type="triangle"/>
+          </a:ln>
+        </p:spPr>
+        <p:style>
+          <a:lnRef idx="1">
+            <a:schemeClr val="accent1"/>
+          </a:lnRef>
+          <a:fillRef idx="0">
+            <a:schemeClr val="accent1"/>
+          </a:fillRef>
+          <a:effectRef idx="0">
+            <a:schemeClr val="accent1"/>
+          </a:effectRef>
+          <a:fontRef idx="minor">
+            <a:schemeClr val="tx1"/>
+          </a:fontRef>
+        </p:style>
+      </p:cxnSp>
+      <p:sp>
+        <p:nvSpPr>
+          <p:cNvPr id="34" name="TextBox 33"/>
+          <p:cNvSpPr txBox="1"/>
+          <p:nvPr/>
+        </p:nvSpPr>
+        <p:spPr>
+          <a:xfrm>
+            <a:off x="5981700" y="5406637"/>
+            <a:ext cx="2819400" cy="276999"/>
+          </a:xfrm>
+          <a:prstGeom prst="rect">
+            <a:avLst/>
+          </a:prstGeom>
+          <a:noFill/>
+        </p:spPr>
+        <p:txBody>
+          <a:bodyPr wrap="square" rtlCol="0">
+            <a:spAutoFit/>
+          </a:bodyPr>
+          <a:lstStyle/>
+          <a:p>
+            <a:r>
+              <a:rPr lang="en-US" sz="1200" dirty="0" smtClean="0">
+                <a:solidFill>
+                  <a:prstClr val="black"/>
+                </a:solidFill>
+              </a:rPr>
+              <a:t>Calls the system logger function</a:t>
+            </a:r>
+            <a:endParaRPr lang="en-US" sz="1200" dirty="0">
+              <a:solidFill>
+                <a:prstClr val="black"/>
+              </a:solidFill>
+            </a:endParaRPr>
+          </a:p>
+        </p:txBody>
+      </p:sp>
+      <p:cxnSp>
+        <p:nvCxnSpPr>
+          <p:cNvPr id="36" name="Elbow Connector 35"/>
+          <p:cNvCxnSpPr/>
+          <p:nvPr/>
+        </p:nvCxnSpPr>
+        <p:spPr>
+          <a:xfrm rot="5400000" flipH="1" flipV="1">
+            <a:off x="528229" y="4805769"/>
+            <a:ext cx="696140" cy="380998"/>
+          </a:xfrm>
+          <a:prstGeom prst="bentConnector3">
+            <a:avLst>
+              <a:gd name="adj1" fmla="val 100642"/>
+            </a:avLst>
+          </a:prstGeom>
+          <a:ln>
+            <a:tailEnd type="triangle"/>
+          </a:ln>
+        </p:spPr>
+        <p:style>
+          <a:lnRef idx="1">
+            <a:schemeClr val="accent1"/>
+          </a:lnRef>
+          <a:fillRef idx="0">
+            <a:schemeClr val="accent1"/>
+          </a:fillRef>
+          <a:effectRef idx="0">
+            <a:schemeClr val="accent1"/>
+          </a:effectRef>
+          <a:fontRef idx="minor">
+            <a:schemeClr val="tx1"/>
+          </a:fontRef>
+        </p:style>
+      </p:cxnSp>
+      <p:sp>
+        <p:nvSpPr>
+          <p:cNvPr id="43" name="TextBox 42"/>
+          <p:cNvSpPr txBox="1"/>
+          <p:nvPr/>
+        </p:nvSpPr>
+        <p:spPr>
+          <a:xfrm>
+            <a:off x="434248" y="5344338"/>
+            <a:ext cx="2819400" cy="461665"/>
+          </a:xfrm>
+          <a:prstGeom prst="rect">
+            <a:avLst/>
+          </a:prstGeom>
+          <a:noFill/>
+        </p:spPr>
+        <p:txBody>
+          <a:bodyPr wrap="square" rtlCol="0">
+            <a:spAutoFit/>
+          </a:bodyPr>
+          <a:lstStyle/>
+          <a:p>
+            <a:r>
+              <a:rPr lang="en-US" sz="1200" dirty="0" smtClean="0">
+                <a:solidFill>
+                  <a:prstClr val="black"/>
+                </a:solidFill>
+              </a:rPr>
+              <a:t>Calls the Bash program to execute the shell script</a:t>
+            </a:r>
+            <a:endParaRPr lang="en-US" sz="1200" dirty="0">
+              <a:solidFill>
+                <a:prstClr val="black"/>
+              </a:solidFill>
+            </a:endParaRPr>
+          </a:p>
+        </p:txBody>
+      </p:sp>
+    </p:spTree>
+    <p:extLst>
+      <p:ext uri="{BB962C8B-B14F-4D97-AF65-F5344CB8AC3E}">
+        <p14:creationId xmlns:p14="http://schemas.microsoft.com/office/powerpoint/2010/main" val="3560886"/>
+      </p:ext>
+    </p:extLst>
+  </p:cSld>
+  <p:clrMapOvr>
+    <a:masterClrMapping/>
+  </p:clrMapOvr>
+  <p:timing>
+    <p:tnLst>
+      <p:par>
+        <p:cTn id="1" dur="indefinite" restart="never" nodeType="tmRoot"/>
+      </p:par>
+    </p:tnLst>
+  </p:timing>
+</p:sld>
+</file>
+
+<file path=ppt/slides/slide11.xml><?xml version="1.0" encoding="utf-8"?>
+<p:sld xmlns:a="http://schemas.openxmlformats.org/drawingml/2006/main" xmlns:r="http://schemas.openxmlformats.org/officeDocument/2006/relationships" xmlns:p="http://schemas.openxmlformats.org/presentationml/2006/main">
+  <p:cSld>
+    <p:spTree>
+      <p:nvGrpSpPr>
+        <p:cNvPr id="1" name=""/>
+        <p:cNvGrpSpPr/>
+        <p:nvPr/>
+      </p:nvGrpSpPr>
+      <p:grpSpPr>
+        <a:xfrm>
+          <a:off x="0" y="0"/>
+          <a:ext cx="0" cy="0"/>
+          <a:chOff x="0" y="0"/>
+          <a:chExt cx="0" cy="0"/>
+        </a:xfrm>
+      </p:grpSpPr>
+      <p:sp>
+        <p:nvSpPr>
           <p:cNvPr id="3" name="Content Placeholder 2"/>
           <p:cNvSpPr>
             <a:spLocks noGrp="1"/>
@@ -6430,7 +7098,7 @@
 </p:sld>
 </file>
 
-<file path=ppt/slides/slide11.xml><?xml version="1.0" encoding="utf-8"?>
+<file path=ppt/slides/slide12.xml><?xml version="1.0" encoding="utf-8"?>
 <p:sld xmlns:a="http://schemas.openxmlformats.org/drawingml/2006/main" xmlns:r="http://schemas.openxmlformats.org/officeDocument/2006/relationships" xmlns:p="http://schemas.openxmlformats.org/presentationml/2006/main">
   <p:cSld>
     <p:spTree>
@@ -6561,92 +7229,6 @@
 </p:sld>
 </file>
 
-<file path=ppt/slides/slide12.xml><?xml version="1.0" encoding="utf-8"?>
-<p:sld xmlns:a="http://schemas.openxmlformats.org/drawingml/2006/main" xmlns:r="http://schemas.openxmlformats.org/officeDocument/2006/relationships" xmlns:p="http://schemas.openxmlformats.org/presentationml/2006/main">
-  <p:cSld>
-    <p:spTree>
-      <p:nvGrpSpPr>
-        <p:cNvPr id="1" name=""/>
-        <p:cNvGrpSpPr/>
-        <p:nvPr/>
-      </p:nvGrpSpPr>
-      <p:grpSpPr>
-        <a:xfrm>
-          <a:off x="0" y="0"/>
-          <a:ext cx="0" cy="0"/>
-          <a:chOff x="0" y="0"/>
-          <a:chExt cx="0" cy="0"/>
-        </a:xfrm>
-      </p:grpSpPr>
-      <p:sp>
-        <p:nvSpPr>
-          <p:cNvPr id="3" name="Content Placeholder 2"/>
-          <p:cNvSpPr>
-            <a:spLocks noGrp="1"/>
-          </p:cNvSpPr>
-          <p:nvPr>
-            <p:ph idx="1"/>
-          </p:nvPr>
-        </p:nvSpPr>
-        <p:spPr>
-          <a:xfrm>
-            <a:off x="685800" y="1600200"/>
-            <a:ext cx="7772400" cy="4190999"/>
-          </a:xfrm>
-        </p:spPr>
-        <p:txBody>
-          <a:bodyPr>
-            <a:normAutofit/>
-          </a:bodyPr>
-          <a:lstStyle/>
-          <a:p>
-            <a:endParaRPr lang="en-US" dirty="0" smtClean="0"/>
-          </a:p>
-        </p:txBody>
-      </p:sp>
-      <p:sp>
-        <p:nvSpPr>
-          <p:cNvPr id="2" name="Title 1"/>
-          <p:cNvSpPr>
-            <a:spLocks noGrp="1"/>
-          </p:cNvSpPr>
-          <p:nvPr>
-            <p:ph type="title"/>
-          </p:nvPr>
-        </p:nvSpPr>
-        <p:spPr/>
-        <p:txBody>
-          <a:bodyPr/>
-          <a:lstStyle/>
-          <a:p>
-            <a:r>
-              <a:rPr lang="en-US" dirty="0" smtClean="0"/>
-              <a:t>Experimental results</a:t>
-            </a:r>
-            <a:endParaRPr lang="en-US" dirty="0"/>
-          </a:p>
-        </p:txBody>
-      </p:sp>
-    </p:spTree>
-    <p:extLst>
-      <p:ext uri="{BB962C8B-B14F-4D97-AF65-F5344CB8AC3E}">
-        <p14:creationId xmlns:p14="http://schemas.microsoft.com/office/powerpoint/2010/main" val="797680074"/>
-      </p:ext>
-    </p:extLst>
-  </p:cSld>
-  <p:clrMapOvr>
-    <a:masterClrMapping/>
-  </p:clrMapOvr>
-  <p:timing>
-    <p:tnLst>
-      <p:par>
-        <p:cTn id="1" dur="indefinite" restart="never" nodeType="tmRoot"/>
-      </p:par>
-    </p:tnLst>
-  </p:timing>
-</p:sld>
-</file>
-
 <file path=ppt/slides/slide13.xml><?xml version="1.0" encoding="utf-8"?>
 <p:sld xmlns:a="http://schemas.openxmlformats.org/drawingml/2006/main" xmlns:r="http://schemas.openxmlformats.org/officeDocument/2006/relationships" xmlns:p="http://schemas.openxmlformats.org/presentationml/2006/main">
   <p:cSld>
@@ -6707,7 +7289,7 @@
           <a:p>
             <a:r>
               <a:rPr lang="en-US" dirty="0" smtClean="0"/>
-              <a:t>Usability testing</a:t>
+              <a:t>Experimental results</a:t>
             </a:r>
             <a:endParaRPr lang="en-US" dirty="0"/>
           </a:p>
@@ -6793,7 +7375,7 @@
           <a:p>
             <a:r>
               <a:rPr lang="en-US" dirty="0" smtClean="0"/>
-              <a:t>Technical weaknesses</a:t>
+              <a:t>Usability testing</a:t>
             </a:r>
             <a:endParaRPr lang="en-US" dirty="0"/>
           </a:p>
@@ -6879,7 +7461,7 @@
           <a:p>
             <a:r>
               <a:rPr lang="en-US" dirty="0" smtClean="0"/>
-              <a:t>Future work</a:t>
+              <a:t>Technical weaknesses</a:t>
             </a:r>
             <a:endParaRPr lang="en-US" dirty="0"/>
           </a:p>
@@ -6924,6 +7506,92 @@
       </p:grpSpPr>
       <p:sp>
         <p:nvSpPr>
+          <p:cNvPr id="3" name="Content Placeholder 2"/>
+          <p:cNvSpPr>
+            <a:spLocks noGrp="1"/>
+          </p:cNvSpPr>
+          <p:nvPr>
+            <p:ph idx="1"/>
+          </p:nvPr>
+        </p:nvSpPr>
+        <p:spPr>
+          <a:xfrm>
+            <a:off x="685800" y="1600200"/>
+            <a:ext cx="7772400" cy="4190999"/>
+          </a:xfrm>
+        </p:spPr>
+        <p:txBody>
+          <a:bodyPr>
+            <a:normAutofit/>
+          </a:bodyPr>
+          <a:lstStyle/>
+          <a:p>
+            <a:endParaRPr lang="en-US" dirty="0" smtClean="0"/>
+          </a:p>
+        </p:txBody>
+      </p:sp>
+      <p:sp>
+        <p:nvSpPr>
+          <p:cNvPr id="2" name="Title 1"/>
+          <p:cNvSpPr>
+            <a:spLocks noGrp="1"/>
+          </p:cNvSpPr>
+          <p:nvPr>
+            <p:ph type="title"/>
+          </p:nvPr>
+        </p:nvSpPr>
+        <p:spPr/>
+        <p:txBody>
+          <a:bodyPr/>
+          <a:lstStyle/>
+          <a:p>
+            <a:r>
+              <a:rPr lang="en-US" dirty="0" smtClean="0"/>
+              <a:t>Future work</a:t>
+            </a:r>
+            <a:endParaRPr lang="en-US" dirty="0"/>
+          </a:p>
+        </p:txBody>
+      </p:sp>
+    </p:spTree>
+    <p:extLst>
+      <p:ext uri="{BB962C8B-B14F-4D97-AF65-F5344CB8AC3E}">
+        <p14:creationId xmlns:p14="http://schemas.microsoft.com/office/powerpoint/2010/main" val="797680074"/>
+      </p:ext>
+    </p:extLst>
+  </p:cSld>
+  <p:clrMapOvr>
+    <a:masterClrMapping/>
+  </p:clrMapOvr>
+  <p:timing>
+    <p:tnLst>
+      <p:par>
+        <p:cTn id="1" dur="indefinite" restart="never" nodeType="tmRoot"/>
+      </p:par>
+    </p:tnLst>
+  </p:timing>
+</p:sld>
+</file>
+
+<file path=ppt/slides/slide17.xml><?xml version="1.0" encoding="utf-8"?>
+<p:sld xmlns:a="http://schemas.openxmlformats.org/drawingml/2006/main" xmlns:r="http://schemas.openxmlformats.org/officeDocument/2006/relationships" xmlns:p="http://schemas.openxmlformats.org/presentationml/2006/main">
+  <p:cSld>
+    <p:spTree>
+      <p:nvGrpSpPr>
+        <p:cNvPr id="1" name=""/>
+        <p:cNvGrpSpPr/>
+        <p:nvPr/>
+      </p:nvGrpSpPr>
+      <p:grpSpPr>
+        <a:xfrm>
+          <a:off x="0" y="0"/>
+          <a:ext cx="0" cy="0"/>
+          <a:chOff x="0" y="0"/>
+          <a:chExt cx="0" cy="0"/>
+        </a:xfrm>
+      </p:grpSpPr>
+      <p:sp>
+        <p:nvSpPr>
           <p:cNvPr id="4" name="Title 3"/>
           <p:cNvSpPr>
             <a:spLocks noGrp="1"/>
@@ -6971,7 +7639,7 @@
 </p:sld>
 </file>
 
-<file path=ppt/slides/slide17.xml><?xml version="1.0" encoding="utf-8"?>
+<file path=ppt/slides/slide18.xml><?xml version="1.0" encoding="utf-8"?>
 <p:sld xmlns:a="http://schemas.openxmlformats.org/drawingml/2006/main" xmlns:r="http://schemas.openxmlformats.org/officeDocument/2006/relationships" xmlns:p="http://schemas.openxmlformats.org/presentationml/2006/main" show="0">
   <p:cSld>
     <p:spTree>
@@ -7013,21 +7681,21 @@
       </p:sp>
       <p:graphicFrame>
         <p:nvGraphicFramePr>
-          <p:cNvPr id="3" name="Table 2"/>
+          <p:cNvPr id="4" name="Table 3"/>
           <p:cNvGraphicFramePr>
             <a:graphicFrameLocks noGrp="1"/>
           </p:cNvGraphicFramePr>
           <p:nvPr>
             <p:extLst>
               <p:ext uri="{D42A27DB-BD31-4B8C-83A1-F6EECF244321}">
-                <p14:modId xmlns:p14="http://schemas.microsoft.com/office/powerpoint/2010/main" val="259493858"/>
+                <p14:modId xmlns:p14="http://schemas.microsoft.com/office/powerpoint/2010/main" val="894036458"/>
               </p:ext>
             </p:extLst>
           </p:nvPr>
         </p:nvGraphicFramePr>
         <p:xfrm>
           <a:off x="457200" y="1600200"/>
-          <a:ext cx="8382000" cy="1752600"/>
+          <a:ext cx="8382000" cy="2021840"/>
         </p:xfrm>
         <a:graphic>
           <a:graphicData uri="http://schemas.openxmlformats.org/drawingml/2006/table">
@@ -7129,7 +7797,26 @@
                     <a:p>
                       <a:r>
                         <a:rPr lang="en-US" dirty="0" smtClean="0"/>
-                        <a:t>Design, Kernel, Technical Weaknesses, Future Work</a:t>
+                        <a:t>Design, Kernel, </a:t>
+                      </a:r>
+                      <a:r>
+                        <a:rPr lang="en-US" dirty="0" smtClean="0"/>
+                        <a:t>Experimental Results,</a:t>
+                      </a:r>
+                      <a:r>
+                        <a:rPr lang="en-US" baseline="0" dirty="0" smtClean="0"/>
+                        <a:t> </a:t>
+                      </a:r>
+                      <a:br>
+                        <a:rPr lang="en-US" baseline="0" dirty="0" smtClean="0"/>
+                      </a:br>
+                      <a:r>
+                        <a:rPr lang="en-US" dirty="0" smtClean="0"/>
+                        <a:t>Technical </a:t>
+                      </a:r>
+                      <a:r>
+                        <a:rPr lang="en-US" dirty="0" smtClean="0"/>
+                        <a:t>Weaknesses, Future Work</a:t>
                       </a:r>
                       <a:endParaRPr lang="en-US" dirty="0"/>
                     </a:p>
@@ -7848,32 +8535,6 @@
       </p:grpSpPr>
       <p:sp>
         <p:nvSpPr>
-          <p:cNvPr id="3" name="Content Placeholder 2"/>
-          <p:cNvSpPr>
-            <a:spLocks noGrp="1"/>
-          </p:cNvSpPr>
-          <p:nvPr>
-            <p:ph idx="1"/>
-          </p:nvPr>
-        </p:nvSpPr>
-        <p:spPr>
-          <a:xfrm>
-            <a:off x="685800" y="1600200"/>
-            <a:ext cx="7772400" cy="4190999"/>
-          </a:xfrm>
-        </p:spPr>
-        <p:txBody>
-          <a:bodyPr>
-            <a:normAutofit/>
-          </a:bodyPr>
-          <a:lstStyle/>
-          <a:p>
-            <a:endParaRPr lang="en-US" dirty="0" smtClean="0"/>
-          </a:p>
-        </p:txBody>
-      </p:sp>
-      <p:sp>
-        <p:nvSpPr>
           <p:cNvPr id="2" name="Title 1"/>
           <p:cNvSpPr>
             <a:spLocks noGrp="1"/>
@@ -7888,8 +8549,12 @@
           <a:lstStyle/>
           <a:p>
             <a:r>
+              <a:rPr lang="en-US" dirty="0"/>
+              <a:t>D</a:t>
+            </a:r>
+            <a:r>
               <a:rPr lang="en-US" dirty="0" smtClean="0"/>
-              <a:t>design</a:t>
+              <a:t>esign</a:t>
             </a:r>
             <a:endParaRPr lang="en-US" dirty="0"/>
           </a:p>
@@ -7918,8 +8583,8 @@
         </p:blipFill>
         <p:spPr bwMode="auto">
           <a:xfrm>
-            <a:off x="2882153" y="3962400"/>
-            <a:ext cx="3644107" cy="2638425"/>
+            <a:off x="2387905" y="867388"/>
+            <a:ext cx="6486998" cy="4696750"/>
           </a:xfrm>
           <a:prstGeom prst="rect">
             <a:avLst/>
@@ -7936,10 +8601,253 @@
           </a:extLst>
         </p:spPr>
       </p:pic>
+      <p:sp>
+        <p:nvSpPr>
+          <p:cNvPr id="5" name="Oval 4"/>
+          <p:cNvSpPr/>
+          <p:nvPr/>
+        </p:nvSpPr>
+        <p:spPr>
+          <a:xfrm>
+            <a:off x="228600" y="4419600"/>
+            <a:ext cx="304800" cy="304800"/>
+          </a:xfrm>
+          <a:prstGeom prst="ellipse">
+            <a:avLst/>
+          </a:prstGeom>
+          <a:effectLst/>
+        </p:spPr>
+        <p:style>
+          <a:lnRef idx="1">
+            <a:schemeClr val="accent6"/>
+          </a:lnRef>
+          <a:fillRef idx="2">
+            <a:schemeClr val="accent6"/>
+          </a:fillRef>
+          <a:effectRef idx="1">
+            <a:schemeClr val="accent6"/>
+          </a:effectRef>
+          <a:fontRef idx="minor">
+            <a:schemeClr val="dk1"/>
+          </a:fontRef>
+        </p:style>
+        <p:txBody>
+          <a:bodyPr rtlCol="0" anchor="ctr"/>
+          <a:lstStyle/>
+          <a:p>
+            <a:pPr algn="ctr"/>
+            <a:endParaRPr lang="en-US" sz="1400" dirty="0">
+              <a:solidFill>
+                <a:prstClr val="black"/>
+              </a:solidFill>
+            </a:endParaRPr>
+          </a:p>
+        </p:txBody>
+      </p:sp>
+      <p:sp>
+        <p:nvSpPr>
+          <p:cNvPr id="6" name="Rounded Rectangle 5"/>
+          <p:cNvSpPr/>
+          <p:nvPr/>
+        </p:nvSpPr>
+        <p:spPr>
+          <a:xfrm>
+            <a:off x="124628" y="4904601"/>
+            <a:ext cx="495299" cy="228600"/>
+          </a:xfrm>
+          <a:prstGeom prst="roundRect">
+            <a:avLst/>
+          </a:prstGeom>
+          <a:effectLst/>
+        </p:spPr>
+        <p:style>
+          <a:lnRef idx="1">
+            <a:schemeClr val="accent6"/>
+          </a:lnRef>
+          <a:fillRef idx="2">
+            <a:schemeClr val="accent6"/>
+          </a:fillRef>
+          <a:effectRef idx="1">
+            <a:schemeClr val="accent6"/>
+          </a:effectRef>
+          <a:fontRef idx="minor">
+            <a:schemeClr val="dk1"/>
+          </a:fontRef>
+        </p:style>
+        <p:txBody>
+          <a:bodyPr rtlCol="0" anchor="ctr"/>
+          <a:lstStyle/>
+          <a:p>
+            <a:pPr algn="ctr"/>
+            <a:endParaRPr lang="en-US" sz="1400" dirty="0">
+              <a:solidFill>
+                <a:prstClr val="black"/>
+              </a:solidFill>
+            </a:endParaRPr>
+          </a:p>
+        </p:txBody>
+      </p:sp>
+      <p:sp>
+        <p:nvSpPr>
+          <p:cNvPr id="7" name="Flowchart: Decision 6"/>
+          <p:cNvSpPr/>
+          <p:nvPr/>
+        </p:nvSpPr>
+        <p:spPr>
+          <a:xfrm>
+            <a:off x="76200" y="5334000"/>
+            <a:ext cx="581828" cy="320030"/>
+          </a:xfrm>
+          <a:prstGeom prst="flowChartDecision">
+            <a:avLst/>
+          </a:prstGeom>
+          <a:effectLst/>
+        </p:spPr>
+        <p:style>
+          <a:lnRef idx="1">
+            <a:schemeClr val="accent6"/>
+          </a:lnRef>
+          <a:fillRef idx="2">
+            <a:schemeClr val="accent6"/>
+          </a:fillRef>
+          <a:effectRef idx="1">
+            <a:schemeClr val="accent6"/>
+          </a:effectRef>
+          <a:fontRef idx="minor">
+            <a:schemeClr val="dk1"/>
+          </a:fontRef>
+        </p:style>
+        <p:txBody>
+          <a:bodyPr rtlCol="0" anchor="ctr"/>
+          <a:lstStyle/>
+          <a:p>
+            <a:pPr algn="ctr"/>
+            <a:endParaRPr lang="en-US" sz="1400" dirty="0">
+              <a:solidFill>
+                <a:prstClr val="black"/>
+              </a:solidFill>
+            </a:endParaRPr>
+          </a:p>
+        </p:txBody>
+      </p:sp>
+      <p:sp>
+        <p:nvSpPr>
+          <p:cNvPr id="4" name="TextBox 3"/>
+          <p:cNvSpPr txBox="1"/>
+          <p:nvPr/>
+        </p:nvSpPr>
+        <p:spPr>
+          <a:xfrm>
+            <a:off x="592155" y="5361801"/>
+            <a:ext cx="1285073" cy="276999"/>
+          </a:xfrm>
+          <a:prstGeom prst="rect">
+            <a:avLst/>
+          </a:prstGeom>
+          <a:noFill/>
+        </p:spPr>
+        <p:txBody>
+          <a:bodyPr wrap="square" rtlCol="0">
+            <a:spAutoFit/>
+          </a:bodyPr>
+          <a:lstStyle/>
+          <a:p>
+            <a:r>
+              <a:rPr lang="en-US" sz="1200" dirty="0" smtClean="0">
+                <a:solidFill>
+                  <a:prstClr val="black"/>
+                </a:solidFill>
+              </a:rPr>
+              <a:t>= Conditional</a:t>
+            </a:r>
+            <a:endParaRPr lang="en-US" sz="1200" dirty="0">
+              <a:solidFill>
+                <a:prstClr val="black"/>
+              </a:solidFill>
+            </a:endParaRPr>
+          </a:p>
+        </p:txBody>
+      </p:sp>
+      <p:sp>
+        <p:nvSpPr>
+          <p:cNvPr id="9" name="TextBox 8"/>
+          <p:cNvSpPr txBox="1"/>
+          <p:nvPr/>
+        </p:nvSpPr>
+        <p:spPr>
+          <a:xfrm>
+            <a:off x="581828" y="4904601"/>
+            <a:ext cx="1524000" cy="276999"/>
+          </a:xfrm>
+          <a:prstGeom prst="rect">
+            <a:avLst/>
+          </a:prstGeom>
+          <a:noFill/>
+        </p:spPr>
+        <p:txBody>
+          <a:bodyPr wrap="square" rtlCol="0">
+            <a:spAutoFit/>
+          </a:bodyPr>
+          <a:lstStyle/>
+          <a:p>
+            <a:r>
+              <a:rPr lang="en-US" sz="1200" dirty="0" smtClean="0">
+                <a:solidFill>
+                  <a:prstClr val="black"/>
+                </a:solidFill>
+              </a:rPr>
+              <a:t>= System Actions</a:t>
+            </a:r>
+            <a:endParaRPr lang="en-US" sz="1200" dirty="0">
+              <a:solidFill>
+                <a:prstClr val="black"/>
+              </a:solidFill>
+            </a:endParaRPr>
+          </a:p>
+        </p:txBody>
+      </p:sp>
+      <p:sp>
+        <p:nvSpPr>
+          <p:cNvPr id="10" name="TextBox 9"/>
+          <p:cNvSpPr txBox="1"/>
+          <p:nvPr/>
+        </p:nvSpPr>
+        <p:spPr>
+          <a:xfrm>
+            <a:off x="581829" y="4422403"/>
+            <a:ext cx="1676399" cy="276999"/>
+          </a:xfrm>
+          <a:prstGeom prst="rect">
+            <a:avLst/>
+          </a:prstGeom>
+          <a:noFill/>
+        </p:spPr>
+        <p:txBody>
+          <a:bodyPr wrap="square" rtlCol="0">
+            <a:spAutoFit/>
+          </a:bodyPr>
+          <a:lstStyle/>
+          <a:p>
+            <a:r>
+              <a:rPr lang="en-US" sz="1200" dirty="0" smtClean="0">
+                <a:solidFill>
+                  <a:prstClr val="black"/>
+                </a:solidFill>
+              </a:rPr>
+              <a:t>= User Interactions </a:t>
+            </a:r>
+            <a:endParaRPr lang="en-US" sz="1200" dirty="0">
+              <a:solidFill>
+                <a:prstClr val="black"/>
+              </a:solidFill>
+            </a:endParaRPr>
+          </a:p>
+        </p:txBody>
+      </p:sp>
     </p:spTree>
     <p:extLst>
       <p:ext uri="{BB962C8B-B14F-4D97-AF65-F5344CB8AC3E}">
-        <p14:creationId xmlns:p14="http://schemas.microsoft.com/office/powerpoint/2010/main" val="797680074"/>
+        <p14:creationId xmlns:p14="http://schemas.microsoft.com/office/powerpoint/2010/main" val="2377761139"/>
       </p:ext>
     </p:extLst>
   </p:cSld>
@@ -8059,32 +8967,35 @@
           <a:chExt cx="0" cy="0"/>
         </a:xfrm>
       </p:grpSpPr>
-      <p:sp>
-        <p:nvSpPr>
-          <p:cNvPr id="3" name="Content Placeholder 2"/>
-          <p:cNvSpPr>
-            <a:spLocks noGrp="1"/>
-          </p:cNvSpPr>
+      <p:pic>
+        <p:nvPicPr>
+          <p:cNvPr id="4" name="Content Placeholder 3"/>
+          <p:cNvPicPr>
+            <a:picLocks noGrp="1" noChangeAspect="1"/>
+          </p:cNvPicPr>
           <p:nvPr>
             <p:ph idx="1"/>
           </p:nvPr>
-        </p:nvSpPr>
+        </p:nvPicPr>
+        <p:blipFill>
+          <a:blip r:embed="rId3">
+            <a:extLst>
+              <a:ext uri="{28A0092B-C50C-407E-A947-70E740481C1C}">
+                <a14:useLocalDpi xmlns:a14="http://schemas.microsoft.com/office/drawing/2010/main" val="0"/>
+              </a:ext>
+            </a:extLst>
+          </a:blip>
+          <a:stretch>
+            <a:fillRect/>
+          </a:stretch>
+        </p:blipFill>
         <p:spPr>
           <a:xfrm>
-            <a:off x="685800" y="1600200"/>
-            <a:ext cx="7772400" cy="4190999"/>
+            <a:off x="2138666" y="1412130"/>
+            <a:ext cx="4866667" cy="4076190"/>
           </a:xfrm>
         </p:spPr>
-        <p:txBody>
-          <a:bodyPr>
-            <a:normAutofit/>
-          </a:bodyPr>
-          <a:lstStyle/>
-          <a:p>
-            <a:endParaRPr lang="en-US" dirty="0" smtClean="0"/>
-          </a:p>
-        </p:txBody>
-      </p:sp>
+      </p:pic>
       <p:sp>
         <p:nvSpPr>
           <p:cNvPr id="2" name="Title 1"/>
@@ -8102,16 +9013,110 @@
           <a:p>
             <a:r>
               <a:rPr lang="en-US" dirty="0" smtClean="0"/>
-              <a:t>kernel</a:t>
+              <a:t>K</a:t>
+            </a:r>
+            <a:r>
+              <a:rPr lang="en-US" dirty="0" smtClean="0"/>
+              <a:t>ernel: Makefile Modification</a:t>
             </a:r>
             <a:endParaRPr lang="en-US" dirty="0"/>
+          </a:p>
+        </p:txBody>
+      </p:sp>
+      <p:sp>
+        <p:nvSpPr>
+          <p:cNvPr id="5" name="Rectangle 4"/>
+          <p:cNvSpPr/>
+          <p:nvPr/>
+        </p:nvSpPr>
+        <p:spPr>
+          <a:xfrm>
+            <a:off x="2362198" y="1412130"/>
+            <a:ext cx="4795533" cy="340470"/>
+          </a:xfrm>
+          <a:prstGeom prst="rect">
+            <a:avLst/>
+          </a:prstGeom>
+          <a:noFill/>
+          <a:ln w="19050"/>
+          <a:effectLst/>
+        </p:spPr>
+        <p:style>
+          <a:lnRef idx="1">
+            <a:schemeClr val="accent2"/>
+          </a:lnRef>
+          <a:fillRef idx="2">
+            <a:schemeClr val="accent2"/>
+          </a:fillRef>
+          <a:effectRef idx="1">
+            <a:schemeClr val="accent2"/>
+          </a:effectRef>
+          <a:fontRef idx="minor">
+            <a:schemeClr val="dk1"/>
+          </a:fontRef>
+        </p:style>
+        <p:txBody>
+          <a:bodyPr rtlCol="0" anchor="ctr"/>
+          <a:lstStyle/>
+          <a:p>
+            <a:pPr algn="ctr"/>
+            <a:endParaRPr lang="en-US" dirty="0">
+              <a:solidFill>
+                <a:prstClr val="black"/>
+              </a:solidFill>
+            </a:endParaRPr>
+          </a:p>
+        </p:txBody>
+      </p:sp>
+      <p:sp>
+        <p:nvSpPr>
+          <p:cNvPr id="7" name="Rectangle 6"/>
+          <p:cNvSpPr/>
+          <p:nvPr/>
+        </p:nvSpPr>
+        <p:spPr>
+          <a:xfrm>
+            <a:off x="2362199" y="4419600"/>
+            <a:ext cx="4795533" cy="838200"/>
+          </a:xfrm>
+          <a:prstGeom prst="rect">
+            <a:avLst/>
+          </a:prstGeom>
+          <a:noFill/>
+          <a:ln w="19050"/>
+          <a:effectLst/>
+        </p:spPr>
+        <p:style>
+          <a:lnRef idx="1">
+            <a:schemeClr val="accent2"/>
+          </a:lnRef>
+          <a:fillRef idx="2">
+            <a:schemeClr val="accent2"/>
+          </a:fillRef>
+          <a:effectRef idx="1">
+            <a:schemeClr val="accent2"/>
+          </a:effectRef>
+          <a:fontRef idx="minor">
+            <a:schemeClr val="dk1"/>
+          </a:fontRef>
+        </p:style>
+        <p:txBody>
+          <a:bodyPr rtlCol="0" anchor="ctr"/>
+          <a:lstStyle/>
+          <a:p>
+            <a:pPr algn="ctr"/>
+            <a:endParaRPr lang="en-US" dirty="0">
+              <a:solidFill>
+                <a:prstClr val="black"/>
+              </a:solidFill>
+            </a:endParaRPr>
           </a:p>
         </p:txBody>
       </p:sp>
     </p:spTree>
     <p:extLst>
       <p:ext uri="{BB962C8B-B14F-4D97-AF65-F5344CB8AC3E}">
-        <p14:creationId xmlns:p14="http://schemas.microsoft.com/office/powerpoint/2010/main" val="797680074"/>
+        <p14:creationId xmlns:p14="http://schemas.microsoft.com/office/powerpoint/2010/main" val="3385925416"/>
       </p:ext>
     </p:extLst>
   </p:cSld>

</xml_diff>

<commit_message>
Added more of my slides
</commit_message>
<xml_diff>
--- a/Project/Final_Project_Presentation_Fasburg_Reiff_Thomas.pptx
+++ b/Project/Final_Project_Presentation_Fasburg_Reiff_Thomas.pptx
@@ -5,13 +5,13 @@
     <p:sldMasterId id="2147483785" r:id="rId1"/>
   </p:sldMasterIdLst>
   <p:notesMasterIdLst>
-    <p:notesMasterId r:id="rId20"/>
+    <p:notesMasterId r:id="rId21"/>
   </p:notesMasterIdLst>
   <p:sldIdLst>
-    <p:sldId id="256" r:id="rId2"/>
-    <p:sldId id="257" r:id="rId3"/>
-    <p:sldId id="288" r:id="rId4"/>
-    <p:sldId id="276" r:id="rId5"/>
+    <p:sldId id="292" r:id="rId2"/>
+    <p:sldId id="293" r:id="rId3"/>
+    <p:sldId id="294" r:id="rId4"/>
+    <p:sldId id="295" r:id="rId5"/>
     <p:sldId id="277" r:id="rId6"/>
     <p:sldId id="278" r:id="rId7"/>
     <p:sldId id="289" r:id="rId8"/>
@@ -19,13 +19,14 @@
     <p:sldId id="290" r:id="rId10"/>
     <p:sldId id="291" r:id="rId11"/>
     <p:sldId id="282" r:id="rId12"/>
-    <p:sldId id="283" r:id="rId13"/>
+    <p:sldId id="296" r:id="rId13"/>
     <p:sldId id="284" r:id="rId14"/>
-    <p:sldId id="285" r:id="rId15"/>
+    <p:sldId id="297" r:id="rId15"/>
     <p:sldId id="286" r:id="rId16"/>
     <p:sldId id="287" r:id="rId17"/>
-    <p:sldId id="274" r:id="rId18"/>
-    <p:sldId id="275" r:id="rId19"/>
+    <p:sldId id="299" r:id="rId18"/>
+    <p:sldId id="298" r:id="rId19"/>
+    <p:sldId id="275" r:id="rId20"/>
   </p:sldIdLst>
   <p:sldSz cx="9144000" cy="6858000" type="screen4x3"/>
   <p:notesSz cx="6858000" cy="9144000"/>
@@ -126,7 +127,7 @@
   </p:defaultTextStyle>
   <p:extLst>
     <p:ext uri="{EFAFB233-063F-42B5-8137-9DF3F51BA10A}">
-      <p15:sldGuideLst xmlns:p15="http://schemas.microsoft.com/office/powerpoint/2012/main">
+      <p15:sldGuideLst xmlns:p15="http://schemas.microsoft.com/office/powerpoint/2012/main" xmlns="">
         <p15:guide id="1" orient="horz" pos="2160">
           <p15:clr>
             <a:srgbClr val="A4A3A4"/>
@@ -225,7 +226,7 @@
           <a:p>
             <a:fld id="{A63B8CFC-D614-4432-A7DB-A65856E85B43}" type="datetimeFigureOut">
               <a:rPr lang="en-US" smtClean="0"/>
-              <a:t>4/13/2015</a:t>
+              <a:t>4/14/2015</a:t>
             </a:fld>
             <a:endParaRPr lang="en-US" dirty="0"/>
           </a:p>
@@ -1252,6 +1253,174 @@
             <a:fld id="{B8B3BC3C-0900-4ACD-9030-5BE6C2442A68}" type="slidenum">
               <a:rPr lang="en-US" smtClean="0"/>
               <a:t>16</a:t>
+            </a:fld>
+            <a:endParaRPr lang="en-US" dirty="0"/>
+          </a:p>
+        </p:txBody>
+      </p:sp>
+    </p:spTree>
+    <p:extLst>
+      <p:ext uri="{BB962C8B-B14F-4D97-AF65-F5344CB8AC3E}">
+        <p14:creationId xmlns:p14="http://schemas.microsoft.com/office/powerpoint/2010/main" val="3352367101"/>
+      </p:ext>
+    </p:extLst>
+  </p:cSld>
+  <p:clrMapOvr>
+    <a:masterClrMapping/>
+  </p:clrMapOvr>
+</p:notes>
+</file>
+
+<file path=ppt/notesSlides/notesSlide17.xml><?xml version="1.0" encoding="utf-8"?>
+<p:notes xmlns:a="http://schemas.openxmlformats.org/drawingml/2006/main" xmlns:r="http://schemas.openxmlformats.org/officeDocument/2006/relationships" xmlns:p="http://schemas.openxmlformats.org/presentationml/2006/main">
+  <p:cSld>
+    <p:spTree>
+      <p:nvGrpSpPr>
+        <p:cNvPr id="1" name=""/>
+        <p:cNvGrpSpPr/>
+        <p:nvPr/>
+      </p:nvGrpSpPr>
+      <p:grpSpPr>
+        <a:xfrm>
+          <a:off x="0" y="0"/>
+          <a:ext cx="0" cy="0"/>
+          <a:chOff x="0" y="0"/>
+          <a:chExt cx="0" cy="0"/>
+        </a:xfrm>
+      </p:grpSpPr>
+      <p:sp>
+        <p:nvSpPr>
+          <p:cNvPr id="2" name="Slide Image Placeholder 1"/>
+          <p:cNvSpPr>
+            <a:spLocks noGrp="1" noRot="1" noChangeAspect="1"/>
+          </p:cNvSpPr>
+          <p:nvPr>
+            <p:ph type="sldImg"/>
+          </p:nvPr>
+        </p:nvSpPr>
+        <p:spPr/>
+      </p:sp>
+      <p:sp>
+        <p:nvSpPr>
+          <p:cNvPr id="3" name="Notes Placeholder 2"/>
+          <p:cNvSpPr>
+            <a:spLocks noGrp="1"/>
+          </p:cNvSpPr>
+          <p:nvPr>
+            <p:ph type="body" idx="1"/>
+          </p:nvPr>
+        </p:nvSpPr>
+        <p:spPr/>
+        <p:txBody>
+          <a:bodyPr/>
+          <a:lstStyle/>
+          <a:p>
+            <a:endParaRPr lang="en-US" dirty="0"/>
+          </a:p>
+        </p:txBody>
+      </p:sp>
+      <p:sp>
+        <p:nvSpPr>
+          <p:cNvPr id="4" name="Slide Number Placeholder 3"/>
+          <p:cNvSpPr>
+            <a:spLocks noGrp="1"/>
+          </p:cNvSpPr>
+          <p:nvPr>
+            <p:ph type="sldNum" sz="quarter" idx="10"/>
+          </p:nvPr>
+        </p:nvSpPr>
+        <p:spPr/>
+        <p:txBody>
+          <a:bodyPr/>
+          <a:lstStyle/>
+          <a:p>
+            <a:fld id="{B8B3BC3C-0900-4ACD-9030-5BE6C2442A68}" type="slidenum">
+              <a:rPr lang="en-US" smtClean="0"/>
+              <a:t>17</a:t>
+            </a:fld>
+            <a:endParaRPr lang="en-US" dirty="0"/>
+          </a:p>
+        </p:txBody>
+      </p:sp>
+    </p:spTree>
+    <p:extLst>
+      <p:ext uri="{BB962C8B-B14F-4D97-AF65-F5344CB8AC3E}">
+        <p14:creationId xmlns:p14="http://schemas.microsoft.com/office/powerpoint/2010/main" val="3352367101"/>
+      </p:ext>
+    </p:extLst>
+  </p:cSld>
+  <p:clrMapOvr>
+    <a:masterClrMapping/>
+  </p:clrMapOvr>
+</p:notes>
+</file>
+
+<file path=ppt/notesSlides/notesSlide18.xml><?xml version="1.0" encoding="utf-8"?>
+<p:notes xmlns:a="http://schemas.openxmlformats.org/drawingml/2006/main" xmlns:r="http://schemas.openxmlformats.org/officeDocument/2006/relationships" xmlns:p="http://schemas.openxmlformats.org/presentationml/2006/main">
+  <p:cSld>
+    <p:spTree>
+      <p:nvGrpSpPr>
+        <p:cNvPr id="1" name=""/>
+        <p:cNvGrpSpPr/>
+        <p:nvPr/>
+      </p:nvGrpSpPr>
+      <p:grpSpPr>
+        <a:xfrm>
+          <a:off x="0" y="0"/>
+          <a:ext cx="0" cy="0"/>
+          <a:chOff x="0" y="0"/>
+          <a:chExt cx="0" cy="0"/>
+        </a:xfrm>
+      </p:grpSpPr>
+      <p:sp>
+        <p:nvSpPr>
+          <p:cNvPr id="2" name="Slide Image Placeholder 1"/>
+          <p:cNvSpPr>
+            <a:spLocks noGrp="1" noRot="1" noChangeAspect="1"/>
+          </p:cNvSpPr>
+          <p:nvPr>
+            <p:ph type="sldImg"/>
+          </p:nvPr>
+        </p:nvSpPr>
+        <p:spPr/>
+      </p:sp>
+      <p:sp>
+        <p:nvSpPr>
+          <p:cNvPr id="3" name="Notes Placeholder 2"/>
+          <p:cNvSpPr>
+            <a:spLocks noGrp="1"/>
+          </p:cNvSpPr>
+          <p:nvPr>
+            <p:ph type="body" idx="1"/>
+          </p:nvPr>
+        </p:nvSpPr>
+        <p:spPr/>
+        <p:txBody>
+          <a:bodyPr/>
+          <a:lstStyle/>
+          <a:p>
+            <a:endParaRPr lang="en-US" dirty="0"/>
+          </a:p>
+        </p:txBody>
+      </p:sp>
+      <p:sp>
+        <p:nvSpPr>
+          <p:cNvPr id="4" name="Slide Number Placeholder 3"/>
+          <p:cNvSpPr>
+            <a:spLocks noGrp="1"/>
+          </p:cNvSpPr>
+          <p:nvPr>
+            <p:ph type="sldNum" sz="quarter" idx="10"/>
+          </p:nvPr>
+        </p:nvSpPr>
+        <p:spPr/>
+        <p:txBody>
+          <a:bodyPr/>
+          <a:lstStyle/>
+          <a:p>
+            <a:fld id="{B8B3BC3C-0900-4ACD-9030-5BE6C2442A68}" type="slidenum">
+              <a:rPr lang="en-US" smtClean="0"/>
+              <a:t>18</a:t>
             </a:fld>
             <a:endParaRPr lang="en-US" dirty="0"/>
           </a:p>
@@ -2744,7 +2913,7 @@
           <a:p>
             <a:fld id="{ADE5661A-BDAA-4579-B2F5-AA9011776D83}" type="datetimeFigureOut">
               <a:rPr lang="en-US" smtClean="0"/>
-              <a:t>4/13/2015</a:t>
+              <a:t>4/14/2015</a:t>
             </a:fld>
             <a:endParaRPr lang="en-US" dirty="0"/>
           </a:p>
@@ -2942,7 +3111,7 @@
             <a:fld id="{1D8BD707-D9CF-40AE-B4C6-C98DA3205C09}" type="datetimeFigureOut">
               <a:rPr lang="en-US" smtClean="0"/>
               <a:pPr/>
-              <a:t>4/13/2015</a:t>
+              <a:t>4/14/2015</a:t>
             </a:fld>
             <a:endParaRPr lang="en-US" dirty="0"/>
           </a:p>
@@ -3129,7 +3298,7 @@
             <a:fld id="{1D8BD707-D9CF-40AE-B4C6-C98DA3205C09}" type="datetimeFigureOut">
               <a:rPr lang="en-US" smtClean="0"/>
               <a:pPr/>
-              <a:t>4/13/2015</a:t>
+              <a:t>4/14/2015</a:t>
             </a:fld>
             <a:endParaRPr lang="en-US" dirty="0"/>
           </a:p>
@@ -3281,7 +3450,7 @@
             <a:fld id="{1D8BD707-D9CF-40AE-B4C6-C98DA3205C09}" type="datetimeFigureOut">
               <a:rPr lang="en-US" smtClean="0"/>
               <a:pPr/>
-              <a:t>4/13/2015</a:t>
+              <a:t>4/14/2015</a:t>
             </a:fld>
             <a:endParaRPr lang="en-US" dirty="0"/>
           </a:p>
@@ -3537,7 +3706,7 @@
           <a:p>
             <a:fld id="{7D698992-9F5B-4E9D-871D-4517B2EC8643}" type="datetimeFigureOut">
               <a:rPr lang="en-US" smtClean="0"/>
-              <a:t>4/13/2015</a:t>
+              <a:t>4/14/2015</a:t>
             </a:fld>
             <a:endParaRPr lang="en-US" dirty="0"/>
           </a:p>
@@ -3947,7 +4116,7 @@
             <a:fld id="{1D8BD707-D9CF-40AE-B4C6-C98DA3205C09}" type="datetimeFigureOut">
               <a:rPr lang="en-US" smtClean="0"/>
               <a:pPr/>
-              <a:t>4/13/2015</a:t>
+              <a:t>4/14/2015</a:t>
             </a:fld>
             <a:endParaRPr lang="en-US" dirty="0"/>
           </a:p>
@@ -4395,7 +4564,7 @@
             <a:fld id="{1D8BD707-D9CF-40AE-B4C6-C98DA3205C09}" type="datetimeFigureOut">
               <a:rPr lang="en-US" smtClean="0"/>
               <a:pPr/>
-              <a:t>4/13/2015</a:t>
+              <a:t>4/14/2015</a:t>
             </a:fld>
             <a:endParaRPr lang="en-US" dirty="0"/>
           </a:p>
@@ -4498,7 +4667,7 @@
             <a:fld id="{1D8BD707-D9CF-40AE-B4C6-C98DA3205C09}" type="datetimeFigureOut">
               <a:rPr lang="en-US" smtClean="0"/>
               <a:pPr/>
-              <a:t>4/13/2015</a:t>
+              <a:t>4/14/2015</a:t>
             </a:fld>
             <a:endParaRPr lang="en-US" dirty="0"/>
           </a:p>
@@ -4621,7 +4790,7 @@
             <a:fld id="{1D8BD707-D9CF-40AE-B4C6-C98DA3205C09}" type="datetimeFigureOut">
               <a:rPr lang="en-US" smtClean="0"/>
               <a:pPr/>
-              <a:t>4/13/2015</a:t>
+              <a:t>4/14/2015</a:t>
             </a:fld>
             <a:endParaRPr lang="en-US" dirty="0"/>
           </a:p>
@@ -4897,7 +5066,7 @@
             <a:fld id="{1D8BD707-D9CF-40AE-B4C6-C98DA3205C09}" type="datetimeFigureOut">
               <a:rPr lang="en-US" smtClean="0"/>
               <a:pPr/>
-              <a:t>4/13/2015</a:t>
+              <a:t>4/14/2015</a:t>
             </a:fld>
             <a:endParaRPr lang="en-US" dirty="0"/>
           </a:p>
@@ -5104,7 +5273,7 @@
             <a:fld id="{1D8BD707-D9CF-40AE-B4C6-C98DA3205C09}" type="datetimeFigureOut">
               <a:rPr lang="en-US" smtClean="0"/>
               <a:pPr/>
-              <a:t>4/13/2015</a:t>
+              <a:t>4/14/2015</a:t>
             </a:fld>
             <a:endParaRPr lang="en-US" dirty="0"/>
           </a:p>
@@ -6215,7 +6384,7 @@
             <a:fld id="{1D8BD707-D9CF-40AE-B4C6-C98DA3205C09}" type="datetimeFigureOut">
               <a:rPr lang="en-US" smtClean="0"/>
               <a:pPr/>
-              <a:t>4/13/2015</a:t>
+              <a:t>4/14/2015</a:t>
             </a:fld>
             <a:endParaRPr lang="en-US" dirty="0"/>
           </a:p>
@@ -6665,8 +6834,8 @@
         </p:nvSpPr>
         <p:spPr>
           <a:xfrm>
-            <a:off x="533400" y="3203574"/>
-            <a:ext cx="7924800" cy="1825625"/>
+            <a:off x="304800" y="3657601"/>
+            <a:ext cx="7924800" cy="533400"/>
           </a:xfrm>
         </p:spPr>
         <p:txBody>
@@ -6675,9 +6844,18 @@
           </a:bodyPr>
           <a:lstStyle/>
           <a:p>
+            <a:pPr algn="l"/>
             <a:r>
               <a:rPr lang="en-US" dirty="0" smtClean="0"/>
-              <a:t>Vince Fasburg, Bonnie Reiff, and Josh Thomas</a:t>
+              <a:t>Vince Fasburg, Bonnie Reiff, </a:t>
+            </a:r>
+            <a:r>
+              <a:rPr lang="en-US" sz="2000" dirty="0" smtClean="0"/>
+              <a:t>and</a:t>
+            </a:r>
+            <a:r>
+              <a:rPr lang="en-US" dirty="0" smtClean="0"/>
+              <a:t> Josh Thomas</a:t>
             </a:r>
             <a:endParaRPr lang="en-US" dirty="0"/>
           </a:p>
@@ -6686,7 +6864,7 @@
     </p:spTree>
     <p:extLst>
       <p:ext uri="{BB962C8B-B14F-4D97-AF65-F5344CB8AC3E}">
-        <p14:creationId xmlns:p14="http://schemas.microsoft.com/office/powerpoint/2010/main" val="3234676079"/>
+        <p14:creationId xmlns:p14="http://schemas.microsoft.com/office/powerpoint/2010/main" val="1974980263"/>
       </p:ext>
     </p:extLst>
   </p:cSld>
@@ -6737,11 +6915,7 @@
           <a:p>
             <a:r>
               <a:rPr lang="en-US" dirty="0" smtClean="0"/>
-              <a:t>K</a:t>
-            </a:r>
-            <a:r>
-              <a:rPr lang="en-US" dirty="0" smtClean="0"/>
-              <a:t>ernel: Driver Modification</a:t>
+              <a:t>Kernel: Driver Modification</a:t>
             </a:r>
             <a:endParaRPr lang="en-US" dirty="0"/>
           </a:p>
@@ -7072,7 +7246,11 @@
           <a:p>
             <a:r>
               <a:rPr lang="en-US" dirty="0" smtClean="0"/>
-              <a:t>Bash script</a:t>
+              <a:t>Bash </a:t>
+            </a:r>
+            <a:r>
+              <a:rPr lang="en-US" dirty="0" smtClean="0"/>
+              <a:t>Script</a:t>
             </a:r>
             <a:endParaRPr lang="en-US" dirty="0"/>
           </a:p>
@@ -7127,8 +7305,8 @@
         </p:nvSpPr>
         <p:spPr>
           <a:xfrm>
-            <a:off x="685800" y="1600200"/>
-            <a:ext cx="7772400" cy="4190999"/>
+            <a:off x="457200" y="1600200"/>
+            <a:ext cx="4810125" cy="4190999"/>
           </a:xfrm>
         </p:spPr>
         <p:txBody>
@@ -7137,7 +7315,68 @@
           </a:bodyPr>
           <a:lstStyle/>
           <a:p>
-            <a:endParaRPr lang="en-US" dirty="0" smtClean="0"/>
+            <a:r>
+              <a:rPr lang="en-US" sz="2000" dirty="0"/>
+              <a:t>C</a:t>
+            </a:r>
+            <a:r>
+              <a:rPr lang="en-US" sz="2000" dirty="0" smtClean="0"/>
+              <a:t>reated using Java Swing.</a:t>
+            </a:r>
+          </a:p>
+          <a:p>
+            <a:r>
+              <a:rPr lang="en-US" sz="2000" dirty="0" smtClean="0"/>
+              <a:t>Captcha is non-web based to show proof of concept, future work would be to add this.</a:t>
+            </a:r>
+          </a:p>
+          <a:p>
+            <a:r>
+              <a:rPr lang="en-US" sz="2000" dirty="0" smtClean="0"/>
+              <a:t>The GUI always stays on top of other windows and remains in focus.</a:t>
+            </a:r>
+          </a:p>
+          <a:p>
+            <a:r>
+              <a:rPr lang="en-US" sz="2000" dirty="0" smtClean="0"/>
+              <a:t>The ‘X’ to close is disabled.</a:t>
+            </a:r>
+          </a:p>
+          <a:p>
+            <a:r>
+              <a:rPr lang="en-US" sz="2000" dirty="0" smtClean="0"/>
+              <a:t>Two methods of validation:</a:t>
+            </a:r>
+          </a:p>
+          <a:p>
+            <a:pPr marL="736092" lvl="1" indent="-342900">
+              <a:buFont typeface="+mj-lt"/>
+              <a:buAutoNum type="arabicPeriod"/>
+            </a:pPr>
+            <a:r>
+              <a:rPr lang="en-US" sz="1600" dirty="0" smtClean="0"/>
+              <a:t>Type directly in textbox - keyboard</a:t>
+            </a:r>
+          </a:p>
+          <a:p>
+            <a:pPr marL="736092" lvl="1" indent="-342900">
+              <a:buFont typeface="+mj-lt"/>
+              <a:buAutoNum type="arabicPeriod"/>
+            </a:pPr>
+            <a:r>
+              <a:rPr lang="en-US" sz="1600" dirty="0" smtClean="0"/>
+              <a:t>Use virtual keyboard - mouse</a:t>
+            </a:r>
+          </a:p>
+          <a:p>
+            <a:pPr marL="736092" lvl="1" indent="-342900">
+              <a:buFont typeface="+mj-lt"/>
+              <a:buAutoNum type="arabicPeriod"/>
+            </a:pPr>
+            <a:endParaRPr lang="en-US" sz="1600" dirty="0" smtClean="0"/>
+          </a:p>
+          <a:p>
+            <a:endParaRPr lang="en-US" sz="2000" dirty="0" smtClean="0"/>
           </a:p>
         </p:txBody>
       </p:sp>
@@ -7158,11 +7397,7 @@
           <a:p>
             <a:r>
               <a:rPr lang="en-US" dirty="0" smtClean="0"/>
-              <a:t>Captcha </a:t>
-            </a:r>
-            <a:r>
-              <a:rPr lang="en-US" dirty="0" err="1" smtClean="0"/>
-              <a:t>gui</a:t>
+              <a:t>Captcha GUI</a:t>
             </a:r>
             <a:endParaRPr lang="en-US" dirty="0"/>
           </a:p>
@@ -7191,8 +7426,8 @@
         </p:blipFill>
         <p:spPr bwMode="auto">
           <a:xfrm>
-            <a:off x="6436659" y="3962400"/>
-            <a:ext cx="2371725" cy="2782824"/>
+            <a:off x="5267325" y="1219200"/>
+            <a:ext cx="3724275" cy="4369816"/>
           </a:xfrm>
           <a:prstGeom prst="rect">
             <a:avLst/>
@@ -7212,7 +7447,7 @@
     </p:spTree>
     <p:extLst>
       <p:ext uri="{BB962C8B-B14F-4D97-AF65-F5344CB8AC3E}">
-        <p14:creationId xmlns:p14="http://schemas.microsoft.com/office/powerpoint/2010/main" val="797680074"/>
+        <p14:creationId xmlns:p14="http://schemas.microsoft.com/office/powerpoint/2010/main" val="1265123752"/>
       </p:ext>
     </p:extLst>
   </p:cSld>
@@ -7289,7 +7524,11 @@
           <a:p>
             <a:r>
               <a:rPr lang="en-US" dirty="0" smtClean="0"/>
-              <a:t>Experimental results</a:t>
+              <a:t>Experimental </a:t>
+            </a:r>
+            <a:r>
+              <a:rPr lang="en-US" dirty="0" smtClean="0"/>
+              <a:t>Results</a:t>
             </a:r>
             <a:endParaRPr lang="en-US" dirty="0"/>
           </a:p>
@@ -7344,7 +7583,7 @@
         </p:nvSpPr>
         <p:spPr>
           <a:xfrm>
-            <a:off x="685800" y="1600200"/>
+            <a:off x="685800" y="1447800"/>
             <a:ext cx="7772400" cy="4190999"/>
           </a:xfrm>
         </p:spPr>
@@ -7354,7 +7593,69 @@
           </a:bodyPr>
           <a:lstStyle/>
           <a:p>
-            <a:endParaRPr lang="en-US" dirty="0" smtClean="0"/>
+            <a:r>
+              <a:rPr lang="en-US" sz="2000" dirty="0" smtClean="0"/>
+              <a:t>Allowed external users to attempt to use the GUI while under observation.</a:t>
+            </a:r>
+          </a:p>
+          <a:p>
+            <a:pPr marL="109728" indent="0">
+              <a:buNone/>
+            </a:pPr>
+            <a:endParaRPr lang="en-US" sz="1000" dirty="0" smtClean="0"/>
+          </a:p>
+          <a:p>
+            <a:r>
+              <a:rPr lang="en-US" sz="2000" dirty="0" smtClean="0"/>
+              <a:t>Three main outcomes:</a:t>
+            </a:r>
+          </a:p>
+          <a:p>
+            <a:endParaRPr lang="en-US" sz="1000" dirty="0" smtClean="0"/>
+          </a:p>
+          <a:p>
+            <a:pPr marL="822960" lvl="1" indent="-457200">
+              <a:buFont typeface="+mj-lt"/>
+              <a:buAutoNum type="arabicPeriod"/>
+            </a:pPr>
+            <a:r>
+              <a:rPr lang="en-US" sz="2000" dirty="0" smtClean="0"/>
+              <a:t>Users did not completely understand the idea behind hovering over the keys to validate the mouse.</a:t>
+            </a:r>
+          </a:p>
+          <a:p>
+            <a:pPr marL="822960" lvl="1" indent="-457200">
+              <a:buFont typeface="+mj-lt"/>
+              <a:buAutoNum type="arabicPeriod"/>
+            </a:pPr>
+            <a:endParaRPr lang="en-US" sz="1000" dirty="0" smtClean="0"/>
+          </a:p>
+          <a:p>
+            <a:pPr marL="822960" lvl="1" indent="-457200">
+              <a:buFont typeface="+mj-lt"/>
+              <a:buAutoNum type="arabicPeriod"/>
+            </a:pPr>
+            <a:r>
+              <a:rPr lang="en-US" sz="2000" dirty="0" smtClean="0"/>
+              <a:t>Letters on the keys are too small / keys are too small.</a:t>
+            </a:r>
+          </a:p>
+          <a:p>
+            <a:pPr marL="822960" lvl="1" indent="-457200">
+              <a:buFont typeface="+mj-lt"/>
+              <a:buAutoNum type="arabicPeriod"/>
+            </a:pPr>
+            <a:endParaRPr lang="en-US" sz="1000" dirty="0" smtClean="0"/>
+          </a:p>
+          <a:p>
+            <a:pPr marL="822960" lvl="1" indent="-457200">
+              <a:buFont typeface="+mj-lt"/>
+              <a:buAutoNum type="arabicPeriod"/>
+            </a:pPr>
+            <a:r>
+              <a:rPr lang="en-US" sz="2000" dirty="0" smtClean="0"/>
+              <a:t>Length of the directions was too long. Some did not read all the way through.</a:t>
+            </a:r>
           </a:p>
         </p:txBody>
       </p:sp>
@@ -7375,7 +7676,7 @@
           <a:p>
             <a:r>
               <a:rPr lang="en-US" dirty="0" smtClean="0"/>
-              <a:t>Usability testing</a:t>
+              <a:t>Usability Testing</a:t>
             </a:r>
             <a:endParaRPr lang="en-US" dirty="0"/>
           </a:p>
@@ -7384,7 +7685,7 @@
     </p:spTree>
     <p:extLst>
       <p:ext uri="{BB962C8B-B14F-4D97-AF65-F5344CB8AC3E}">
-        <p14:creationId xmlns:p14="http://schemas.microsoft.com/office/powerpoint/2010/main" val="797680074"/>
+        <p14:creationId xmlns:p14="http://schemas.microsoft.com/office/powerpoint/2010/main" val="3715707877"/>
       </p:ext>
     </p:extLst>
   </p:cSld>
@@ -7461,7 +7762,11 @@
           <a:p>
             <a:r>
               <a:rPr lang="en-US" dirty="0" smtClean="0"/>
-              <a:t>Technical weaknesses</a:t>
+              <a:t>Technical </a:t>
+            </a:r>
+            <a:r>
+              <a:rPr lang="en-US" dirty="0" smtClean="0"/>
+              <a:t>Weaknesses</a:t>
             </a:r>
             <a:endParaRPr lang="en-US" dirty="0"/>
           </a:p>
@@ -7547,7 +7852,11 @@
           <a:p>
             <a:r>
               <a:rPr lang="en-US" dirty="0" smtClean="0"/>
-              <a:t>Future work</a:t>
+              <a:t>Future </a:t>
+            </a:r>
+            <a:r>
+              <a:rPr lang="en-US" dirty="0" smtClean="0"/>
+              <a:t>Work</a:t>
             </a:r>
             <a:endParaRPr lang="en-US" dirty="0"/>
           </a:p>
@@ -7592,7 +7901,7 @@
       </p:grpSpPr>
       <p:sp>
         <p:nvSpPr>
-          <p:cNvPr id="4" name="Title 3"/>
+          <p:cNvPr id="2" name="Title 1"/>
           <p:cNvSpPr>
             <a:spLocks noGrp="1"/>
           </p:cNvSpPr>
@@ -7600,20 +7909,14 @@
             <p:ph type="title"/>
           </p:nvPr>
         </p:nvSpPr>
-        <p:spPr>
-          <a:xfrm>
-            <a:off x="609600" y="2438400"/>
-            <a:ext cx="7772400" cy="1143000"/>
-          </a:xfrm>
-        </p:spPr>
+        <p:spPr/>
         <p:txBody>
           <a:bodyPr/>
           <a:lstStyle/>
           <a:p>
-            <a:pPr algn="ctr"/>
             <a:r>
               <a:rPr lang="en-US" dirty="0" smtClean="0"/>
-              <a:t>Questions?</a:t>
+              <a:t>Demo</a:t>
             </a:r>
             <a:endParaRPr lang="en-US" dirty="0"/>
           </a:p>
@@ -7622,7 +7925,7 @@
     </p:spTree>
     <p:extLst>
       <p:ext uri="{BB962C8B-B14F-4D97-AF65-F5344CB8AC3E}">
-        <p14:creationId xmlns:p14="http://schemas.microsoft.com/office/powerpoint/2010/main" val="4283767605"/>
+        <p14:creationId xmlns:p14="http://schemas.microsoft.com/office/powerpoint/2010/main" val="3435152226"/>
       </p:ext>
     </p:extLst>
   </p:cSld>
@@ -7640,6 +7943,116 @@
 </file>
 
 <file path=ppt/slides/slide18.xml><?xml version="1.0" encoding="utf-8"?>
+<p:sld xmlns:a="http://schemas.openxmlformats.org/drawingml/2006/main" xmlns:r="http://schemas.openxmlformats.org/officeDocument/2006/relationships" xmlns:p="http://schemas.openxmlformats.org/presentationml/2006/main">
+  <p:cSld>
+    <p:spTree>
+      <p:nvGrpSpPr>
+        <p:cNvPr id="1" name=""/>
+        <p:cNvGrpSpPr/>
+        <p:nvPr/>
+      </p:nvGrpSpPr>
+      <p:grpSpPr>
+        <a:xfrm>
+          <a:off x="0" y="0"/>
+          <a:ext cx="0" cy="0"/>
+          <a:chOff x="0" y="0"/>
+          <a:chExt cx="0" cy="0"/>
+        </a:xfrm>
+      </p:grpSpPr>
+      <p:pic>
+        <p:nvPicPr>
+          <p:cNvPr id="5" name="Picture 1" descr="C:\Users\NGGZ7MT\AppData\Local\Microsoft\Windows\Temporary Internet Files\Content.IE5\N691L41P\MP900398831[1].jpg"/>
+          <p:cNvPicPr>
+            <a:picLocks noChangeAspect="1" noChangeArrowheads="1"/>
+          </p:cNvPicPr>
+          <p:nvPr/>
+        </p:nvPicPr>
+        <p:blipFill>
+          <a:blip r:embed="rId3">
+            <a:extLst>
+              <a:ext uri="{28A0092B-C50C-407E-A947-70E740481C1C}">
+                <a14:useLocalDpi xmlns:a14="http://schemas.microsoft.com/office/drawing/2010/main" val="0"/>
+              </a:ext>
+            </a:extLst>
+          </a:blip>
+          <a:srcRect/>
+          <a:stretch>
+            <a:fillRect/>
+          </a:stretch>
+        </p:blipFill>
+        <p:spPr bwMode="auto">
+          <a:xfrm>
+            <a:off x="838200" y="304800"/>
+            <a:ext cx="8259020" cy="5562600"/>
+          </a:xfrm>
+          <a:prstGeom prst="rect">
+            <a:avLst/>
+          </a:prstGeom>
+          <a:noFill/>
+          <a:effectLst>
+            <a:softEdge rad="228600"/>
+          </a:effectLst>
+          <a:extLst>
+            <a:ext uri="{909E8E84-426E-40DD-AFC4-6F175D3DCCD1}">
+              <a14:hiddenFill xmlns:a14="http://schemas.microsoft.com/office/drawing/2010/main">
+                <a:solidFill>
+                  <a:srgbClr val="FFFFFF"/>
+                </a:solidFill>
+              </a14:hiddenFill>
+            </a:ext>
+          </a:extLst>
+        </p:spPr>
+      </p:pic>
+      <p:sp>
+        <p:nvSpPr>
+          <p:cNvPr id="6" name="Title 3"/>
+          <p:cNvSpPr>
+            <a:spLocks noGrp="1"/>
+          </p:cNvSpPr>
+          <p:nvPr>
+            <p:ph type="title"/>
+          </p:nvPr>
+        </p:nvSpPr>
+        <p:spPr>
+          <a:xfrm>
+            <a:off x="685800" y="1143000"/>
+            <a:ext cx="7772400" cy="1143000"/>
+          </a:xfrm>
+        </p:spPr>
+        <p:txBody>
+          <a:bodyPr/>
+          <a:lstStyle/>
+          <a:p>
+            <a:pPr algn="ctr"/>
+            <a:r>
+              <a:rPr lang="en-US" dirty="0" smtClean="0"/>
+              <a:t>Questions?</a:t>
+            </a:r>
+            <a:endParaRPr lang="en-US" dirty="0"/>
+          </a:p>
+        </p:txBody>
+      </p:sp>
+    </p:spTree>
+    <p:extLst>
+      <p:ext uri="{BB962C8B-B14F-4D97-AF65-F5344CB8AC3E}">
+        <p14:creationId xmlns:p14="http://schemas.microsoft.com/office/powerpoint/2010/main" val="4213872561"/>
+      </p:ext>
+    </p:extLst>
+  </p:cSld>
+  <p:clrMapOvr>
+    <a:masterClrMapping/>
+  </p:clrMapOvr>
+  <p:timing>
+    <p:tnLst>
+      <p:par>
+        <p:cTn id="1" dur="indefinite" restart="never" nodeType="tmRoot"/>
+      </p:par>
+    </p:tnLst>
+  </p:timing>
+</p:sld>
+</file>
+
+<file path=ppt/slides/slide19.xml><?xml version="1.0" encoding="utf-8"?>
 <p:sld xmlns:a="http://schemas.openxmlformats.org/drawingml/2006/main" xmlns:r="http://schemas.openxmlformats.org/officeDocument/2006/relationships" xmlns:p="http://schemas.openxmlformats.org/presentationml/2006/main" show="0">
   <p:cSld>
     <p:spTree>
@@ -7797,11 +8210,7 @@
                     <a:p>
                       <a:r>
                         <a:rPr lang="en-US" dirty="0" smtClean="0"/>
-                        <a:t>Design, Kernel, </a:t>
-                      </a:r>
-                      <a:r>
-                        <a:rPr lang="en-US" dirty="0" smtClean="0"/>
-                        <a:t>Experimental Results,</a:t>
+                        <a:t>Design, Kernel, Experimental Results,</a:t>
                       </a:r>
                       <a:r>
                         <a:rPr lang="en-US" baseline="0" dirty="0" smtClean="0"/>
@@ -7812,11 +8221,7 @@
                       </a:br>
                       <a:r>
                         <a:rPr lang="en-US" dirty="0" smtClean="0"/>
-                        <a:t>Technical </a:t>
-                      </a:r>
-                      <a:r>
-                        <a:rPr lang="en-US" dirty="0" smtClean="0"/>
-                        <a:t>Weaknesses, Future Work</a:t>
+                        <a:t>Technical Weaknesses, Future Work</a:t>
                       </a:r>
                       <a:endParaRPr lang="en-US" dirty="0"/>
                     </a:p>
@@ -7922,7 +8327,7 @@
         </p:spPr>
         <p:txBody>
           <a:bodyPr>
-            <a:normAutofit fontScale="92500" lnSpcReduction="10000"/>
+            <a:normAutofit/>
           </a:bodyPr>
           <a:lstStyle/>
           <a:p>
@@ -7930,7 +8335,7 @@
               <a:buNone/>
             </a:pPr>
             <a:r>
-              <a:rPr lang="en-US" dirty="0" smtClean="0"/>
+              <a:rPr lang="en-US" sz="2000" dirty="0" smtClean="0"/>
               <a:t>USB devices have become the standard for connecting devices, such as keyboard and mice, to computers.  The security and protection of the computers that they are being connect to is a concern.</a:t>
             </a:r>
           </a:p>
@@ -7938,36 +8343,31 @@
             <a:pPr marL="68580" indent="0" algn="ctr">
               <a:buNone/>
             </a:pPr>
-            <a:endParaRPr lang="en-US" dirty="0"/>
+            <a:endParaRPr lang="en-US" sz="2000" dirty="0" smtClean="0"/>
           </a:p>
           <a:p>
             <a:pPr marL="68580" indent="0" algn="ctr">
               <a:buNone/>
             </a:pPr>
-            <a:r>
-              <a:rPr lang="en-US" dirty="0" smtClean="0"/>
-              <a:t>Attack Scenario:</a:t>
-            </a:r>
+            <a:endParaRPr lang="en-US" sz="2000" dirty="0"/>
           </a:p>
           <a:p>
             <a:pPr marL="68580" indent="0" algn="ctr">
               <a:buNone/>
             </a:pPr>
             <a:r>
-              <a:rPr lang="en-US" dirty="0" smtClean="0"/>
+              <a:rPr lang="en-US" sz="2000" b="1" dirty="0" smtClean="0"/>
+              <a:t>Attack Scenario</a:t>
+            </a:r>
+          </a:p>
+          <a:p>
+            <a:pPr marL="68580" indent="0" algn="ctr">
+              <a:buNone/>
+            </a:pPr>
+            <a:r>
+              <a:rPr lang="en-US" sz="2000" dirty="0" smtClean="0"/>
               <a:t>An attacker disguises a small microcontroller (the Teensy) as a flash drive and leaves it in a public space to wait for someone to plug it into their computer.</a:t>
             </a:r>
-          </a:p>
-          <a:p>
-            <a:pPr algn="ctr"/>
-            <a:endParaRPr lang="en-US" dirty="0" smtClean="0"/>
-          </a:p>
-          <a:p>
-            <a:pPr marL="925830" lvl="1" indent="-457200">
-              <a:buFont typeface="+mj-lt"/>
-              <a:buAutoNum type="arabicPeriod"/>
-            </a:pPr>
-            <a:endParaRPr lang="en-US" dirty="0" smtClean="0"/>
           </a:p>
         </p:txBody>
       </p:sp>
@@ -8038,7 +8438,7 @@
     </p:spTree>
     <p:extLst>
       <p:ext uri="{BB962C8B-B14F-4D97-AF65-F5344CB8AC3E}">
-        <p14:creationId xmlns:p14="http://schemas.microsoft.com/office/powerpoint/2010/main" val="3722578641"/>
+        <p14:creationId xmlns:p14="http://schemas.microsoft.com/office/powerpoint/2010/main" val="3741655731"/>
       </p:ext>
     </p:extLst>
   </p:cSld>
@@ -8090,7 +8490,7 @@
         </p:spPr>
         <p:txBody>
           <a:bodyPr>
-            <a:normAutofit fontScale="92500"/>
+            <a:normAutofit/>
           </a:bodyPr>
           <a:lstStyle/>
           <a:p>
@@ -8098,16 +8498,16 @@
               <a:buNone/>
             </a:pPr>
             <a:r>
-              <a:rPr lang="en-US" dirty="0" smtClean="0"/>
+              <a:rPr lang="en-US" sz="2000" dirty="0" smtClean="0"/>
               <a:t>Focus on the emulation of Human Interface Devices (HIDs), specifically a keyboard and mouse on a Linux OS.</a:t>
             </a:r>
           </a:p>
           <a:p>
-            <a:endParaRPr lang="en-US" dirty="0"/>
-          </a:p>
-          <a:p>
-            <a:r>
-              <a:rPr lang="en-US" dirty="0" smtClean="0"/>
+            <a:endParaRPr lang="en-US" sz="2000" dirty="0"/>
+          </a:p>
+          <a:p>
+            <a:r>
+              <a:rPr lang="en-US" sz="2000" dirty="0" smtClean="0"/>
               <a:t>Two phases of the project:</a:t>
             </a:r>
           </a:p>
@@ -8117,7 +8517,7 @@
               <a:buAutoNum type="arabicPeriod"/>
             </a:pPr>
             <a:r>
-              <a:rPr lang="en-US" sz="2000" dirty="0" smtClean="0"/>
+              <a:rPr lang="en-US" sz="1600" dirty="0" smtClean="0"/>
               <a:t>Create a suite of attacks on a Linux OS with the Teensy microcontroller which emulate a keyboard and mouse.</a:t>
             </a:r>
           </a:p>
@@ -8126,7 +8526,7 @@
               <a:buFont typeface="+mj-lt"/>
               <a:buAutoNum type="arabicPeriod"/>
             </a:pPr>
-            <a:endParaRPr lang="en-US" sz="2000" dirty="0" smtClean="0"/>
+            <a:endParaRPr lang="en-US" sz="1600" dirty="0" smtClean="0"/>
           </a:p>
           <a:p>
             <a:pPr marL="925830" lvl="1" indent="-457200">
@@ -8134,7 +8534,7 @@
               <a:buAutoNum type="arabicPeriod"/>
             </a:pPr>
             <a:r>
-              <a:rPr lang="en-US" sz="2000" dirty="0" smtClean="0"/>
+              <a:rPr lang="en-US" sz="1600" dirty="0" smtClean="0"/>
               <a:t>Prevent the attacks by making a modification to the USB-HID driver which disables key features of the device, then locks and grabs focus and displays a captcha GUI for verification.</a:t>
             </a:r>
           </a:p>
@@ -8166,7 +8566,7 @@
     </p:spTree>
     <p:extLst>
       <p:ext uri="{BB962C8B-B14F-4D97-AF65-F5344CB8AC3E}">
-        <p14:creationId xmlns:p14="http://schemas.microsoft.com/office/powerpoint/2010/main" val="3036423198"/>
+        <p14:creationId xmlns:p14="http://schemas.microsoft.com/office/powerpoint/2010/main" val="546295969"/>
       </p:ext>
     </p:extLst>
   </p:cSld>
@@ -8218,7 +8618,7 @@
         </p:spPr>
         <p:txBody>
           <a:bodyPr>
-            <a:normAutofit fontScale="85000" lnSpcReduction="10000"/>
+            <a:noAutofit/>
           </a:bodyPr>
           <a:lstStyle/>
           <a:p>
@@ -8227,7 +8627,7 @@
               <a:buAutoNum type="arabicPeriod"/>
             </a:pPr>
             <a:r>
-              <a:rPr lang="en-US" dirty="0" smtClean="0"/>
+              <a:rPr lang="en-US" sz="2000" dirty="0" smtClean="0"/>
               <a:t>What are the existing defenses against HID emulation attacks?</a:t>
             </a:r>
           </a:p>
@@ -8244,7 +8644,7 @@
               <a:buAutoNum type="arabicPeriod"/>
             </a:pPr>
             <a:r>
-              <a:rPr lang="en-US" dirty="0" smtClean="0"/>
+              <a:rPr lang="en-US" sz="2000" dirty="0" smtClean="0"/>
               <a:t>What is the extent of attacks that can be performed using HID emulation?</a:t>
             </a:r>
           </a:p>
@@ -8261,7 +8661,7 @@
               <a:buAutoNum type="arabicPeriod"/>
             </a:pPr>
             <a:r>
-              <a:rPr lang="en-US" dirty="0" smtClean="0"/>
+              <a:rPr lang="en-US" sz="2000" dirty="0" smtClean="0"/>
               <a:t>Can a driver be designed for USB mice and keyboards to defend against HID emulation attacks?</a:t>
             </a:r>
           </a:p>
@@ -8278,7 +8678,7 @@
               <a:buAutoNum type="arabicPeriod"/>
             </a:pPr>
             <a:r>
-              <a:rPr lang="en-US" dirty="0" smtClean="0"/>
+              <a:rPr lang="en-US" sz="2000" dirty="0" smtClean="0"/>
               <a:t>How effective will the driver be in defending against the HID emulation attacks?</a:t>
             </a:r>
           </a:p>
@@ -8295,7 +8695,7 @@
               <a:buAutoNum type="arabicPeriod"/>
             </a:pPr>
             <a:r>
-              <a:rPr lang="en-US" dirty="0" smtClean="0"/>
+              <a:rPr lang="en-US" sz="2000" dirty="0" smtClean="0"/>
               <a:t>How will users react to the USB device verification?</a:t>
             </a:r>
           </a:p>
@@ -8327,7 +8727,7 @@
     </p:spTree>
     <p:extLst>
       <p:ext uri="{BB962C8B-B14F-4D97-AF65-F5344CB8AC3E}">
-        <p14:creationId xmlns:p14="http://schemas.microsoft.com/office/powerpoint/2010/main" val="797680074"/>
+        <p14:creationId xmlns:p14="http://schemas.microsoft.com/office/powerpoint/2010/main" val="3573783193"/>
       </p:ext>
     </p:extLst>
   </p:cSld>
@@ -8404,7 +8804,11 @@
           <a:p>
             <a:r>
               <a:rPr lang="en-US" dirty="0" smtClean="0"/>
-              <a:t>Related work</a:t>
+              <a:t>Related </a:t>
+            </a:r>
+            <a:r>
+              <a:rPr lang="en-US" dirty="0" smtClean="0"/>
+              <a:t>Work</a:t>
             </a:r>
             <a:endParaRPr lang="en-US" dirty="0"/>
           </a:p>
@@ -8490,7 +8894,11 @@
           <a:p>
             <a:r>
               <a:rPr lang="en-US" dirty="0" smtClean="0"/>
-              <a:t>Threat model</a:t>
+              <a:t>Threat </a:t>
+            </a:r>
+            <a:r>
+              <a:rPr lang="en-US" dirty="0" smtClean="0"/>
+              <a:t>Model</a:t>
             </a:r>
             <a:endParaRPr lang="en-US" dirty="0"/>
           </a:p>
@@ -8924,7 +9332,11 @@
           <a:p>
             <a:r>
               <a:rPr lang="en-US" dirty="0" smtClean="0"/>
-              <a:t>Teensy attacks</a:t>
+              <a:t>Teensy </a:t>
+            </a:r>
+            <a:r>
+              <a:rPr lang="en-US" dirty="0" smtClean="0"/>
+              <a:t>Attacks</a:t>
             </a:r>
             <a:endParaRPr lang="en-US" dirty="0"/>
           </a:p>
@@ -9013,11 +9425,7 @@
           <a:p>
             <a:r>
               <a:rPr lang="en-US" dirty="0" smtClean="0"/>
-              <a:t>K</a:t>
-            </a:r>
-            <a:r>
-              <a:rPr lang="en-US" dirty="0" smtClean="0"/>
-              <a:t>ernel: Makefile Modification</a:t>
+              <a:t>Kernel: Makefile Modification</a:t>
             </a:r>
             <a:endParaRPr lang="en-US" dirty="0"/>
           </a:p>

</xml_diff>

<commit_message>
Embedded video in PowerPoint
</commit_message>
<xml_diff>
--- a/Project/Final_Project_Presentation_Fasburg_Reiff_Thomas.pptx
+++ b/Project/Final_Project_Presentation_Fasburg_Reiff_Thomas.pptx
@@ -7922,6 +7922,39 @@
           </a:p>
         </p:txBody>
       </p:sp>
+      <p:pic>
+        <p:nvPicPr>
+          <p:cNvPr id="4" name="teensyDemo.avi">
+            <a:hlinkClick r:id="" action="ppaction://media"/>
+          </p:cNvPr>
+          <p:cNvPicPr>
+            <a:picLocks noChangeAspect="1"/>
+          </p:cNvPicPr>
+          <p:nvPr>
+            <a:videoFile r:link="rId2"/>
+            <p:extLst>
+              <p:ext uri="{DAA4B4D4-6D71-4841-9C94-3DE7FCFB9230}">
+                <p14:media xmlns:p14="http://schemas.microsoft.com/office/powerpoint/2010/main" r:embed="rId1"/>
+              </p:ext>
+            </p:extLst>
+          </p:nvPr>
+        </p:nvPicPr>
+        <p:blipFill>
+          <a:blip r:embed="rId5"/>
+          <a:stretch>
+            <a:fillRect/>
+          </a:stretch>
+        </p:blipFill>
+        <p:spPr>
+          <a:xfrm>
+            <a:off x="838200" y="1219200"/>
+            <a:ext cx="7772400" cy="4926569"/>
+          </a:xfrm>
+          <a:prstGeom prst="rect">
+            <a:avLst/>
+          </a:prstGeom>
+        </p:spPr>
+      </p:pic>
     </p:spTree>
     <p:extLst>
       <p:ext uri="{BB962C8B-B14F-4D97-AF65-F5344CB8AC3E}">
@@ -7935,7 +7968,80 @@
   <p:timing>
     <p:tnLst>
       <p:par>
-        <p:cTn id="1" dur="indefinite" restart="never" nodeType="tmRoot"/>
+        <p:cTn id="1" dur="indefinite" restart="never" nodeType="tmRoot">
+          <p:childTnLst>
+            <p:seq concurrent="1" nextAc="seek">
+              <p:cTn id="2" restart="whenNotActive" fill="hold" evtFilter="cancelBubble" nodeType="interactiveSeq">
+                <p:stCondLst>
+                  <p:cond evt="onClick" delay="0">
+                    <p:tgtEl>
+                      <p:spTgt spid="4"/>
+                    </p:tgtEl>
+                  </p:cond>
+                </p:stCondLst>
+                <p:endSync evt="end" delay="0">
+                  <p:rtn val="all"/>
+                </p:endSync>
+                <p:childTnLst>
+                  <p:par>
+                    <p:cTn id="3" fill="hold">
+                      <p:stCondLst>
+                        <p:cond delay="0"/>
+                      </p:stCondLst>
+                      <p:childTnLst>
+                        <p:par>
+                          <p:cTn id="4" fill="hold">
+                            <p:stCondLst>
+                              <p:cond delay="0"/>
+                            </p:stCondLst>
+                            <p:childTnLst>
+                              <p:par>
+                                <p:cTn id="5" presetID="2" presetClass="mediacall" presetSubtype="0" fill="hold" nodeType="clickEffect">
+                                  <p:stCondLst>
+                                    <p:cond delay="0"/>
+                                  </p:stCondLst>
+                                  <p:childTnLst>
+                                    <p:cmd type="call" cmd="togglePause">
+                                      <p:cBhvr>
+                                        <p:cTn id="6" dur="1" fill="hold"/>
+                                        <p:tgtEl>
+                                          <p:spTgt spid="4"/>
+                                        </p:tgtEl>
+                                      </p:cBhvr>
+                                    </p:cmd>
+                                  </p:childTnLst>
+                                </p:cTn>
+                              </p:par>
+                            </p:childTnLst>
+                          </p:cTn>
+                        </p:par>
+                      </p:childTnLst>
+                    </p:cTn>
+                  </p:par>
+                </p:childTnLst>
+              </p:cTn>
+              <p:nextCondLst>
+                <p:cond evt="onClick" delay="0">
+                  <p:tgtEl>
+                    <p:spTgt spid="4"/>
+                  </p:tgtEl>
+                </p:cond>
+              </p:nextCondLst>
+            </p:seq>
+            <p:video>
+              <p:cMediaNode vol="80000">
+                <p:cTn id="7" fill="hold" display="0">
+                  <p:stCondLst>
+                    <p:cond delay="indefinite"/>
+                  </p:stCondLst>
+                </p:cTn>
+                <p:tgtEl>
+                  <p:spTgt spid="4"/>
+                </p:tgtEl>
+              </p:cMediaNode>
+            </p:video>
+          </p:childTnLst>
+        </p:cTn>
       </p:par>
     </p:tnLst>
   </p:timing>
@@ -8289,6 +8395,13 @@
       <p:transition spd="slow"/>
     </mc:Fallback>
   </mc:AlternateContent>
+  <p:timing>
+    <p:tnLst>
+      <p:par>
+        <p:cTn id="1" dur="indefinite" restart="never" nodeType="tmRoot"/>
+      </p:par>
+    </p:tnLst>
+  </p:timing>
 </p:sld>
 </file>
 

</xml_diff>

<commit_message>
Added drafts of all of my slides with notes. To be edited still. Also moved the Usability test slide to right after the GUI slide and before Experimental Results.
</commit_message>
<xml_diff>
--- a/Project/Final_Project_Presentation_Fasburg_Reiff_Thomas.pptx
+++ b/Project/Final_Project_Presentation_Fasburg_Reiff_Thomas.pptx
@@ -5,7 +5,7 @@
     <p:sldMasterId id="2147483785" r:id="rId1"/>
   </p:sldMasterIdLst>
   <p:notesMasterIdLst>
-    <p:notesMasterId r:id="rId23"/>
+    <p:notesMasterId r:id="rId25"/>
   </p:notesMasterIdLst>
   <p:sldIdLst>
     <p:sldId id="292" r:id="rId2"/>
@@ -20,15 +20,17 @@
     <p:sldId id="302" r:id="rId11"/>
     <p:sldId id="289" r:id="rId12"/>
     <p:sldId id="290" r:id="rId13"/>
-    <p:sldId id="291" r:id="rId14"/>
-    <p:sldId id="304" r:id="rId15"/>
-    <p:sldId id="296" r:id="rId16"/>
-    <p:sldId id="305" r:id="rId17"/>
+    <p:sldId id="306" r:id="rId14"/>
+    <p:sldId id="291" r:id="rId15"/>
+    <p:sldId id="304" r:id="rId16"/>
+    <p:sldId id="296" r:id="rId17"/>
     <p:sldId id="297" r:id="rId18"/>
-    <p:sldId id="286" r:id="rId19"/>
-    <p:sldId id="287" r:id="rId20"/>
-    <p:sldId id="298" r:id="rId21"/>
-    <p:sldId id="275" r:id="rId22"/>
+    <p:sldId id="305" r:id="rId19"/>
+    <p:sldId id="307" r:id="rId20"/>
+    <p:sldId id="286" r:id="rId21"/>
+    <p:sldId id="287" r:id="rId22"/>
+    <p:sldId id="298" r:id="rId23"/>
+    <p:sldId id="275" r:id="rId24"/>
   </p:sldIdLst>
   <p:sldSz cx="9144000" cy="6858000" type="screen4x3"/>
   <p:notesSz cx="6858000" cy="9144000"/>
@@ -129,7 +131,7 @@
   </p:defaultTextStyle>
   <p:extLst>
     <p:ext uri="{EFAFB233-063F-42B5-8137-9DF3F51BA10A}">
-      <p15:sldGuideLst xmlns="" xmlns:p15="http://schemas.microsoft.com/office/powerpoint/2012/main">
+      <p15:sldGuideLst xmlns:p15="http://schemas.microsoft.com/office/powerpoint/2012/main">
         <p15:guide id="1" orient="horz" pos="2160">
           <p15:clr>
             <a:srgbClr val="A4A3A4"/>
@@ -899,26 +901,8 @@
           <a:lstStyle/>
           <a:p>
             <a:r>
-              <a:rPr lang="en-US" dirty="0" smtClean="0"/>
-              <a:t>Red Boxes = new</a:t>
-            </a:r>
-            <a:r>
               <a:rPr lang="en-US" baseline="0" dirty="0" smtClean="0"/>
-              <a:t> additions</a:t>
-            </a:r>
-            <a:endParaRPr lang="en-US" dirty="0" smtClean="0"/>
-          </a:p>
-          <a:p>
-            <a:endParaRPr lang="en-US" dirty="0" smtClean="0"/>
-          </a:p>
-          <a:p>
-            <a:r>
-              <a:rPr lang="en-US" dirty="0" smtClean="0"/>
-              <a:t>Makefile</a:t>
-            </a:r>
-            <a:r>
-              <a:rPr lang="en-US" baseline="0" dirty="0" smtClean="0"/>
-              <a:t> target explanation:</a:t>
+              <a:t>Expanded Notes: </a:t>
             </a:r>
           </a:p>
           <a:p>
@@ -928,7 +912,7 @@
             </a:pPr>
             <a:r>
               <a:rPr lang="en-US" baseline="0" dirty="0" smtClean="0"/>
-              <a:t>KVERSION: the current kernel release</a:t>
+              <a:t>Kernel versions: 3.13.0-32 for initial development, 3.13.0-46 for final development and test (software update led to release patches)</a:t>
             </a:r>
           </a:p>
           <a:p>
@@ -938,17 +922,11 @@
             </a:pPr>
             <a:r>
               <a:rPr lang="en-US" baseline="0" dirty="0" smtClean="0"/>
-              <a:t>“-c”: the path to the kernel source</a:t>
-            </a:r>
-          </a:p>
-          <a:p>
-            <a:pPr marL="171450" indent="-171450">
-              <a:buFont typeface="Arial" panose="020B0604020202020204" pitchFamily="34" charset="0"/>
-              <a:buChar char="•"/>
-            </a:pPr>
+              <a:t>Linux kernel source version 3.19.3 was the latest stable kernel version when development work began</a:t>
+            </a:r>
             <a:r>
               <a:rPr lang="en-US" baseline="0" dirty="0" smtClean="0"/>
-              <a:t>“M=&lt;directory&gt;”: provides the absolute path to the external module being built </a:t>
+              <a:t/>
             </a:r>
             <a:br>
               <a:rPr lang="en-US" baseline="0" dirty="0" smtClean="0"/>
@@ -1054,12 +1032,30 @@
           <a:lstStyle/>
           <a:p>
             <a:r>
-              <a:rPr lang="en-US" u="sng" dirty="0" err="1" smtClean="0"/>
-              <a:t>call_usermodehelper</a:t>
-            </a:r>
-            <a:r>
-              <a:rPr lang="en-US" u="sng" dirty="0" smtClean="0"/>
-              <a:t> function</a:t>
+              <a:rPr lang="en-US" dirty="0" smtClean="0"/>
+              <a:t>Red </a:t>
+            </a:r>
+            <a:r>
+              <a:rPr lang="en-US" dirty="0" smtClean="0"/>
+              <a:t>Boxes = new</a:t>
+            </a:r>
+            <a:r>
+              <a:rPr lang="en-US" baseline="0" dirty="0" smtClean="0"/>
+              <a:t> additions</a:t>
+            </a:r>
+            <a:endParaRPr lang="en-US" dirty="0" smtClean="0"/>
+          </a:p>
+          <a:p>
+            <a:endParaRPr lang="en-US" dirty="0" smtClean="0"/>
+          </a:p>
+          <a:p>
+            <a:r>
+              <a:rPr lang="en-US" dirty="0" smtClean="0"/>
+              <a:t>Makefile</a:t>
+            </a:r>
+            <a:r>
+              <a:rPr lang="en-US" baseline="0" dirty="0" smtClean="0"/>
+              <a:t> target explanation:</a:t>
             </a:r>
           </a:p>
           <a:p>
@@ -1068,8 +1064,8 @@
               <a:buChar char="•"/>
             </a:pPr>
             <a:r>
-              <a:rPr lang="en-US" u="none" baseline="0" dirty="0" smtClean="0"/>
-              <a:t>Purpose: allows a user space application to be invoked from the kernel (prepares the process handle and executes the call)</a:t>
+              <a:rPr lang="en-US" baseline="0" dirty="0" smtClean="0"/>
+              <a:t>KVERSION: the current kernel release</a:t>
             </a:r>
           </a:p>
           <a:p>
@@ -1078,62 +1074,36 @@
               <a:buChar char="•"/>
             </a:pPr>
             <a:r>
-              <a:rPr lang="en-US" u="none" baseline="0" dirty="0" smtClean="0"/>
-              <a:t>Inputs:</a:t>
-            </a:r>
-          </a:p>
-          <a:p>
-            <a:pPr marL="628650" lvl="1" indent="-171450">
+              <a:rPr lang="en-US" baseline="0" dirty="0" smtClean="0"/>
+              <a:t>“-c”: the path to the kernel source</a:t>
+            </a:r>
+          </a:p>
+          <a:p>
+            <a:pPr marL="171450" indent="-171450">
               <a:buFont typeface="Arial" panose="020B0604020202020204" pitchFamily="34" charset="0"/>
               <a:buChar char="•"/>
             </a:pPr>
             <a:r>
-              <a:rPr lang="en-US" u="none" baseline="0" dirty="0" smtClean="0"/>
-              <a:t>The path to be the program to be executed</a:t>
-            </a:r>
-          </a:p>
-          <a:p>
-            <a:pPr marL="628650" lvl="1" indent="-171450">
+              <a:rPr lang="en-US" baseline="0" dirty="0" smtClean="0"/>
+              <a:t>“M=&lt;directory&gt;”: provides the absolute path to the external module being built </a:t>
+            </a:r>
+            <a:endParaRPr lang="en-US" baseline="0" dirty="0" smtClean="0"/>
+          </a:p>
+          <a:p>
+            <a:pPr marL="171450" indent="-171450">
               <a:buFont typeface="Arial" panose="020B0604020202020204" pitchFamily="34" charset="0"/>
               <a:buChar char="•"/>
             </a:pPr>
-            <a:r>
-              <a:rPr lang="en-US" u="none" baseline="0" dirty="0" smtClean="0"/>
-              <a:t>The null terminated list of program arguments, including the name of the program at the zeroth index</a:t>
-            </a:r>
-          </a:p>
-          <a:p>
-            <a:pPr marL="628650" lvl="1" indent="-171450">
+            <a:endParaRPr lang="en-US" baseline="0" dirty="0" smtClean="0"/>
+          </a:p>
+          <a:p>
+            <a:pPr marL="0" indent="0">
               <a:buFont typeface="Arial" panose="020B0604020202020204" pitchFamily="34" charset="0"/>
-              <a:buChar char="•"/>
+              <a:buNone/>
             </a:pPr>
             <a:r>
-              <a:rPr lang="en-US" u="none" baseline="0" dirty="0" smtClean="0"/>
-              <a:t>The null terminated list containing environment information</a:t>
-            </a:r>
-          </a:p>
-          <a:p>
-            <a:pPr marL="628650" lvl="1" indent="-171450">
-              <a:buFont typeface="Arial" panose="020B0604020202020204" pitchFamily="34" charset="0"/>
-              <a:buChar char="•"/>
-            </a:pPr>
-            <a:r>
-              <a:rPr lang="en-US" u="none" baseline="0" dirty="0" smtClean="0"/>
-              <a:t>UMH_WAIT_EXEC to wait for the user space application to be invoked before continuing,</a:t>
-            </a:r>
-            <a:br>
-              <a:rPr lang="en-US" u="none" baseline="0" dirty="0" smtClean="0"/>
-            </a:br>
-            <a:r>
-              <a:rPr lang="en-US" u="none" baseline="0" dirty="0" smtClean="0"/>
-              <a:t>UMH_WAIT_PROC to wait for the entire process (including the application running in user space) to complete,</a:t>
-            </a:r>
-            <a:br>
-              <a:rPr lang="en-US" u="none" baseline="0" dirty="0" smtClean="0"/>
-            </a:br>
-            <a:r>
-              <a:rPr lang="en-US" u="none" baseline="0" dirty="0" smtClean="0"/>
-              <a:t>UMH_NO_WAIT to include no wait time</a:t>
+              <a:rPr lang="en-US" baseline="0" dirty="0" smtClean="0"/>
+              <a:t>Note: the Makefile also builds the usbkbd and usbmouse drivers – modification of these was outside the scope of the project but these drivers are important for the Future Work</a:t>
             </a:r>
             <a:r>
               <a:rPr lang="en-US" baseline="0" dirty="0" smtClean="0"/>
@@ -1188,7 +1158,7 @@
     </p:spTree>
     <p:extLst>
       <p:ext uri="{BB962C8B-B14F-4D97-AF65-F5344CB8AC3E}">
-        <p14:creationId xmlns:p14="http://schemas.microsoft.com/office/powerpoint/2010/main" val="1992650313"/>
+        <p14:creationId xmlns:p14="http://schemas.microsoft.com/office/powerpoint/2010/main" val="2045922379"/>
       </p:ext>
     </p:extLst>
   </p:cSld>
@@ -1242,6 +1212,148 @@
           <a:bodyPr/>
           <a:lstStyle/>
           <a:p>
+            <a:r>
+              <a:rPr lang="en-US" u="sng" dirty="0" smtClean="0"/>
+              <a:t>Purpose</a:t>
+            </a:r>
+            <a:r>
+              <a:rPr lang="en-US" u="sng" baseline="0" dirty="0" smtClean="0"/>
+              <a:t> of the calls to the user-space applications</a:t>
+            </a:r>
+          </a:p>
+          <a:p>
+            <a:pPr marL="171450" indent="-171450">
+              <a:buFont typeface="Arial" panose="020B0604020202020204" pitchFamily="34" charset="0"/>
+              <a:buChar char="•"/>
+            </a:pPr>
+            <a:r>
+              <a:rPr lang="en-US" u="none" baseline="0" dirty="0" smtClean="0"/>
+              <a:t>Logger: verification that the function was running (output found in /</a:t>
+            </a:r>
+            <a:r>
+              <a:rPr lang="en-US" u="none" baseline="0" dirty="0" err="1" smtClean="0"/>
+              <a:t>var</a:t>
+            </a:r>
+            <a:r>
+              <a:rPr lang="en-US" u="none" baseline="0" dirty="0" smtClean="0"/>
+              <a:t>/log/syslog)</a:t>
+            </a:r>
+          </a:p>
+          <a:p>
+            <a:pPr marL="171450" indent="-171450">
+              <a:buFont typeface="Arial" panose="020B0604020202020204" pitchFamily="34" charset="0"/>
+              <a:buChar char="•"/>
+            </a:pPr>
+            <a:r>
+              <a:rPr lang="en-US" u="none" baseline="0" dirty="0" smtClean="0"/>
+              <a:t>Bash program: control the USB-HID functionalities and execute the CAPTCHA program</a:t>
+            </a:r>
+            <a:endParaRPr lang="en-US" u="none" dirty="0" smtClean="0"/>
+          </a:p>
+          <a:p>
+            <a:endParaRPr lang="en-US" u="sng" dirty="0" smtClean="0"/>
+          </a:p>
+          <a:p>
+            <a:r>
+              <a:rPr lang="en-US" u="sng" dirty="0" err="1" smtClean="0"/>
+              <a:t>call_usermodehelper</a:t>
+            </a:r>
+            <a:r>
+              <a:rPr lang="en-US" u="sng" dirty="0" smtClean="0"/>
+              <a:t> </a:t>
+            </a:r>
+            <a:r>
+              <a:rPr lang="en-US" u="sng" dirty="0" smtClean="0"/>
+              <a:t>function</a:t>
+            </a:r>
+          </a:p>
+          <a:p>
+            <a:pPr marL="171450" indent="-171450">
+              <a:buFont typeface="Arial" panose="020B0604020202020204" pitchFamily="34" charset="0"/>
+              <a:buChar char="•"/>
+            </a:pPr>
+            <a:r>
+              <a:rPr lang="en-US" u="none" baseline="0" dirty="0" smtClean="0"/>
+              <a:t>Purpose: allows a user space application to be invoked from the kernel (prepares the process handle and executes the call)</a:t>
+            </a:r>
+          </a:p>
+          <a:p>
+            <a:pPr marL="171450" indent="-171450">
+              <a:buFont typeface="Arial" panose="020B0604020202020204" pitchFamily="34" charset="0"/>
+              <a:buChar char="•"/>
+            </a:pPr>
+            <a:r>
+              <a:rPr lang="en-US" u="none" baseline="0" dirty="0" smtClean="0"/>
+              <a:t>Inputs:</a:t>
+            </a:r>
+          </a:p>
+          <a:p>
+            <a:pPr marL="628650" lvl="1" indent="-171450">
+              <a:buFont typeface="Arial" panose="020B0604020202020204" pitchFamily="34" charset="0"/>
+              <a:buChar char="•"/>
+            </a:pPr>
+            <a:r>
+              <a:rPr lang="en-US" u="none" baseline="0" dirty="0" smtClean="0"/>
+              <a:t>The path to be the program to be executed</a:t>
+            </a:r>
+          </a:p>
+          <a:p>
+            <a:pPr marL="628650" lvl="1" indent="-171450">
+              <a:buFont typeface="Arial" panose="020B0604020202020204" pitchFamily="34" charset="0"/>
+              <a:buChar char="•"/>
+            </a:pPr>
+            <a:r>
+              <a:rPr lang="en-US" u="none" baseline="0" dirty="0" smtClean="0"/>
+              <a:t>The null terminated list of program arguments, including the name of the program at the zeroth index</a:t>
+            </a:r>
+          </a:p>
+          <a:p>
+            <a:pPr marL="628650" lvl="1" indent="-171450">
+              <a:buFont typeface="Arial" panose="020B0604020202020204" pitchFamily="34" charset="0"/>
+              <a:buChar char="•"/>
+            </a:pPr>
+            <a:r>
+              <a:rPr lang="en-US" u="none" baseline="0" dirty="0" smtClean="0"/>
+              <a:t>The null terminated list containing environment information</a:t>
+            </a:r>
+          </a:p>
+          <a:p>
+            <a:pPr marL="628650" lvl="1" indent="-171450">
+              <a:buFont typeface="Arial" panose="020B0604020202020204" pitchFamily="34" charset="0"/>
+              <a:buChar char="•"/>
+            </a:pPr>
+            <a:r>
+              <a:rPr lang="en-US" u="none" baseline="0" dirty="0" smtClean="0"/>
+              <a:t>UMH_WAIT_EXEC to wait for the user space application to be invoked before continuing,</a:t>
+            </a:r>
+            <a:br>
+              <a:rPr lang="en-US" u="none" baseline="0" dirty="0" smtClean="0"/>
+            </a:br>
+            <a:r>
+              <a:rPr lang="en-US" u="none" baseline="0" dirty="0" smtClean="0"/>
+              <a:t>UMH_WAIT_PROC to wait for the entire process (including the application running in user space) to complete,</a:t>
+            </a:r>
+            <a:br>
+              <a:rPr lang="en-US" u="none" baseline="0" dirty="0" smtClean="0"/>
+            </a:br>
+            <a:r>
+              <a:rPr lang="en-US" u="none" baseline="0" dirty="0" smtClean="0"/>
+              <a:t>UMH_NO_WAIT to include no wait time</a:t>
+            </a:r>
+            <a:r>
+              <a:rPr lang="en-US" baseline="0" dirty="0" smtClean="0"/>
+              <a:t/>
+            </a:r>
+            <a:br>
+              <a:rPr lang="en-US" baseline="0" dirty="0" smtClean="0"/>
+            </a:br>
+            <a:endParaRPr lang="en-US" baseline="0" dirty="0" smtClean="0"/>
+          </a:p>
+          <a:p>
+            <a:pPr marL="171450" indent="-171450">
+              <a:buFont typeface="Arial" panose="020B0604020202020204" pitchFamily="34" charset="0"/>
+              <a:buChar char="•"/>
+            </a:pPr>
             <a:endParaRPr lang="en-US" dirty="0"/>
           </a:p>
         </p:txBody>
@@ -1262,17 +1374,26 @@
           <a:lstStyle/>
           <a:p>
             <a:fld id="{B8B3BC3C-0900-4ACD-9030-5BE6C2442A68}" type="slidenum">
-              <a:rPr lang="en-US" smtClean="0"/>
+              <a:rPr lang="en-US" smtClean="0">
+                <a:solidFill>
+                  <a:prstClr val="black"/>
+                </a:solidFill>
+              </a:rPr>
+              <a:pPr/>
               <a:t>14</a:t>
             </a:fld>
-            <a:endParaRPr lang="en-US" dirty="0"/>
+            <a:endParaRPr lang="en-US" dirty="0">
+              <a:solidFill>
+                <a:prstClr val="black"/>
+              </a:solidFill>
+            </a:endParaRPr>
           </a:p>
         </p:txBody>
       </p:sp>
     </p:spTree>
     <p:extLst>
       <p:ext uri="{BB962C8B-B14F-4D97-AF65-F5344CB8AC3E}">
-        <p14:creationId xmlns:p14="http://schemas.microsoft.com/office/powerpoint/2010/main" val="3352367101"/>
+        <p14:creationId xmlns:p14="http://schemas.microsoft.com/office/powerpoint/2010/main" val="1992650313"/>
       </p:ext>
     </p:extLst>
   </p:cSld>
@@ -1410,22 +1531,6 @@
           <a:bodyPr/>
           <a:lstStyle/>
           <a:p>
-            <a:r>
-              <a:rPr lang="en-US" dirty="0" smtClean="0"/>
-              <a:t>Mention</a:t>
-            </a:r>
-            <a:r>
-              <a:rPr lang="en-US" baseline="0" dirty="0" smtClean="0"/>
-              <a:t> that we didn’t do any testing on # of keystrokes entered or % of times </a:t>
-            </a:r>
-            <a:r>
-              <a:rPr lang="en-US" baseline="0" dirty="0" err="1" smtClean="0"/>
-              <a:t>teminal</a:t>
-            </a:r>
-            <a:r>
-              <a:rPr lang="en-US" baseline="0" dirty="0" smtClean="0"/>
-              <a:t> was spawned because there were too many variables for the measurements to be useful. Such as hardware performance, delay &amp; optimization of Teensy code. Also it is an implementation specific problem.</a:t>
-            </a:r>
             <a:endParaRPr lang="en-US" dirty="0"/>
           </a:p>
         </p:txBody>
@@ -1678,7 +1783,44 @@
           <a:bodyPr/>
           <a:lstStyle/>
           <a:p>
-            <a:endParaRPr lang="en-US" dirty="0"/>
+            <a:r>
+              <a:rPr lang="en-US" dirty="0" smtClean="0"/>
+              <a:t>Extra details of the test: Teensy set to emulate a keyboard, mouse, and joystick (all USB-HIDs)</a:t>
+            </a:r>
+          </a:p>
+          <a:p>
+            <a:endParaRPr lang="en-US" dirty="0" smtClean="0"/>
+          </a:p>
+          <a:p>
+            <a:r>
+              <a:rPr lang="en-US" b="1" dirty="0" smtClean="0"/>
+              <a:t>Limitations of testing:</a:t>
+            </a:r>
+            <a:r>
+              <a:rPr lang="en-US" b="1" baseline="0" dirty="0" smtClean="0"/>
+              <a:t> no testing done for keyboard based attack on the # of keystrokes entered into the terminal or the % of time that the terminal is spawned</a:t>
+            </a:r>
+          </a:p>
+          <a:p>
+            <a:pPr marL="171450" indent="-171450">
+              <a:buFont typeface="Arial" panose="020B0604020202020204" pitchFamily="34" charset="0"/>
+              <a:buChar char="•"/>
+            </a:pPr>
+            <a:r>
+              <a:rPr lang="en-US" b="1" baseline="0" dirty="0" smtClean="0"/>
+              <a:t>Results inconsistent due to variables such as hardware performance, CPU usage, and delay/optimization of Teensy attack code</a:t>
+            </a:r>
+          </a:p>
+          <a:p>
+            <a:pPr marL="171450" indent="-171450">
+              <a:buFont typeface="Arial" panose="020B0604020202020204" pitchFamily="34" charset="0"/>
+              <a:buChar char="•"/>
+            </a:pPr>
+            <a:r>
+              <a:rPr lang="en-US" b="1" baseline="0" dirty="0" smtClean="0"/>
+              <a:t>Implementation specific problem</a:t>
+            </a:r>
+            <a:endParaRPr lang="en-US" b="1" dirty="0" smtClean="0"/>
           </a:p>
         </p:txBody>
       </p:sp>
@@ -1708,7 +1850,7 @@
     </p:spTree>
     <p:extLst>
       <p:ext uri="{BB962C8B-B14F-4D97-AF65-F5344CB8AC3E}">
-        <p14:creationId xmlns:p14="http://schemas.microsoft.com/office/powerpoint/2010/main" val="3352367101"/>
+        <p14:creationId xmlns:p14="http://schemas.microsoft.com/office/powerpoint/2010/main" val="1593025356"/>
       </p:ext>
     </p:extLst>
   </p:cSld>
@@ -1846,7 +1988,137 @@
           <a:bodyPr/>
           <a:lstStyle/>
           <a:p>
-            <a:endParaRPr lang="en-US" dirty="0"/>
+            <a:r>
+              <a:rPr lang="en-US" u="sng" dirty="0" smtClean="0"/>
+              <a:t>Extra Notes</a:t>
+            </a:r>
+            <a:r>
+              <a:rPr lang="en-US" u="none" dirty="0" smtClean="0"/>
+              <a:t>:</a:t>
+            </a:r>
+            <a:r>
+              <a:rPr lang="en-US" u="none" baseline="0" dirty="0" smtClean="0"/>
+              <a:t> </a:t>
+            </a:r>
+            <a:r>
+              <a:rPr lang="en-US" b="1" u="none" baseline="0" dirty="0" smtClean="0"/>
+              <a:t>suggested improvements/corrections to these technical weakness are proposed in the next slide</a:t>
+            </a:r>
+            <a:endParaRPr lang="en-US" b="1" u="sng" dirty="0" smtClean="0"/>
+          </a:p>
+          <a:p>
+            <a:pPr marL="171450" indent="-171450">
+              <a:buFont typeface="Arial" panose="020B0604020202020204" pitchFamily="34" charset="0"/>
+              <a:buChar char="•"/>
+            </a:pPr>
+            <a:r>
+              <a:rPr lang="en-US" u="none" baseline="0" dirty="0" smtClean="0"/>
+              <a:t>Weaknesses revealed via testing:</a:t>
+            </a:r>
+          </a:p>
+          <a:p>
+            <a:pPr marL="628650" lvl="1" indent="-171450">
+              <a:buFont typeface="Arial" panose="020B0604020202020204" pitchFamily="34" charset="0"/>
+              <a:buChar char="•"/>
+            </a:pPr>
+            <a:r>
+              <a:rPr lang="en-US" u="none" baseline="0" dirty="0" smtClean="0"/>
+              <a:t>Bullet #1: see experimental results related to the emulated HID </a:t>
+            </a:r>
+            <a:r>
+              <a:rPr lang="en-US" u="none" baseline="0" dirty="0" smtClean="0">
+                <a:sym typeface="Wingdings" panose="05000000000000000000" pitchFamily="2" charset="2"/>
+              </a:rPr>
+              <a:t> delay allows the Teensy to execute some commands before the restrictions are imposed and the CAPTCHA GUI loads and grabs focus</a:t>
+            </a:r>
+          </a:p>
+          <a:p>
+            <a:pPr marL="628650" lvl="1" indent="-171450">
+              <a:buFont typeface="Arial" panose="020B0604020202020204" pitchFamily="34" charset="0"/>
+              <a:buChar char="•"/>
+            </a:pPr>
+            <a:r>
+              <a:rPr lang="en-US" u="none" baseline="0" dirty="0" smtClean="0">
+                <a:sym typeface="Wingdings" panose="05000000000000000000" pitchFamily="2" charset="2"/>
+              </a:rPr>
+              <a:t>Bullet #2: N/A</a:t>
+            </a:r>
+          </a:p>
+          <a:p>
+            <a:pPr marL="171450" lvl="0" indent="-171450">
+              <a:buFont typeface="Arial" panose="020B0604020202020204" pitchFamily="34" charset="0"/>
+              <a:buChar char="•"/>
+            </a:pPr>
+            <a:r>
+              <a:rPr lang="en-US" u="none" dirty="0" smtClean="0"/>
+              <a:t>Consequences</a:t>
+            </a:r>
+            <a:r>
+              <a:rPr lang="en-US" u="none" baseline="0" dirty="0" smtClean="0"/>
+              <a:t> of using any connected keyboard or mouse:</a:t>
+            </a:r>
+          </a:p>
+          <a:p>
+            <a:pPr marL="628650" lvl="1" indent="-171450">
+              <a:buFont typeface="Arial" panose="020B0604020202020204" pitchFamily="34" charset="0"/>
+              <a:buChar char="•"/>
+            </a:pPr>
+            <a:r>
+              <a:rPr lang="en-US" u="none" baseline="0" dirty="0" smtClean="0"/>
+              <a:t>Users may complete the CAPTCHA for an emulated HID if they fail to heed warning about completing the validation for malicious devices</a:t>
+            </a:r>
+          </a:p>
+          <a:p>
+            <a:pPr marL="171450" lvl="0" indent="-171450">
+              <a:buFont typeface="Arial" panose="020B0604020202020204" pitchFamily="34" charset="0"/>
+              <a:buChar char="•"/>
+            </a:pPr>
+            <a:r>
+              <a:rPr lang="en-US" b="1" u="none" baseline="0" dirty="0" smtClean="0"/>
+              <a:t>(Out of Scope)</a:t>
+            </a:r>
+            <a:r>
+              <a:rPr lang="en-US" b="0" u="none" baseline="0" dirty="0" smtClean="0"/>
+              <a:t> </a:t>
+            </a:r>
+          </a:p>
+          <a:p>
+            <a:pPr marL="628650" lvl="1" indent="-171450">
+              <a:buFont typeface="Arial" panose="020B0604020202020204" pitchFamily="34" charset="0"/>
+              <a:buChar char="•"/>
+            </a:pPr>
+            <a:r>
+              <a:rPr lang="en-US" b="0" u="none" baseline="0" dirty="0" smtClean="0"/>
+              <a:t>Example: embed Teensy microcontroller with an attack loaded into a real keyboard</a:t>
+            </a:r>
+          </a:p>
+          <a:p>
+            <a:pPr marL="628650" lvl="1" indent="-171450">
+              <a:buFont typeface="Arial" panose="020B0604020202020204" pitchFamily="34" charset="0"/>
+              <a:buChar char="•"/>
+            </a:pPr>
+            <a:r>
+              <a:rPr lang="en-US" b="0" u="none" baseline="0" dirty="0" smtClean="0"/>
+              <a:t>Scenario: user plugs in the keyboard with the embedded Teensy and completes the CAPTCHA GUI</a:t>
+            </a:r>
+          </a:p>
+          <a:p>
+            <a:pPr marL="628650" lvl="1" indent="-171450">
+              <a:buFont typeface="Arial" panose="020B0604020202020204" pitchFamily="34" charset="0"/>
+              <a:buChar char="•"/>
+            </a:pPr>
+            <a:r>
+              <a:rPr lang="en-US" b="0" u="none" baseline="0" dirty="0" smtClean="0"/>
+              <a:t>Consequences: Teensy can begin executing attack commands after the CAPTCHA is completed by the human user</a:t>
+            </a:r>
+            <a:endParaRPr lang="en-US" b="1" u="none" baseline="0" dirty="0" smtClean="0"/>
+          </a:p>
+          <a:p>
+            <a:pPr marL="628650" lvl="1" indent="-171450">
+              <a:buFont typeface="Arial" panose="020B0604020202020204" pitchFamily="34" charset="0"/>
+              <a:buChar char="•"/>
+            </a:pPr>
+            <a:endParaRPr lang="en-US" u="none" dirty="0"/>
           </a:p>
         </p:txBody>
       </p:sp>
@@ -1868,6 +2140,295 @@
             <a:fld id="{B8B3BC3C-0900-4ACD-9030-5BE6C2442A68}" type="slidenum">
               <a:rPr lang="en-US" smtClean="0"/>
               <a:t>20</a:t>
+            </a:fld>
+            <a:endParaRPr lang="en-US" dirty="0"/>
+          </a:p>
+        </p:txBody>
+      </p:sp>
+    </p:spTree>
+    <p:extLst>
+      <p:ext uri="{BB962C8B-B14F-4D97-AF65-F5344CB8AC3E}">
+        <p14:creationId xmlns:p14="http://schemas.microsoft.com/office/powerpoint/2010/main" val="3352367101"/>
+      </p:ext>
+    </p:extLst>
+  </p:cSld>
+  <p:clrMapOvr>
+    <a:masterClrMapping/>
+  </p:clrMapOvr>
+</p:notes>
+</file>
+
+<file path=ppt/notesSlides/notesSlide21.xml><?xml version="1.0" encoding="utf-8"?>
+<p:notes xmlns:a="http://schemas.openxmlformats.org/drawingml/2006/main" xmlns:r="http://schemas.openxmlformats.org/officeDocument/2006/relationships" xmlns:p="http://schemas.openxmlformats.org/presentationml/2006/main">
+  <p:cSld>
+    <p:spTree>
+      <p:nvGrpSpPr>
+        <p:cNvPr id="1" name=""/>
+        <p:cNvGrpSpPr/>
+        <p:nvPr/>
+      </p:nvGrpSpPr>
+      <p:grpSpPr>
+        <a:xfrm>
+          <a:off x="0" y="0"/>
+          <a:ext cx="0" cy="0"/>
+          <a:chOff x="0" y="0"/>
+          <a:chExt cx="0" cy="0"/>
+        </a:xfrm>
+      </p:grpSpPr>
+      <p:sp>
+        <p:nvSpPr>
+          <p:cNvPr id="2" name="Slide Image Placeholder 1"/>
+          <p:cNvSpPr>
+            <a:spLocks noGrp="1" noRot="1" noChangeAspect="1"/>
+          </p:cNvSpPr>
+          <p:nvPr>
+            <p:ph type="sldImg"/>
+          </p:nvPr>
+        </p:nvSpPr>
+        <p:spPr/>
+      </p:sp>
+      <p:sp>
+        <p:nvSpPr>
+          <p:cNvPr id="3" name="Notes Placeholder 2"/>
+          <p:cNvSpPr>
+            <a:spLocks noGrp="1"/>
+          </p:cNvSpPr>
+          <p:nvPr>
+            <p:ph type="body" idx="1"/>
+          </p:nvPr>
+        </p:nvSpPr>
+        <p:spPr/>
+        <p:txBody>
+          <a:bodyPr/>
+          <a:lstStyle/>
+          <a:p>
+            <a:r>
+              <a:rPr lang="en-US" u="sng" dirty="0" smtClean="0"/>
+              <a:t>Extra Notes</a:t>
+            </a:r>
+          </a:p>
+          <a:p>
+            <a:pPr marL="171450" indent="-171450">
+              <a:buFont typeface="Arial" panose="020B0604020202020204" pitchFamily="34" charset="0"/>
+              <a:buChar char="•"/>
+            </a:pPr>
+            <a:r>
+              <a:rPr lang="en-US" u="none" baseline="0" dirty="0" smtClean="0"/>
+              <a:t>CAPTCHA Improvements: N/A</a:t>
+            </a:r>
+          </a:p>
+          <a:p>
+            <a:pPr marL="171450" marR="0" lvl="1" indent="-171450" algn="l" defTabSz="914400" rtl="0" eaLnBrk="1" fontAlgn="auto" latinLnBrk="0" hangingPunct="1">
+              <a:lnSpc>
+                <a:spcPct val="100000"/>
+              </a:lnSpc>
+              <a:spcBef>
+                <a:spcPts val="0"/>
+              </a:spcBef>
+              <a:spcAft>
+                <a:spcPts val="0"/>
+              </a:spcAft>
+              <a:buClrTx/>
+              <a:buSzTx/>
+              <a:buFont typeface="Arial" panose="020B0604020202020204" pitchFamily="34" charset="0"/>
+              <a:buChar char="•"/>
+              <a:tabLst/>
+              <a:defRPr/>
+            </a:pPr>
+            <a:r>
+              <a:rPr lang="en-US" u="none" baseline="0" dirty="0" smtClean="0"/>
+              <a:t>Driver Modification Improvements: </a:t>
+            </a:r>
+            <a:r>
+              <a:rPr lang="en-US" b="1" u="none" baseline="0" dirty="0" smtClean="0"/>
+              <a:t>Overall idea = port all user-space calls to the C driver code (kernel mode)</a:t>
+            </a:r>
+            <a:endParaRPr lang="en-US" u="none" baseline="0" dirty="0" smtClean="0"/>
+          </a:p>
+          <a:p>
+            <a:pPr marL="628650" lvl="1" indent="-171450">
+              <a:buFont typeface="Arial" panose="020B0604020202020204" pitchFamily="34" charset="0"/>
+              <a:buChar char="•"/>
+            </a:pPr>
+            <a:r>
+              <a:rPr lang="en-US" b="0" u="none" baseline="0" dirty="0" smtClean="0"/>
+              <a:t>Structures:</a:t>
+            </a:r>
+          </a:p>
+          <a:p>
+            <a:pPr marL="1085850" lvl="2" indent="-171450">
+              <a:buFont typeface="Arial" panose="020B0604020202020204" pitchFamily="34" charset="0"/>
+              <a:buChar char="•"/>
+            </a:pPr>
+            <a:r>
+              <a:rPr lang="en-US" b="0" u="none" baseline="0" dirty="0" smtClean="0"/>
+              <a:t>Array identified in the usbkbd file that represents keyboard mapping</a:t>
+            </a:r>
+          </a:p>
+          <a:p>
+            <a:pPr marL="1085850" lvl="2" indent="-171450">
+              <a:buFont typeface="Arial" panose="020B0604020202020204" pitchFamily="34" charset="0"/>
+              <a:buChar char="•"/>
+            </a:pPr>
+            <a:r>
+              <a:rPr lang="en-US" b="0" u="none" baseline="0" dirty="0" smtClean="0"/>
+              <a:t>#defines identified for the usbmouse file that represent mouse button mappings</a:t>
+            </a:r>
+          </a:p>
+          <a:p>
+            <a:pPr marL="628650" lvl="1" indent="-171450">
+              <a:buFont typeface="Arial" panose="020B0604020202020204" pitchFamily="34" charset="0"/>
+              <a:buChar char="•"/>
+            </a:pPr>
+            <a:r>
+              <a:rPr lang="en-US" b="0" u="none" baseline="0" dirty="0" smtClean="0"/>
+              <a:t>Modifications: use the input_report_key to ensure that the value of the key or button is not passed when hit/clicked if restricted</a:t>
+            </a:r>
+          </a:p>
+          <a:p>
+            <a:pPr marL="628650" lvl="1" indent="-171450">
+              <a:buFont typeface="Arial" panose="020B0604020202020204" pitchFamily="34" charset="0"/>
+              <a:buChar char="•"/>
+            </a:pPr>
+            <a:r>
+              <a:rPr lang="en-US" b="0" u="none" baseline="0" dirty="0" smtClean="0"/>
+              <a:t>For bullet #2: system log shows that the system differentiates between each peripheral that is connected</a:t>
+            </a:r>
+          </a:p>
+          <a:p>
+            <a:pPr marL="171450" indent="-171450">
+              <a:buFont typeface="Arial" panose="020B0604020202020204" pitchFamily="34" charset="0"/>
+              <a:buChar char="•"/>
+            </a:pPr>
+            <a:r>
+              <a:rPr lang="en-US" u="none" baseline="0" dirty="0" smtClean="0"/>
+              <a:t>Driver Installation:</a:t>
+            </a:r>
+          </a:p>
+          <a:p>
+            <a:pPr marL="628650" lvl="1" indent="-171450">
+              <a:buFont typeface="Arial" panose="020B0604020202020204" pitchFamily="34" charset="0"/>
+              <a:buChar char="•"/>
+            </a:pPr>
+            <a:r>
+              <a:rPr lang="en-US" u="none" baseline="0" dirty="0" smtClean="0"/>
+              <a:t>Install the script for ever user OR dynamically configure the script based on the current user</a:t>
+            </a:r>
+          </a:p>
+          <a:p>
+            <a:pPr marL="628650" lvl="1" indent="-171450">
+              <a:buFont typeface="Arial" panose="020B0604020202020204" pitchFamily="34" charset="0"/>
+              <a:buChar char="•"/>
+            </a:pPr>
+            <a:r>
+              <a:rPr lang="en-US" u="none" baseline="0" dirty="0" smtClean="0"/>
+              <a:t>Issue to overcome: Guest Session</a:t>
+            </a:r>
+          </a:p>
+        </p:txBody>
+      </p:sp>
+      <p:sp>
+        <p:nvSpPr>
+          <p:cNvPr id="4" name="Slide Number Placeholder 3"/>
+          <p:cNvSpPr>
+            <a:spLocks noGrp="1"/>
+          </p:cNvSpPr>
+          <p:nvPr>
+            <p:ph type="sldNum" sz="quarter" idx="10"/>
+          </p:nvPr>
+        </p:nvSpPr>
+        <p:spPr/>
+        <p:txBody>
+          <a:bodyPr/>
+          <a:lstStyle/>
+          <a:p>
+            <a:fld id="{B8B3BC3C-0900-4ACD-9030-5BE6C2442A68}" type="slidenum">
+              <a:rPr lang="en-US" smtClean="0"/>
+              <a:t>21</a:t>
+            </a:fld>
+            <a:endParaRPr lang="en-US" dirty="0"/>
+          </a:p>
+        </p:txBody>
+      </p:sp>
+    </p:spTree>
+    <p:extLst>
+      <p:ext uri="{BB962C8B-B14F-4D97-AF65-F5344CB8AC3E}">
+        <p14:creationId xmlns:p14="http://schemas.microsoft.com/office/powerpoint/2010/main" val="3352367101"/>
+      </p:ext>
+    </p:extLst>
+  </p:cSld>
+  <p:clrMapOvr>
+    <a:masterClrMapping/>
+  </p:clrMapOvr>
+</p:notes>
+</file>
+
+<file path=ppt/notesSlides/notesSlide22.xml><?xml version="1.0" encoding="utf-8"?>
+<p:notes xmlns:a="http://schemas.openxmlformats.org/drawingml/2006/main" xmlns:r="http://schemas.openxmlformats.org/officeDocument/2006/relationships" xmlns:p="http://schemas.openxmlformats.org/presentationml/2006/main">
+  <p:cSld>
+    <p:spTree>
+      <p:nvGrpSpPr>
+        <p:cNvPr id="1" name=""/>
+        <p:cNvGrpSpPr/>
+        <p:nvPr/>
+      </p:nvGrpSpPr>
+      <p:grpSpPr>
+        <a:xfrm>
+          <a:off x="0" y="0"/>
+          <a:ext cx="0" cy="0"/>
+          <a:chOff x="0" y="0"/>
+          <a:chExt cx="0" cy="0"/>
+        </a:xfrm>
+      </p:grpSpPr>
+      <p:sp>
+        <p:nvSpPr>
+          <p:cNvPr id="2" name="Slide Image Placeholder 1"/>
+          <p:cNvSpPr>
+            <a:spLocks noGrp="1" noRot="1" noChangeAspect="1"/>
+          </p:cNvSpPr>
+          <p:nvPr>
+            <p:ph type="sldImg"/>
+          </p:nvPr>
+        </p:nvSpPr>
+        <p:spPr/>
+      </p:sp>
+      <p:sp>
+        <p:nvSpPr>
+          <p:cNvPr id="3" name="Notes Placeholder 2"/>
+          <p:cNvSpPr>
+            <a:spLocks noGrp="1"/>
+          </p:cNvSpPr>
+          <p:nvPr>
+            <p:ph type="body" idx="1"/>
+          </p:nvPr>
+        </p:nvSpPr>
+        <p:spPr/>
+        <p:txBody>
+          <a:bodyPr/>
+          <a:lstStyle/>
+          <a:p>
+            <a:endParaRPr lang="en-US" dirty="0"/>
+          </a:p>
+        </p:txBody>
+      </p:sp>
+      <p:sp>
+        <p:nvSpPr>
+          <p:cNvPr id="4" name="Slide Number Placeholder 3"/>
+          <p:cNvSpPr>
+            <a:spLocks noGrp="1"/>
+          </p:cNvSpPr>
+          <p:nvPr>
+            <p:ph type="sldNum" sz="quarter" idx="10"/>
+          </p:nvPr>
+        </p:nvSpPr>
+        <p:spPr/>
+        <p:txBody>
+          <a:bodyPr/>
+          <a:lstStyle/>
+          <a:p>
+            <a:fld id="{B8B3BC3C-0900-4ACD-9030-5BE6C2442A68}" type="slidenum">
+              <a:rPr lang="en-US" smtClean="0"/>
+              <a:t>22</a:t>
             </a:fld>
             <a:endParaRPr lang="en-US" dirty="0"/>
           </a:p>
@@ -7101,11 +7662,7 @@
           <a:p>
             <a:r>
               <a:rPr lang="en-US" dirty="0" smtClean="0"/>
-              <a:t>Teensy </a:t>
-            </a:r>
-            <a:r>
-              <a:rPr lang="en-US" dirty="0" smtClean="0"/>
-              <a:t>Attacks</a:t>
+              <a:t>Teensy Attacks</a:t>
             </a:r>
             <a:endParaRPr lang="en-US" dirty="0"/>
           </a:p>
@@ -7233,7 +7790,6 @@
               <a:rPr lang="en-US" dirty="0" smtClean="0"/>
               <a:t>Open terminal without special keyboard keys</a:t>
             </a:r>
-            <a:endParaRPr lang="en-US" dirty="0" smtClean="0"/>
           </a:p>
         </p:txBody>
       </p:sp>
@@ -8075,145 +8631,129 @@
           <a:chExt cx="0" cy="0"/>
         </a:xfrm>
       </p:grpSpPr>
-      <p:pic>
-        <p:nvPicPr>
-          <p:cNvPr id="4" name="Content Placeholder 3"/>
-          <p:cNvPicPr>
-            <a:picLocks noGrp="1" noChangeAspect="1"/>
-          </p:cNvPicPr>
+      <p:sp>
+        <p:nvSpPr>
+          <p:cNvPr id="2" name="Title 1"/>
+          <p:cNvSpPr>
+            <a:spLocks noGrp="1"/>
+          </p:cNvSpPr>
+          <p:nvPr>
+            <p:ph type="title"/>
+          </p:nvPr>
+        </p:nvSpPr>
+        <p:spPr/>
+        <p:txBody>
+          <a:bodyPr/>
+          <a:lstStyle/>
+          <a:p>
+            <a:r>
+              <a:rPr lang="en-US" dirty="0" smtClean="0"/>
+              <a:t>Kernel: </a:t>
+            </a:r>
+            <a:r>
+              <a:rPr lang="en-US" dirty="0" smtClean="0"/>
+              <a:t>Summary</a:t>
+            </a:r>
+            <a:endParaRPr lang="en-US" dirty="0"/>
+          </a:p>
+        </p:txBody>
+      </p:sp>
+      <p:sp>
+        <p:nvSpPr>
+          <p:cNvPr id="3" name="Content Placeholder 2"/>
+          <p:cNvSpPr>
+            <a:spLocks noGrp="1"/>
+          </p:cNvSpPr>
           <p:nvPr>
             <p:ph idx="1"/>
           </p:nvPr>
-        </p:nvPicPr>
-        <p:blipFill>
-          <a:blip r:embed="rId3">
-            <a:extLst>
-              <a:ext uri="{28A0092B-C50C-407E-A947-70E740481C1C}">
-                <a14:useLocalDpi xmlns:a14="http://schemas.microsoft.com/office/drawing/2010/main" val="0"/>
-              </a:ext>
-            </a:extLst>
-          </a:blip>
-          <a:stretch>
-            <a:fillRect/>
-          </a:stretch>
-        </p:blipFill>
+        </p:nvSpPr>
         <p:spPr>
           <a:xfrm>
-            <a:off x="2138666" y="1412130"/>
-            <a:ext cx="4866667" cy="4076190"/>
+            <a:off x="457200" y="1481328"/>
+            <a:ext cx="8229600" cy="4386071"/>
           </a:xfrm>
         </p:spPr>
-      </p:pic>
-      <p:sp>
-        <p:nvSpPr>
-          <p:cNvPr id="2" name="Title 1"/>
-          <p:cNvSpPr>
-            <a:spLocks noGrp="1"/>
-          </p:cNvSpPr>
-          <p:nvPr>
-            <p:ph type="title"/>
-          </p:nvPr>
-        </p:nvSpPr>
-        <p:spPr/>
         <p:txBody>
           <a:bodyPr/>
           <a:lstStyle/>
           <a:p>
             <a:r>
               <a:rPr lang="en-US" dirty="0" smtClean="0"/>
-              <a:t>Kernel: Makefile Modification</a:t>
+              <a:t>Development OS: Ubuntu 14.04 LTS</a:t>
+            </a:r>
+          </a:p>
+          <a:p>
+            <a:pPr lvl="1"/>
+            <a:r>
+              <a:rPr lang="en-US" dirty="0" smtClean="0"/>
+              <a:t>Kernel Versions: 3.13.0-x</a:t>
+            </a:r>
+          </a:p>
+          <a:p>
+            <a:pPr marL="393192" lvl="1" indent="0">
+              <a:buNone/>
+            </a:pPr>
+            <a:endParaRPr lang="en-US" dirty="0" smtClean="0"/>
+          </a:p>
+          <a:p>
+            <a:r>
+              <a:rPr lang="en-US" dirty="0" smtClean="0"/>
+              <a:t>Source code for development from </a:t>
+            </a:r>
+            <a:r>
+              <a:rPr lang="en-US" dirty="0" smtClean="0">
+                <a:hlinkClick r:id="rId3"/>
+              </a:rPr>
+              <a:t>https://www.kernel.org</a:t>
+            </a:r>
+            <a:r>
+              <a:rPr lang="en-US" dirty="0" smtClean="0"/>
+              <a:t> </a:t>
+            </a:r>
+          </a:p>
+          <a:p>
+            <a:pPr lvl="1"/>
+            <a:r>
+              <a:rPr lang="en-US" dirty="0" smtClean="0"/>
+              <a:t>Source Version: 3.19.3</a:t>
+            </a:r>
+          </a:p>
+          <a:p>
+            <a:pPr marL="393192" lvl="1" indent="0">
+              <a:buNone/>
+            </a:pPr>
+            <a:endParaRPr lang="en-US" dirty="0" smtClean="0"/>
+          </a:p>
+          <a:p>
+            <a:r>
+              <a:rPr lang="en-US" dirty="0" smtClean="0"/>
+              <a:t>Driver modified: usbhid</a:t>
+            </a:r>
+          </a:p>
+          <a:p>
+            <a:pPr lvl="1"/>
+            <a:r>
+              <a:rPr lang="en-US" dirty="0" smtClean="0"/>
+              <a:t>Applies to all USB human </a:t>
+            </a:r>
+            <a:r>
+              <a:rPr lang="en-US" dirty="0"/>
+              <a:t>i</a:t>
+            </a:r>
+            <a:r>
+              <a:rPr lang="en-US" dirty="0" smtClean="0"/>
+              <a:t>nterface </a:t>
+            </a:r>
+            <a:r>
+              <a:rPr lang="en-US" dirty="0"/>
+              <a:t>d</a:t>
+            </a:r>
+            <a:r>
+              <a:rPr lang="en-US" dirty="0" smtClean="0"/>
+              <a:t>evices</a:t>
             </a:r>
             <a:endParaRPr lang="en-US" dirty="0"/>
-          </a:p>
-        </p:txBody>
-      </p:sp>
-      <p:sp>
-        <p:nvSpPr>
-          <p:cNvPr id="5" name="Rectangle 4"/>
-          <p:cNvSpPr/>
-          <p:nvPr/>
-        </p:nvSpPr>
-        <p:spPr>
-          <a:xfrm>
-            <a:off x="2362198" y="1412130"/>
-            <a:ext cx="4795533" cy="340470"/>
-          </a:xfrm>
-          <a:prstGeom prst="rect">
-            <a:avLst/>
-          </a:prstGeom>
-          <a:noFill/>
-          <a:ln w="19050"/>
-          <a:effectLst/>
-        </p:spPr>
-        <p:style>
-          <a:lnRef idx="1">
-            <a:schemeClr val="accent2"/>
-          </a:lnRef>
-          <a:fillRef idx="2">
-            <a:schemeClr val="accent2"/>
-          </a:fillRef>
-          <a:effectRef idx="1">
-            <a:schemeClr val="accent2"/>
-          </a:effectRef>
-          <a:fontRef idx="minor">
-            <a:schemeClr val="dk1"/>
-          </a:fontRef>
-        </p:style>
-        <p:txBody>
-          <a:bodyPr rtlCol="0" anchor="ctr"/>
-          <a:lstStyle/>
-          <a:p>
-            <a:pPr algn="ctr"/>
-            <a:endParaRPr lang="en-US" dirty="0">
-              <a:solidFill>
-                <a:prstClr val="black"/>
-              </a:solidFill>
-            </a:endParaRPr>
-          </a:p>
-        </p:txBody>
-      </p:sp>
-      <p:sp>
-        <p:nvSpPr>
-          <p:cNvPr id="7" name="Rectangle 6"/>
-          <p:cNvSpPr/>
-          <p:nvPr/>
-        </p:nvSpPr>
-        <p:spPr>
-          <a:xfrm>
-            <a:off x="2362199" y="4419600"/>
-            <a:ext cx="4795533" cy="838200"/>
-          </a:xfrm>
-          <a:prstGeom prst="rect">
-            <a:avLst/>
-          </a:prstGeom>
-          <a:noFill/>
-          <a:ln w="19050"/>
-          <a:effectLst/>
-        </p:spPr>
-        <p:style>
-          <a:lnRef idx="1">
-            <a:schemeClr val="accent2"/>
-          </a:lnRef>
-          <a:fillRef idx="2">
-            <a:schemeClr val="accent2"/>
-          </a:fillRef>
-          <a:effectRef idx="1">
-            <a:schemeClr val="accent2"/>
-          </a:effectRef>
-          <a:fontRef idx="minor">
-            <a:schemeClr val="dk1"/>
-          </a:fontRef>
-        </p:style>
-        <p:txBody>
-          <a:bodyPr rtlCol="0" anchor="ctr"/>
-          <a:lstStyle/>
-          <a:p>
-            <a:pPr algn="ctr"/>
-            <a:endParaRPr lang="en-US" dirty="0">
-              <a:solidFill>
-                <a:prstClr val="black"/>
-              </a:solidFill>
-            </a:endParaRPr>
           </a:p>
         </p:txBody>
       </p:sp>
@@ -8254,6 +8794,193 @@
           <a:chExt cx="0" cy="0"/>
         </a:xfrm>
       </p:grpSpPr>
+      <p:pic>
+        <p:nvPicPr>
+          <p:cNvPr id="4" name="Content Placeholder 3"/>
+          <p:cNvPicPr>
+            <a:picLocks noGrp="1" noChangeAspect="1"/>
+          </p:cNvPicPr>
+          <p:nvPr>
+            <p:ph idx="1"/>
+          </p:nvPr>
+        </p:nvPicPr>
+        <p:blipFill>
+          <a:blip r:embed="rId3">
+            <a:extLst>
+              <a:ext uri="{28A0092B-C50C-407E-A947-70E740481C1C}">
+                <a14:useLocalDpi xmlns:a14="http://schemas.microsoft.com/office/drawing/2010/main" val="0"/>
+              </a:ext>
+            </a:extLst>
+          </a:blip>
+          <a:stretch>
+            <a:fillRect/>
+          </a:stretch>
+        </p:blipFill>
+        <p:spPr>
+          <a:xfrm>
+            <a:off x="2138666" y="1412130"/>
+            <a:ext cx="4866667" cy="4076190"/>
+          </a:xfrm>
+        </p:spPr>
+      </p:pic>
+      <p:sp>
+        <p:nvSpPr>
+          <p:cNvPr id="2" name="Title 1"/>
+          <p:cNvSpPr>
+            <a:spLocks noGrp="1"/>
+          </p:cNvSpPr>
+          <p:nvPr>
+            <p:ph type="title"/>
+          </p:nvPr>
+        </p:nvSpPr>
+        <p:spPr/>
+        <p:txBody>
+          <a:bodyPr/>
+          <a:lstStyle/>
+          <a:p>
+            <a:r>
+              <a:rPr lang="en-US" dirty="0" smtClean="0"/>
+              <a:t>Kernel: </a:t>
+            </a:r>
+            <a:r>
+              <a:rPr lang="en-US" dirty="0" smtClean="0"/>
+              <a:t>Makefile </a:t>
+            </a:r>
+            <a:r>
+              <a:rPr lang="en-US" dirty="0" smtClean="0"/>
+              <a:t>Modification</a:t>
+            </a:r>
+            <a:endParaRPr lang="en-US" dirty="0"/>
+          </a:p>
+        </p:txBody>
+      </p:sp>
+      <p:sp>
+        <p:nvSpPr>
+          <p:cNvPr id="5" name="Rectangle 4"/>
+          <p:cNvSpPr/>
+          <p:nvPr/>
+        </p:nvSpPr>
+        <p:spPr>
+          <a:xfrm>
+            <a:off x="2362198" y="1412130"/>
+            <a:ext cx="4795533" cy="340470"/>
+          </a:xfrm>
+          <a:prstGeom prst="rect">
+            <a:avLst/>
+          </a:prstGeom>
+          <a:noFill/>
+          <a:ln w="19050"/>
+          <a:effectLst/>
+        </p:spPr>
+        <p:style>
+          <a:lnRef idx="1">
+            <a:schemeClr val="accent2"/>
+          </a:lnRef>
+          <a:fillRef idx="2">
+            <a:schemeClr val="accent2"/>
+          </a:fillRef>
+          <a:effectRef idx="1">
+            <a:schemeClr val="accent2"/>
+          </a:effectRef>
+          <a:fontRef idx="minor">
+            <a:schemeClr val="dk1"/>
+          </a:fontRef>
+        </p:style>
+        <p:txBody>
+          <a:bodyPr rtlCol="0" anchor="ctr"/>
+          <a:lstStyle/>
+          <a:p>
+            <a:pPr algn="ctr"/>
+            <a:endParaRPr lang="en-US" dirty="0">
+              <a:solidFill>
+                <a:prstClr val="black"/>
+              </a:solidFill>
+            </a:endParaRPr>
+          </a:p>
+        </p:txBody>
+      </p:sp>
+      <p:sp>
+        <p:nvSpPr>
+          <p:cNvPr id="7" name="Rectangle 6"/>
+          <p:cNvSpPr/>
+          <p:nvPr/>
+        </p:nvSpPr>
+        <p:spPr>
+          <a:xfrm>
+            <a:off x="2362199" y="4419600"/>
+            <a:ext cx="4795533" cy="838200"/>
+          </a:xfrm>
+          <a:prstGeom prst="rect">
+            <a:avLst/>
+          </a:prstGeom>
+          <a:noFill/>
+          <a:ln w="19050"/>
+          <a:effectLst/>
+        </p:spPr>
+        <p:style>
+          <a:lnRef idx="1">
+            <a:schemeClr val="accent2"/>
+          </a:lnRef>
+          <a:fillRef idx="2">
+            <a:schemeClr val="accent2"/>
+          </a:fillRef>
+          <a:effectRef idx="1">
+            <a:schemeClr val="accent2"/>
+          </a:effectRef>
+          <a:fontRef idx="minor">
+            <a:schemeClr val="dk1"/>
+          </a:fontRef>
+        </p:style>
+        <p:txBody>
+          <a:bodyPr rtlCol="0" anchor="ctr"/>
+          <a:lstStyle/>
+          <a:p>
+            <a:pPr algn="ctr"/>
+            <a:endParaRPr lang="en-US" dirty="0">
+              <a:solidFill>
+                <a:prstClr val="black"/>
+              </a:solidFill>
+            </a:endParaRPr>
+          </a:p>
+        </p:txBody>
+      </p:sp>
+    </p:spTree>
+    <p:extLst>
+      <p:ext uri="{BB962C8B-B14F-4D97-AF65-F5344CB8AC3E}">
+        <p14:creationId xmlns:p14="http://schemas.microsoft.com/office/powerpoint/2010/main" val="3120352371"/>
+      </p:ext>
+    </p:extLst>
+  </p:cSld>
+  <p:clrMapOvr>
+    <a:masterClrMapping/>
+  </p:clrMapOvr>
+  <p:timing>
+    <p:tnLst>
+      <p:par>
+        <p:cTn id="1" dur="indefinite" restart="never" nodeType="tmRoot"/>
+      </p:par>
+    </p:tnLst>
+  </p:timing>
+</p:sld>
+</file>
+
+<file path=ppt/slides/slide14.xml><?xml version="1.0" encoding="utf-8"?>
+<p:sld xmlns:a="http://schemas.openxmlformats.org/drawingml/2006/main" xmlns:r="http://schemas.openxmlformats.org/officeDocument/2006/relationships" xmlns:p="http://schemas.openxmlformats.org/presentationml/2006/main">
+  <p:cSld>
+    <p:spTree>
+      <p:nvGrpSpPr>
+        <p:cNvPr id="1" name=""/>
+        <p:cNvGrpSpPr/>
+        <p:nvPr/>
+      </p:nvGrpSpPr>
+      <p:grpSpPr>
+        <a:xfrm>
+          <a:off x="0" y="0"/>
+          <a:ext cx="0" cy="0"/>
+          <a:chOff x="0" y="0"/>
+          <a:chExt cx="0" cy="0"/>
+        </a:xfrm>
+      </p:grpSpPr>
       <p:sp>
         <p:nvSpPr>
           <p:cNvPr id="2" name="Title 1"/>
@@ -8311,8 +9038,8 @@
         </p:nvCxnSpPr>
         <p:spPr>
           <a:xfrm rot="10800000" flipV="1">
-            <a:off x="1447800" y="1754832"/>
-            <a:ext cx="1447800" cy="378767"/>
+            <a:off x="1447800" y="1754833"/>
+            <a:ext cx="1447800" cy="378766"/>
           </a:xfrm>
           <a:prstGeom prst="bentConnector3">
             <a:avLst>
@@ -8347,12 +9074,17 @@
         <p:spPr>
           <a:xfrm>
             <a:off x="2895600" y="1524000"/>
-            <a:ext cx="2819400" cy="461665"/>
+            <a:ext cx="2590800" cy="461665"/>
           </a:xfrm>
           <a:prstGeom prst="rect">
             <a:avLst/>
           </a:prstGeom>
           <a:noFill/>
+          <a:ln>
+            <a:solidFill>
+              <a:schemeClr val="accent1"/>
+            </a:solidFill>
+          </a:ln>
         </p:spPr>
         <p:txBody>
           <a:bodyPr wrap="square" rtlCol="0">
@@ -8420,12 +9152,17 @@
         <p:spPr>
           <a:xfrm>
             <a:off x="5981700" y="5406637"/>
-            <a:ext cx="2819400" cy="276999"/>
+            <a:ext cx="2628900" cy="276999"/>
           </a:xfrm>
           <a:prstGeom prst="rect">
             <a:avLst/>
           </a:prstGeom>
           <a:noFill/>
+          <a:ln>
+            <a:solidFill>
+              <a:schemeClr val="accent1"/>
+            </a:solidFill>
+          </a:ln>
         </p:spPr>
         <p:txBody>
           <a:bodyPr wrap="square" rtlCol="0">
@@ -8499,6 +9236,11 @@
             <a:avLst/>
           </a:prstGeom>
           <a:noFill/>
+          <a:ln>
+            <a:solidFill>
+              <a:schemeClr val="accent1"/>
+            </a:solidFill>
+          </a:ln>
         </p:spPr>
         <p:txBody>
           <a:bodyPr wrap="square" rtlCol="0">
@@ -8513,6 +9255,82 @@
                 </a:solidFill>
               </a:rPr>
               <a:t>Calls the Bash program to execute the shell script</a:t>
+            </a:r>
+            <a:endParaRPr lang="en-US" sz="1200" dirty="0">
+              <a:solidFill>
+                <a:prstClr val="black"/>
+              </a:solidFill>
+            </a:endParaRPr>
+          </a:p>
+        </p:txBody>
+      </p:sp>
+      <p:cxnSp>
+        <p:nvCxnSpPr>
+          <p:cNvPr id="7" name="Straight Arrow Connector 6"/>
+          <p:cNvCxnSpPr/>
+          <p:nvPr/>
+        </p:nvCxnSpPr>
+        <p:spPr>
+          <a:xfrm>
+            <a:off x="8458200" y="2819400"/>
+            <a:ext cx="0" cy="914400"/>
+          </a:xfrm>
+          <a:prstGeom prst="straightConnector1">
+            <a:avLst/>
+          </a:prstGeom>
+          <a:ln>
+            <a:tailEnd type="triangle"/>
+          </a:ln>
+        </p:spPr>
+        <p:style>
+          <a:lnRef idx="1">
+            <a:schemeClr val="accent1"/>
+          </a:lnRef>
+          <a:fillRef idx="0">
+            <a:schemeClr val="accent1"/>
+          </a:fillRef>
+          <a:effectRef idx="0">
+            <a:schemeClr val="accent1"/>
+          </a:effectRef>
+          <a:fontRef idx="minor">
+            <a:schemeClr val="tx1"/>
+          </a:fontRef>
+        </p:style>
+      </p:cxnSp>
+      <p:sp>
+        <p:nvSpPr>
+          <p:cNvPr id="14" name="TextBox 13"/>
+          <p:cNvSpPr txBox="1"/>
+          <p:nvPr/>
+        </p:nvSpPr>
+        <p:spPr>
+          <a:xfrm>
+            <a:off x="6882788" y="2546991"/>
+            <a:ext cx="2019300" cy="276999"/>
+          </a:xfrm>
+          <a:prstGeom prst="rect">
+            <a:avLst/>
+          </a:prstGeom>
+          <a:noFill/>
+          <a:ln>
+            <a:solidFill>
+              <a:schemeClr val="accent1"/>
+            </a:solidFill>
+          </a:ln>
+        </p:spPr>
+        <p:txBody>
+          <a:bodyPr wrap="square" rtlCol="0">
+            <a:spAutoFit/>
+          </a:bodyPr>
+          <a:lstStyle/>
+          <a:p>
+            <a:r>
+              <a:rPr lang="en-US" sz="1200" dirty="0" smtClean="0">
+                <a:solidFill>
+                  <a:prstClr val="black"/>
+                </a:solidFill>
+              </a:rPr>
+              <a:t>Environment parameters</a:t>
             </a:r>
             <a:endParaRPr lang="en-US" sz="1200" dirty="0">
               <a:solidFill>
@@ -8542,7 +9360,7 @@
 </p:sld>
 </file>
 
-<file path=ppt/slides/slide14.xml><?xml version="1.0" encoding="utf-8"?>
+<file path=ppt/slides/slide15.xml><?xml version="1.0" encoding="utf-8"?>
 <p:sld xmlns:a="http://schemas.openxmlformats.org/drawingml/2006/main" xmlns:r="http://schemas.openxmlformats.org/officeDocument/2006/relationships" xmlns:p="http://schemas.openxmlformats.org/presentationml/2006/main">
   <p:cSld>
     <p:spTree>
@@ -8583,15 +9401,7 @@
           <a:p>
             <a:r>
               <a:rPr lang="en-US" dirty="0" smtClean="0"/>
-              <a:t>Called from </a:t>
-            </a:r>
-            <a:r>
-              <a:rPr lang="en-US" dirty="0" err="1" smtClean="0"/>
-              <a:t>usbhid</a:t>
-            </a:r>
-            <a:r>
-              <a:rPr lang="en-US" dirty="0" smtClean="0"/>
-              <a:t> kernel code</a:t>
+              <a:t>Called from usbhid kernel code</a:t>
             </a:r>
           </a:p>
           <a:p>
@@ -8671,7 +9481,7 @@
 </p:sld>
 </file>
 
-<file path=ppt/slides/slide15.xml><?xml version="1.0" encoding="utf-8"?>
+<file path=ppt/slides/slide16.xml><?xml version="1.0" encoding="utf-8"?>
 <p:sld xmlns:a="http://schemas.openxmlformats.org/drawingml/2006/main" xmlns:r="http://schemas.openxmlformats.org/officeDocument/2006/relationships" xmlns:p="http://schemas.openxmlformats.org/presentationml/2006/main">
   <p:cSld>
     <p:spTree>
@@ -8859,92 +9669,6 @@
 </p:sld>
 </file>
 
-<file path=ppt/slides/slide16.xml><?xml version="1.0" encoding="utf-8"?>
-<p:sld xmlns:a="http://schemas.openxmlformats.org/drawingml/2006/main" xmlns:r="http://schemas.openxmlformats.org/officeDocument/2006/relationships" xmlns:p="http://schemas.openxmlformats.org/presentationml/2006/main">
-  <p:cSld>
-    <p:spTree>
-      <p:nvGrpSpPr>
-        <p:cNvPr id="1" name=""/>
-        <p:cNvGrpSpPr/>
-        <p:nvPr/>
-      </p:nvGrpSpPr>
-      <p:grpSpPr>
-        <a:xfrm>
-          <a:off x="0" y="0"/>
-          <a:ext cx="0" cy="0"/>
-          <a:chOff x="0" y="0"/>
-          <a:chExt cx="0" cy="0"/>
-        </a:xfrm>
-      </p:grpSpPr>
-      <p:sp>
-        <p:nvSpPr>
-          <p:cNvPr id="3" name="Content Placeholder 2"/>
-          <p:cNvSpPr>
-            <a:spLocks noGrp="1"/>
-          </p:cNvSpPr>
-          <p:nvPr>
-            <p:ph idx="1"/>
-          </p:nvPr>
-        </p:nvSpPr>
-        <p:spPr>
-          <a:xfrm>
-            <a:off x="685800" y="1600200"/>
-            <a:ext cx="7772400" cy="4190999"/>
-          </a:xfrm>
-        </p:spPr>
-        <p:txBody>
-          <a:bodyPr>
-            <a:normAutofit/>
-          </a:bodyPr>
-          <a:lstStyle/>
-          <a:p>
-            <a:endParaRPr lang="en-US" dirty="0" smtClean="0"/>
-          </a:p>
-        </p:txBody>
-      </p:sp>
-      <p:sp>
-        <p:nvSpPr>
-          <p:cNvPr id="2" name="Title 1"/>
-          <p:cNvSpPr>
-            <a:spLocks noGrp="1"/>
-          </p:cNvSpPr>
-          <p:nvPr>
-            <p:ph type="title"/>
-          </p:nvPr>
-        </p:nvSpPr>
-        <p:spPr/>
-        <p:txBody>
-          <a:bodyPr/>
-          <a:lstStyle/>
-          <a:p>
-            <a:r>
-              <a:rPr lang="en-US" dirty="0" smtClean="0"/>
-              <a:t>Experimental results</a:t>
-            </a:r>
-            <a:endParaRPr lang="en-US" dirty="0"/>
-          </a:p>
-        </p:txBody>
-      </p:sp>
-    </p:spTree>
-    <p:extLst>
-      <p:ext uri="{BB962C8B-B14F-4D97-AF65-F5344CB8AC3E}">
-        <p14:creationId xmlns:p14="http://schemas.microsoft.com/office/powerpoint/2010/main" val="667910727"/>
-      </p:ext>
-    </p:extLst>
-  </p:cSld>
-  <p:clrMapOvr>
-    <a:masterClrMapping/>
-  </p:clrMapOvr>
-  <p:timing>
-    <p:tnLst>
-      <p:par>
-        <p:cTn id="1" dur="indefinite" restart="never" nodeType="tmRoot"/>
-      </p:par>
-    </p:tnLst>
-  </p:timing>
-</p:sld>
-</file>
-
 <file path=ppt/slides/slide17.xml><?xml version="1.0" encoding="utf-8"?>
 <p:sld xmlns:a="http://schemas.openxmlformats.org/drawingml/2006/main" xmlns:r="http://schemas.openxmlformats.org/officeDocument/2006/relationships" xmlns:p="http://schemas.openxmlformats.org/presentationml/2006/main">
   <p:cSld>
@@ -9122,17 +9846,101 @@
         </p:nvSpPr>
         <p:spPr>
           <a:xfrm>
-            <a:off x="685800" y="1600200"/>
-            <a:ext cx="7772400" cy="4190999"/>
+            <a:off x="381000" y="1524000"/>
+            <a:ext cx="8229600" cy="4190999"/>
           </a:xfrm>
         </p:spPr>
         <p:txBody>
           <a:bodyPr>
-            <a:normAutofit/>
+            <a:normAutofit fontScale="92500"/>
           </a:bodyPr>
           <a:lstStyle/>
           <a:p>
+            <a:r>
+              <a:rPr lang="en-US" dirty="0" smtClean="0"/>
+              <a:t>USB Flash Drive</a:t>
+            </a:r>
+          </a:p>
+          <a:p>
+            <a:pPr lvl="1"/>
+            <a:r>
+              <a:rPr lang="en-US" sz="2100" i="1" dirty="0" smtClean="0"/>
+              <a:t>Purpose:</a:t>
+            </a:r>
+            <a:r>
+              <a:rPr lang="en-US" sz="2100" dirty="0" smtClean="0"/>
+              <a:t> ensure that driver modification only applies to human interface devices</a:t>
+            </a:r>
+          </a:p>
+          <a:p>
+            <a:pPr lvl="1"/>
+            <a:r>
+              <a:rPr lang="en-US" sz="2100" i="1" dirty="0" smtClean="0"/>
+              <a:t>Results:</a:t>
+            </a:r>
+            <a:r>
+              <a:rPr lang="en-US" sz="2100" dirty="0" smtClean="0"/>
+              <a:t> </a:t>
+            </a:r>
+          </a:p>
+          <a:p>
+            <a:pPr lvl="2"/>
+            <a:r>
+              <a:rPr lang="en-US" dirty="0" smtClean="0"/>
+              <a:t>Full functionality of built-in keyboard and mouse maintained</a:t>
+            </a:r>
+          </a:p>
+          <a:p>
+            <a:pPr lvl="2"/>
+            <a:r>
+              <a:rPr lang="en-US" dirty="0" smtClean="0"/>
+              <a:t>No appearance of the CAPTCHA GUI</a:t>
+            </a:r>
+          </a:p>
+          <a:p>
+            <a:pPr lvl="2"/>
             <a:endParaRPr lang="en-US" dirty="0" smtClean="0"/>
+          </a:p>
+          <a:p>
+            <a:r>
+              <a:rPr lang="en-US" dirty="0" smtClean="0"/>
+              <a:t>USB Mouse and USB Keyboard</a:t>
+            </a:r>
+          </a:p>
+          <a:p>
+            <a:pPr lvl="1"/>
+            <a:r>
+              <a:rPr lang="en-US" sz="2100" i="1" dirty="0"/>
+              <a:t>Purpose:</a:t>
+            </a:r>
+            <a:r>
+              <a:rPr lang="en-US" sz="2100" dirty="0"/>
+              <a:t> </a:t>
+            </a:r>
+            <a:r>
+              <a:rPr lang="en-US" sz="2100" dirty="0" smtClean="0"/>
+              <a:t>verify the CAPTCHA program runs for expected human interface devices</a:t>
+            </a:r>
+          </a:p>
+          <a:p>
+            <a:pPr lvl="1"/>
+            <a:r>
+              <a:rPr lang="en-US" sz="2100" i="1" dirty="0" smtClean="0"/>
+              <a:t>Results</a:t>
+            </a:r>
+            <a:r>
+              <a:rPr lang="en-US" sz="2100" i="1" dirty="0"/>
+              <a:t>:</a:t>
+            </a:r>
+            <a:r>
+              <a:rPr lang="en-US" sz="2100" dirty="0"/>
+              <a:t> </a:t>
+            </a:r>
+            <a:r>
+              <a:rPr lang="en-US" sz="1900" dirty="0" smtClean="0"/>
+              <a:t>Keyboard and mouse functionalities restricted while the CAPTCHA program is active and restored after validation</a:t>
+            </a:r>
+            <a:endParaRPr lang="en-US" sz="1900" dirty="0"/>
           </a:p>
         </p:txBody>
       </p:sp>
@@ -9153,7 +9961,11 @@
           <a:p>
             <a:r>
               <a:rPr lang="en-US" dirty="0" smtClean="0"/>
-              <a:t>Technical Weaknesses</a:t>
+              <a:t>Experimental </a:t>
+            </a:r>
+            <a:r>
+              <a:rPr lang="en-US" dirty="0" smtClean="0"/>
+              <a:t>Results</a:t>
             </a:r>
             <a:endParaRPr lang="en-US" dirty="0"/>
           </a:p>
@@ -9162,7 +9974,7 @@
     </p:spTree>
     <p:extLst>
       <p:ext uri="{BB962C8B-B14F-4D97-AF65-F5344CB8AC3E}">
-        <p14:creationId xmlns:p14="http://schemas.microsoft.com/office/powerpoint/2010/main" val="797680074"/>
+        <p14:creationId xmlns:p14="http://schemas.microsoft.com/office/powerpoint/2010/main" val="667910727"/>
       </p:ext>
     </p:extLst>
   </p:cSld>
@@ -9198,57 +10010,330 @@
       </p:grpSpPr>
       <p:sp>
         <p:nvSpPr>
-          <p:cNvPr id="3" name="Content Placeholder 2"/>
-          <p:cNvSpPr>
-            <a:spLocks noGrp="1"/>
-          </p:cNvSpPr>
-          <p:nvPr>
-            <p:ph idx="1"/>
-          </p:nvPr>
+          <p:cNvPr id="2" name="Title 1"/>
+          <p:cNvSpPr>
+            <a:spLocks noGrp="1"/>
+          </p:cNvSpPr>
+          <p:nvPr>
+            <p:ph type="title"/>
+          </p:nvPr>
+        </p:nvSpPr>
+        <p:spPr/>
+        <p:txBody>
+          <a:bodyPr/>
+          <a:lstStyle/>
+          <a:p>
+            <a:r>
+              <a:rPr lang="en-US" dirty="0" smtClean="0"/>
+              <a:t>Experimental </a:t>
+            </a:r>
+            <a:r>
+              <a:rPr lang="en-US" dirty="0"/>
+              <a:t>R</a:t>
+            </a:r>
+            <a:r>
+              <a:rPr lang="en-US" dirty="0" smtClean="0"/>
+              <a:t>esults (con</a:t>
+            </a:r>
+            <a:r>
+              <a:rPr lang="en-US" dirty="0" smtClean="0"/>
+              <a:t>t’d</a:t>
+            </a:r>
+            <a:r>
+              <a:rPr lang="en-US" dirty="0" smtClean="0"/>
+              <a:t>)</a:t>
+            </a:r>
+            <a:endParaRPr lang="en-US" dirty="0"/>
+          </a:p>
+        </p:txBody>
+      </p:sp>
+      <p:sp>
+        <p:nvSpPr>
+          <p:cNvPr id="4" name="Content Placeholder 2"/>
+          <p:cNvSpPr txBox="1">
+            <a:spLocks/>
+          </p:cNvSpPr>
+          <p:nvPr/>
         </p:nvSpPr>
         <p:spPr>
           <a:xfrm>
-            <a:off x="685800" y="1600200"/>
-            <a:ext cx="7772400" cy="4190999"/>
+            <a:off x="381000" y="1524000"/>
+            <a:ext cx="8229600" cy="4648200"/>
           </a:xfrm>
+          <a:prstGeom prst="rect">
+            <a:avLst/>
+          </a:prstGeom>
         </p:spPr>
         <p:txBody>
-          <a:bodyPr>
-            <a:normAutofit/>
+          <a:bodyPr vert="horz">
+            <a:normAutofit lnSpcReduction="10000"/>
           </a:bodyPr>
-          <a:lstStyle/>
-          <a:p>
-            <a:endParaRPr lang="en-US" dirty="0" smtClean="0"/>
-          </a:p>
-        </p:txBody>
-      </p:sp>
-      <p:sp>
-        <p:nvSpPr>
-          <p:cNvPr id="2" name="Title 1"/>
-          <p:cNvSpPr>
-            <a:spLocks noGrp="1"/>
-          </p:cNvSpPr>
-          <p:nvPr>
-            <p:ph type="title"/>
-          </p:nvPr>
-        </p:nvSpPr>
-        <p:spPr/>
-        <p:txBody>
-          <a:bodyPr/>
-          <a:lstStyle/>
-          <a:p>
+          <a:lstStyle>
+            <a:lvl1pPr marL="365760" indent="-256032" algn="l" rtl="0" eaLnBrk="1" latinLnBrk="0" hangingPunct="1">
+              <a:spcBef>
+                <a:spcPts val="400"/>
+              </a:spcBef>
+              <a:spcAft>
+                <a:spcPts val="0"/>
+              </a:spcAft>
+              <a:buClr>
+                <a:schemeClr val="accent1"/>
+              </a:buClr>
+              <a:buSzPct val="68000"/>
+              <a:buFont typeface="Wingdings 3"/>
+              <a:buChar char=""/>
+              <a:defRPr kumimoji="0" sz="2700" kern="1200">
+                <a:solidFill>
+                  <a:schemeClr val="tx1"/>
+                </a:solidFill>
+                <a:latin typeface="+mn-lt"/>
+                <a:ea typeface="+mn-ea"/>
+                <a:cs typeface="+mn-cs"/>
+              </a:defRPr>
+            </a:lvl1pPr>
+            <a:lvl2pPr marL="621792" indent="-228600" algn="l" rtl="0" eaLnBrk="1" latinLnBrk="0" hangingPunct="1">
+              <a:spcBef>
+                <a:spcPts val="324"/>
+              </a:spcBef>
+              <a:buClr>
+                <a:schemeClr val="accent1"/>
+              </a:buClr>
+              <a:buFont typeface="Verdana"/>
+              <a:buChar char="◦"/>
+              <a:defRPr kumimoji="0" sz="2300" kern="1200">
+                <a:solidFill>
+                  <a:schemeClr val="tx1"/>
+                </a:solidFill>
+                <a:latin typeface="+mn-lt"/>
+                <a:ea typeface="+mn-ea"/>
+                <a:cs typeface="+mn-cs"/>
+              </a:defRPr>
+            </a:lvl2pPr>
+            <a:lvl3pPr marL="859536" indent="-228600" algn="l" rtl="0" eaLnBrk="1" latinLnBrk="0" hangingPunct="1">
+              <a:spcBef>
+                <a:spcPts val="350"/>
+              </a:spcBef>
+              <a:buClr>
+                <a:schemeClr val="accent2"/>
+              </a:buClr>
+              <a:buSzPct val="100000"/>
+              <a:buFont typeface="Wingdings 2"/>
+              <a:buChar char=""/>
+              <a:defRPr kumimoji="0" sz="2100" kern="1200">
+                <a:solidFill>
+                  <a:schemeClr val="tx1"/>
+                </a:solidFill>
+                <a:latin typeface="+mn-lt"/>
+                <a:ea typeface="+mn-ea"/>
+                <a:cs typeface="+mn-cs"/>
+              </a:defRPr>
+            </a:lvl3pPr>
+            <a:lvl4pPr marL="1143000" indent="-228600" algn="l" rtl="0" eaLnBrk="1" latinLnBrk="0" hangingPunct="1">
+              <a:spcBef>
+                <a:spcPts val="350"/>
+              </a:spcBef>
+              <a:buClr>
+                <a:schemeClr val="accent2"/>
+              </a:buClr>
+              <a:buFont typeface="Wingdings 2"/>
+              <a:buChar char=""/>
+              <a:defRPr kumimoji="0" sz="1900" kern="1200">
+                <a:solidFill>
+                  <a:schemeClr val="tx1"/>
+                </a:solidFill>
+                <a:latin typeface="+mn-lt"/>
+                <a:ea typeface="+mn-ea"/>
+                <a:cs typeface="+mn-cs"/>
+              </a:defRPr>
+            </a:lvl4pPr>
+            <a:lvl5pPr marL="1371600" indent="-228600" algn="l" rtl="0" eaLnBrk="1" latinLnBrk="0" hangingPunct="1">
+              <a:spcBef>
+                <a:spcPts val="350"/>
+              </a:spcBef>
+              <a:buClr>
+                <a:schemeClr val="accent2"/>
+              </a:buClr>
+              <a:buFont typeface="Wingdings 2"/>
+              <a:buChar char=""/>
+              <a:defRPr kumimoji="0" sz="1800" kern="1200">
+                <a:solidFill>
+                  <a:schemeClr val="tx1"/>
+                </a:solidFill>
+                <a:latin typeface="+mn-lt"/>
+                <a:ea typeface="+mn-ea"/>
+                <a:cs typeface="+mn-cs"/>
+              </a:defRPr>
+            </a:lvl5pPr>
+            <a:lvl6pPr marL="1600200" indent="-228600" algn="l" rtl="0" eaLnBrk="1" latinLnBrk="0" hangingPunct="1">
+              <a:spcBef>
+                <a:spcPts val="350"/>
+              </a:spcBef>
+              <a:buClr>
+                <a:schemeClr val="accent3"/>
+              </a:buClr>
+              <a:buFont typeface="Wingdings 2"/>
+              <a:buChar char=""/>
+              <a:defRPr kumimoji="0" sz="1800" kern="1200">
+                <a:solidFill>
+                  <a:schemeClr val="tx1"/>
+                </a:solidFill>
+                <a:latin typeface="+mn-lt"/>
+                <a:ea typeface="+mn-ea"/>
+                <a:cs typeface="+mn-cs"/>
+              </a:defRPr>
+            </a:lvl6pPr>
+            <a:lvl7pPr marL="1828800" indent="-228600" algn="l" rtl="0" eaLnBrk="1" latinLnBrk="0" hangingPunct="1">
+              <a:spcBef>
+                <a:spcPts val="350"/>
+              </a:spcBef>
+              <a:buClr>
+                <a:schemeClr val="accent3"/>
+              </a:buClr>
+              <a:buFont typeface="Wingdings 2"/>
+              <a:buChar char=""/>
+              <a:defRPr kumimoji="0" sz="1600" kern="1200">
+                <a:solidFill>
+                  <a:schemeClr val="tx1"/>
+                </a:solidFill>
+                <a:latin typeface="+mn-lt"/>
+                <a:ea typeface="+mn-ea"/>
+                <a:cs typeface="+mn-cs"/>
+              </a:defRPr>
+            </a:lvl7pPr>
+            <a:lvl8pPr marL="2057400" indent="-228600" algn="l" rtl="0" eaLnBrk="1" latinLnBrk="0" hangingPunct="1">
+              <a:spcBef>
+                <a:spcPts val="350"/>
+              </a:spcBef>
+              <a:buClr>
+                <a:schemeClr val="accent3"/>
+              </a:buClr>
+              <a:buFont typeface="Wingdings 2"/>
+              <a:buChar char=""/>
+              <a:defRPr kumimoji="0" sz="1600" kern="1200">
+                <a:solidFill>
+                  <a:schemeClr val="tx1"/>
+                </a:solidFill>
+                <a:latin typeface="+mn-lt"/>
+                <a:ea typeface="+mn-ea"/>
+                <a:cs typeface="+mn-cs"/>
+              </a:defRPr>
+            </a:lvl8pPr>
+            <a:lvl9pPr marL="2286000" indent="-228600" algn="l" rtl="0" eaLnBrk="1" latinLnBrk="0" hangingPunct="1">
+              <a:spcBef>
+                <a:spcPts val="350"/>
+              </a:spcBef>
+              <a:buClr>
+                <a:schemeClr val="accent3"/>
+              </a:buClr>
+              <a:buFont typeface="Wingdings 2"/>
+              <a:buChar char=""/>
+              <a:defRPr kumimoji="0" sz="1600" kern="1200" baseline="0">
+                <a:solidFill>
+                  <a:schemeClr val="tx1"/>
+                </a:solidFill>
+                <a:latin typeface="+mn-lt"/>
+                <a:ea typeface="+mn-ea"/>
+                <a:cs typeface="+mn-cs"/>
+              </a:defRPr>
+            </a:lvl9pPr>
+            <a:extLst/>
+          </a:lstStyle>
+          <a:p>
+            <a:r>
+              <a:rPr lang="en-US" dirty="0"/>
+              <a:t>Teensy </a:t>
+            </a:r>
             <a:r>
               <a:rPr lang="en-US" dirty="0" smtClean="0"/>
-              <a:t>Future Work</a:t>
-            </a:r>
-            <a:endParaRPr lang="en-US" dirty="0"/>
+              <a:t>set to emulate USB-HID(s) with </a:t>
+            </a:r>
+            <a:br>
+              <a:rPr lang="en-US" dirty="0" smtClean="0"/>
+            </a:br>
+            <a:r>
+              <a:rPr lang="en-US" dirty="0" smtClean="0"/>
+              <a:t>attack loaded</a:t>
+            </a:r>
+          </a:p>
+          <a:p>
+            <a:pPr lvl="1"/>
+            <a:r>
+              <a:rPr lang="en-US" sz="2100" i="1" dirty="0" smtClean="0"/>
+              <a:t>Purpose:</a:t>
+            </a:r>
+            <a:r>
+              <a:rPr lang="en-US" sz="2100" dirty="0" smtClean="0"/>
+              <a:t> test the effectiveness of the CAPTCHA-enabled driver in </a:t>
+            </a:r>
+            <a:r>
+              <a:rPr lang="en-US" sz="2100" dirty="0"/>
+              <a:t>defending </a:t>
+            </a:r>
+            <a:r>
+              <a:rPr lang="en-US" sz="2100" dirty="0" smtClean="0"/>
+              <a:t>against HID emulation </a:t>
+            </a:r>
+            <a:r>
+              <a:rPr lang="en-US" sz="2100" dirty="0"/>
+              <a:t>attacks</a:t>
+            </a:r>
+            <a:endParaRPr lang="en-US" sz="2100" dirty="0" smtClean="0"/>
+          </a:p>
+          <a:p>
+            <a:pPr lvl="1"/>
+            <a:r>
+              <a:rPr lang="en-US" sz="2100" i="1" dirty="0" smtClean="0"/>
+              <a:t>Results:</a:t>
+            </a:r>
+            <a:r>
+              <a:rPr lang="en-US" sz="2100" dirty="0" smtClean="0"/>
+              <a:t> </a:t>
+            </a:r>
+          </a:p>
+          <a:p>
+            <a:pPr lvl="2"/>
+            <a:r>
+              <a:rPr lang="en-US" dirty="0" smtClean="0"/>
+              <a:t>Keyboard-based attacks:</a:t>
+            </a:r>
+          </a:p>
+          <a:p>
+            <a:pPr lvl="3"/>
+            <a:r>
+              <a:rPr lang="en-US" sz="2100" dirty="0" smtClean="0"/>
+              <a:t>Teensy has the ability to open a terminal window before the CAPTCHA GUI loads</a:t>
+            </a:r>
+          </a:p>
+          <a:p>
+            <a:pPr lvl="3"/>
+            <a:r>
+              <a:rPr lang="en-US" sz="2100" dirty="0" smtClean="0"/>
+              <a:t>Attacks unsuccessful in executing malicious commands</a:t>
+            </a:r>
+          </a:p>
+          <a:p>
+            <a:pPr lvl="2"/>
+            <a:r>
+              <a:rPr lang="en-US" dirty="0" smtClean="0"/>
+              <a:t>Mouse-based attacks:</a:t>
+            </a:r>
+          </a:p>
+          <a:p>
+            <a:pPr lvl="3"/>
+            <a:r>
+              <a:rPr lang="en-US" sz="2100" dirty="0" smtClean="0"/>
+              <a:t>Unable to open terminal window and execute commands before the CAPTCHA GUI loads</a:t>
+            </a:r>
+          </a:p>
+          <a:p>
+            <a:endParaRPr lang="en-US" sz="1900" dirty="0"/>
           </a:p>
         </p:txBody>
       </p:sp>
     </p:spTree>
     <p:extLst>
       <p:ext uri="{BB962C8B-B14F-4D97-AF65-F5344CB8AC3E}">
-        <p14:creationId xmlns:p14="http://schemas.microsoft.com/office/powerpoint/2010/main" val="797680074"/>
+        <p14:creationId xmlns:p14="http://schemas.microsoft.com/office/powerpoint/2010/main" val="575234326"/>
       </p:ext>
     </p:extLst>
   </p:cSld>
@@ -9445,6 +10530,269 @@
           <a:chExt cx="0" cy="0"/>
         </a:xfrm>
       </p:grpSpPr>
+      <p:sp>
+        <p:nvSpPr>
+          <p:cNvPr id="3" name="Content Placeholder 2"/>
+          <p:cNvSpPr>
+            <a:spLocks noGrp="1"/>
+          </p:cNvSpPr>
+          <p:nvPr>
+            <p:ph idx="1"/>
+          </p:nvPr>
+        </p:nvSpPr>
+        <p:spPr>
+          <a:xfrm>
+            <a:off x="685800" y="1600200"/>
+            <a:ext cx="7772400" cy="4190999"/>
+          </a:xfrm>
+        </p:spPr>
+        <p:txBody>
+          <a:bodyPr>
+            <a:normAutofit/>
+          </a:bodyPr>
+          <a:lstStyle/>
+          <a:p>
+            <a:r>
+              <a:rPr lang="en-US" sz="2400" dirty="0" smtClean="0"/>
+              <a:t>Weaknesses revealed via testing:</a:t>
+            </a:r>
+          </a:p>
+          <a:p>
+            <a:pPr lvl="1"/>
+            <a:r>
+              <a:rPr lang="en-US" sz="2000" dirty="0" smtClean="0"/>
+              <a:t>Delay in initial Bash script execution after the HID is inserted into the system</a:t>
+            </a:r>
+          </a:p>
+          <a:p>
+            <a:pPr lvl="1"/>
+            <a:r>
+              <a:rPr lang="en-US" sz="2000" dirty="0" smtClean="0"/>
+              <a:t>Driver is ineffective when the HID is inserted while the computer is suspended or powered off</a:t>
+            </a:r>
+          </a:p>
+          <a:p>
+            <a:pPr lvl="1"/>
+            <a:endParaRPr lang="en-US" sz="2000" dirty="0" smtClean="0"/>
+          </a:p>
+          <a:p>
+            <a:r>
+              <a:rPr lang="en-US" sz="2400" dirty="0" smtClean="0"/>
+              <a:t>CAPTCHA GUI may be completed using any connected keyboard or mouse</a:t>
+            </a:r>
+          </a:p>
+          <a:p>
+            <a:endParaRPr lang="en-US" sz="2400" dirty="0" smtClean="0"/>
+          </a:p>
+          <a:p>
+            <a:r>
+              <a:rPr lang="en-US" sz="2400" dirty="0" smtClean="0"/>
+              <a:t>Solution is ineffective against microcontrollers embedded inside of true HIDs</a:t>
+            </a:r>
+          </a:p>
+          <a:p>
+            <a:endParaRPr lang="en-US" dirty="0" smtClean="0"/>
+          </a:p>
+        </p:txBody>
+      </p:sp>
+      <p:sp>
+        <p:nvSpPr>
+          <p:cNvPr id="2" name="Title 1"/>
+          <p:cNvSpPr>
+            <a:spLocks noGrp="1"/>
+          </p:cNvSpPr>
+          <p:nvPr>
+            <p:ph type="title"/>
+          </p:nvPr>
+        </p:nvSpPr>
+        <p:spPr/>
+        <p:txBody>
+          <a:bodyPr/>
+          <a:lstStyle/>
+          <a:p>
+            <a:r>
+              <a:rPr lang="en-US" dirty="0" smtClean="0"/>
+              <a:t>Technical Weaknesses</a:t>
+            </a:r>
+            <a:endParaRPr lang="en-US" dirty="0"/>
+          </a:p>
+        </p:txBody>
+      </p:sp>
+    </p:spTree>
+    <p:extLst>
+      <p:ext uri="{BB962C8B-B14F-4D97-AF65-F5344CB8AC3E}">
+        <p14:creationId xmlns:p14="http://schemas.microsoft.com/office/powerpoint/2010/main" val="797680074"/>
+      </p:ext>
+    </p:extLst>
+  </p:cSld>
+  <p:clrMapOvr>
+    <a:masterClrMapping/>
+  </p:clrMapOvr>
+  <p:timing>
+    <p:tnLst>
+      <p:par>
+        <p:cTn id="1" dur="indefinite" restart="never" nodeType="tmRoot"/>
+      </p:par>
+    </p:tnLst>
+  </p:timing>
+</p:sld>
+</file>
+
+<file path=ppt/slides/slide21.xml><?xml version="1.0" encoding="utf-8"?>
+<p:sld xmlns:a="http://schemas.openxmlformats.org/drawingml/2006/main" xmlns:r="http://schemas.openxmlformats.org/officeDocument/2006/relationships" xmlns:p="http://schemas.openxmlformats.org/presentationml/2006/main">
+  <p:cSld>
+    <p:spTree>
+      <p:nvGrpSpPr>
+        <p:cNvPr id="1" name=""/>
+        <p:cNvGrpSpPr/>
+        <p:nvPr/>
+      </p:nvGrpSpPr>
+      <p:grpSpPr>
+        <a:xfrm>
+          <a:off x="0" y="0"/>
+          <a:ext cx="0" cy="0"/>
+          <a:chOff x="0" y="0"/>
+          <a:chExt cx="0" cy="0"/>
+        </a:xfrm>
+      </p:grpSpPr>
+      <p:sp>
+        <p:nvSpPr>
+          <p:cNvPr id="3" name="Content Placeholder 2"/>
+          <p:cNvSpPr>
+            <a:spLocks noGrp="1"/>
+          </p:cNvSpPr>
+          <p:nvPr>
+            <p:ph idx="1"/>
+          </p:nvPr>
+        </p:nvSpPr>
+        <p:spPr>
+          <a:xfrm>
+            <a:off x="457200" y="1600200"/>
+            <a:ext cx="8153400" cy="4190999"/>
+          </a:xfrm>
+        </p:spPr>
+        <p:txBody>
+          <a:bodyPr>
+            <a:normAutofit/>
+          </a:bodyPr>
+          <a:lstStyle/>
+          <a:p>
+            <a:r>
+              <a:rPr lang="en-US" sz="2300" dirty="0" smtClean="0"/>
+              <a:t>CAPTCHA Improvements</a:t>
+            </a:r>
+          </a:p>
+          <a:p>
+            <a:pPr lvl="1"/>
+            <a:r>
+              <a:rPr lang="en-US" sz="1900" dirty="0" smtClean="0"/>
+              <a:t>Use more advanced CAPTCHA characteristics or a professionally developed version</a:t>
+            </a:r>
+          </a:p>
+          <a:p>
+            <a:pPr lvl="1"/>
+            <a:endParaRPr lang="en-US" sz="1900" dirty="0" smtClean="0"/>
+          </a:p>
+          <a:p>
+            <a:r>
+              <a:rPr lang="en-US" sz="2300" dirty="0" smtClean="0"/>
+              <a:t>Driver Modification Improvements</a:t>
+            </a:r>
+          </a:p>
+          <a:p>
+            <a:pPr lvl="1"/>
+            <a:r>
+              <a:rPr lang="en-US" sz="1900" dirty="0" smtClean="0"/>
+              <a:t>Port restriction of HID functionalities and execution of the CAPTCHA program to the driver code (remove Bash script call)</a:t>
+            </a:r>
+          </a:p>
+          <a:p>
+            <a:pPr lvl="1"/>
+            <a:r>
+              <a:rPr lang="en-US" sz="1900" dirty="0" smtClean="0"/>
+              <a:t>Programmatically ensure that the CAPTCHA is completed by the device that triggered it</a:t>
+            </a:r>
+          </a:p>
+          <a:p>
+            <a:pPr lvl="1"/>
+            <a:endParaRPr lang="en-US" sz="1900" dirty="0" smtClean="0"/>
+          </a:p>
+          <a:p>
+            <a:r>
+              <a:rPr lang="en-US" sz="2300" dirty="0" smtClean="0"/>
+              <a:t>Driver Installation</a:t>
+            </a:r>
+          </a:p>
+          <a:p>
+            <a:pPr lvl="1"/>
+            <a:r>
+              <a:rPr lang="en-US" sz="1900" dirty="0" smtClean="0"/>
+              <a:t>Configure the Bash shell script to work for each system user</a:t>
+            </a:r>
+            <a:endParaRPr lang="en-US" sz="1900" dirty="0" smtClean="0"/>
+          </a:p>
+        </p:txBody>
+      </p:sp>
+      <p:sp>
+        <p:nvSpPr>
+          <p:cNvPr id="2" name="Title 1"/>
+          <p:cNvSpPr>
+            <a:spLocks noGrp="1"/>
+          </p:cNvSpPr>
+          <p:nvPr>
+            <p:ph type="title"/>
+          </p:nvPr>
+        </p:nvSpPr>
+        <p:spPr/>
+        <p:txBody>
+          <a:bodyPr/>
+          <a:lstStyle/>
+          <a:p>
+            <a:r>
+              <a:rPr lang="en-US" dirty="0" smtClean="0"/>
+              <a:t>Future Work</a:t>
+            </a:r>
+            <a:endParaRPr lang="en-US" dirty="0"/>
+          </a:p>
+        </p:txBody>
+      </p:sp>
+    </p:spTree>
+    <p:extLst>
+      <p:ext uri="{BB962C8B-B14F-4D97-AF65-F5344CB8AC3E}">
+        <p14:creationId xmlns:p14="http://schemas.microsoft.com/office/powerpoint/2010/main" val="797680074"/>
+      </p:ext>
+    </p:extLst>
+  </p:cSld>
+  <p:clrMapOvr>
+    <a:masterClrMapping/>
+  </p:clrMapOvr>
+  <p:timing>
+    <p:tnLst>
+      <p:par>
+        <p:cTn id="1" dur="indefinite" restart="never" nodeType="tmRoot"/>
+      </p:par>
+    </p:tnLst>
+  </p:timing>
+</p:sld>
+</file>
+
+<file path=ppt/slides/slide22.xml><?xml version="1.0" encoding="utf-8"?>
+<p:sld xmlns:a="http://schemas.openxmlformats.org/drawingml/2006/main" xmlns:r="http://schemas.openxmlformats.org/officeDocument/2006/relationships" xmlns:p="http://schemas.openxmlformats.org/presentationml/2006/main">
+  <p:cSld>
+    <p:spTree>
+      <p:nvGrpSpPr>
+        <p:cNvPr id="1" name=""/>
+        <p:cNvGrpSpPr/>
+        <p:nvPr/>
+      </p:nvGrpSpPr>
+      <p:grpSpPr>
+        <a:xfrm>
+          <a:off x="0" y="0"/>
+          <a:ext cx="0" cy="0"/>
+          <a:chOff x="0" y="0"/>
+          <a:chExt cx="0" cy="0"/>
+        </a:xfrm>
+      </p:grpSpPr>
       <p:pic>
         <p:nvPicPr>
           <p:cNvPr id="5" name="Picture 1" descr="C:\Users\NGGZ7MT\AppData\Local\Microsoft\Windows\Temporary Internet Files\Content.IE5\N691L41P\MP900398831[1].jpg"/>
@@ -9538,7 +10886,7 @@
 </p:sld>
 </file>
 
-<file path=ppt/slides/slide21.xml><?xml version="1.0" encoding="utf-8"?>
+<file path=ppt/slides/slide23.xml><?xml version="1.0" encoding="utf-8"?>
 <p:sld xmlns:a="http://schemas.openxmlformats.org/drawingml/2006/main" xmlns:r="http://schemas.openxmlformats.org/officeDocument/2006/relationships" xmlns:p="http://schemas.openxmlformats.org/presentationml/2006/main" show="0">
   <p:cSld>
     <p:spTree>
@@ -10243,7 +11591,6 @@
               <a:rPr lang="en-US" dirty="0" smtClean="0"/>
               <a:t>Ubuntu 14.04 with standard tools</a:t>
             </a:r>
-            <a:endParaRPr lang="en-US" dirty="0" smtClean="0"/>
           </a:p>
         </p:txBody>
       </p:sp>
@@ -10324,11 +11671,7 @@
           <a:p>
             <a:r>
               <a:rPr lang="en-US" dirty="0" smtClean="0"/>
-              <a:t>Teensy </a:t>
-            </a:r>
-            <a:r>
-              <a:rPr lang="en-US" dirty="0" smtClean="0"/>
-              <a:t>Attacks</a:t>
+              <a:t>Teensy Attacks</a:t>
             </a:r>
             <a:endParaRPr lang="en-US" dirty="0"/>
           </a:p>
@@ -10456,7 +11799,6 @@
               <a:rPr lang="en-US" dirty="0" smtClean="0"/>
               <a:t>Steal secret files over an FTP server</a:t>
             </a:r>
-            <a:endParaRPr lang="en-US" dirty="0" smtClean="0"/>
           </a:p>
         </p:txBody>
       </p:sp>
@@ -10849,7 +12191,6 @@
               <a:rPr lang="en-US" dirty="0" smtClean="0"/>
               <a:t>Steal Password</a:t>
             </a:r>
-            <a:endParaRPr lang="en-US" dirty="0" smtClean="0"/>
           </a:p>
         </p:txBody>
       </p:sp>
@@ -11110,8 +12451,8 @@
         </p:blipFill>
         <p:spPr bwMode="auto">
           <a:xfrm>
-            <a:off x="2819400" y="3525715"/>
-            <a:ext cx="6019800" cy="3028950"/>
+            <a:off x="3200400" y="3525715"/>
+            <a:ext cx="5638800" cy="2837244"/>
           </a:xfrm>
           <a:prstGeom prst="rect">
             <a:avLst/>
@@ -11339,11 +12680,7 @@
           <a:p>
             <a:r>
               <a:rPr lang="en-US" dirty="0" smtClean="0"/>
-              <a:t>Teensy </a:t>
-            </a:r>
-            <a:r>
-              <a:rPr lang="en-US" dirty="0" smtClean="0"/>
-              <a:t>Attacks</a:t>
+              <a:t>Teensy Attacks</a:t>
             </a:r>
             <a:endParaRPr lang="en-US" dirty="0"/>
           </a:p>
@@ -11436,7 +12773,6 @@
               <a:rPr lang="en-US" dirty="0" smtClean="0"/>
               <a:t>Steal Password</a:t>
             </a:r>
-            <a:endParaRPr lang="en-US" dirty="0" smtClean="0"/>
           </a:p>
         </p:txBody>
       </p:sp>
@@ -11461,7 +12797,7 @@
         </p:blipFill>
         <p:spPr bwMode="auto">
           <a:xfrm>
-            <a:off x="4076042" y="3505200"/>
+            <a:off x="4076042" y="3352800"/>
             <a:ext cx="4624754" cy="3112477"/>
           </a:xfrm>
           <a:prstGeom prst="rect">

</xml_diff>

<commit_message>
Added related work slide
</commit_message>
<xml_diff>
--- a/Project/Final_Project_Presentation_Fasburg_Reiff_Thomas.pptx
+++ b/Project/Final_Project_Presentation_Fasburg_Reiff_Thomas.pptx
@@ -131,7 +131,7 @@
   </p:defaultTextStyle>
   <p:extLst>
     <p:ext uri="{EFAFB233-063F-42B5-8137-9DF3F51BA10A}">
-      <p15:sldGuideLst xmlns:p15="http://schemas.microsoft.com/office/powerpoint/2012/main">
+      <p15:sldGuideLst xmlns:p15="http://schemas.microsoft.com/office/powerpoint/2012/main" xmlns="">
         <p15:guide id="1" orient="horz" pos="2160">
           <p15:clr>
             <a:srgbClr val="A4A3A4"/>
@@ -230,7 +230,7 @@
           <a:p>
             <a:fld id="{A63B8CFC-D614-4432-A7DB-A65856E85B43}" type="datetimeFigureOut">
               <a:rPr lang="en-US" smtClean="0"/>
-              <a:t>4/14/2015</a:t>
+              <a:t>4/15/2015</a:t>
             </a:fld>
             <a:endParaRPr lang="en-US" dirty="0"/>
           </a:p>
@@ -924,10 +924,6 @@
               <a:rPr lang="en-US" baseline="0" dirty="0" smtClean="0"/>
               <a:t>Linux kernel source version 3.19.3 was the latest stable kernel version when development work began</a:t>
             </a:r>
-            <a:r>
-              <a:rPr lang="en-US" baseline="0" dirty="0" smtClean="0"/>
-              <a:t/>
-            </a:r>
             <a:br>
               <a:rPr lang="en-US" baseline="0" dirty="0" smtClean="0"/>
             </a:br>
@@ -1033,11 +1029,7 @@
           <a:p>
             <a:r>
               <a:rPr lang="en-US" dirty="0" smtClean="0"/>
-              <a:t>Red </a:t>
-            </a:r>
-            <a:r>
-              <a:rPr lang="en-US" dirty="0" smtClean="0"/>
-              <a:t>Boxes = new</a:t>
+              <a:t>Red Boxes = new</a:t>
             </a:r>
             <a:r>
               <a:rPr lang="en-US" baseline="0" dirty="0" smtClean="0"/>
@@ -1087,7 +1079,6 @@
               <a:rPr lang="en-US" baseline="0" dirty="0" smtClean="0"/>
               <a:t>“M=&lt;directory&gt;”: provides the absolute path to the external module being built </a:t>
             </a:r>
-            <a:endParaRPr lang="en-US" baseline="0" dirty="0" smtClean="0"/>
           </a:p>
           <a:p>
             <a:pPr marL="171450" indent="-171450">
@@ -1104,10 +1095,6 @@
             <a:r>
               <a:rPr lang="en-US" baseline="0" dirty="0" smtClean="0"/>
               <a:t>Note: the Makefile also builds the usbkbd and usbmouse drivers – modification of these was outside the scope of the project but these drivers are important for the Future Work</a:t>
-            </a:r>
-            <a:r>
-              <a:rPr lang="en-US" baseline="0" dirty="0" smtClean="0"/>
-              <a:t/>
             </a:r>
             <a:br>
               <a:rPr lang="en-US" baseline="0" dirty="0" smtClean="0"/>
@@ -1260,11 +1247,7 @@
             </a:r>
             <a:r>
               <a:rPr lang="en-US" u="sng" dirty="0" smtClean="0"/>
-              <a:t> </a:t>
-            </a:r>
-            <a:r>
-              <a:rPr lang="en-US" u="sng" dirty="0" smtClean="0"/>
-              <a:t>function</a:t>
+              <a:t> function</a:t>
             </a:r>
           </a:p>
           <a:p>
@@ -2659,6 +2642,36 @@
           <a:bodyPr/>
           <a:lstStyle/>
           <a:p>
+            <a:r>
+              <a:rPr lang="en-US" dirty="0" smtClean="0"/>
+              <a:t>1: Shows severity with which a system can be compromised.</a:t>
+            </a:r>
+          </a:p>
+          <a:p>
+            <a:endParaRPr lang="en-US" dirty="0" smtClean="0"/>
+          </a:p>
+          <a:p>
+            <a:r>
+              <a:rPr lang="en-US" dirty="0" smtClean="0"/>
+              <a:t>2: Much</a:t>
+            </a:r>
+            <a:r>
+              <a:rPr lang="en-US" baseline="0" dirty="0" smtClean="0"/>
+              <a:t> less attention has been paid to authentication of </a:t>
+            </a:r>
+            <a:r>
+              <a:rPr lang="en-US" baseline="0" smtClean="0"/>
+              <a:t>USB HIDs</a:t>
+            </a:r>
+          </a:p>
+          <a:p>
+            <a:endParaRPr lang="en-US" baseline="0" dirty="0" smtClean="0"/>
+          </a:p>
+          <a:p>
+            <a:r>
+              <a:rPr lang="en-US" baseline="0" dirty="0" smtClean="0"/>
+              <a:t>4: Speed of typing, relative times of presses and releases of the keys.</a:t>
+            </a:r>
             <a:endParaRPr lang="en-US" dirty="0"/>
           </a:p>
         </p:txBody>
@@ -3660,7 +3673,7 @@
           <a:p>
             <a:fld id="{ADE5661A-BDAA-4579-B2F5-AA9011776D83}" type="datetimeFigureOut">
               <a:rPr lang="en-US" smtClean="0"/>
-              <a:t>4/14/2015</a:t>
+              <a:t>4/15/2015</a:t>
             </a:fld>
             <a:endParaRPr lang="en-US" dirty="0"/>
           </a:p>
@@ -3858,7 +3871,7 @@
             <a:fld id="{1D8BD707-D9CF-40AE-B4C6-C98DA3205C09}" type="datetimeFigureOut">
               <a:rPr lang="en-US" smtClean="0"/>
               <a:pPr/>
-              <a:t>4/14/2015</a:t>
+              <a:t>4/15/2015</a:t>
             </a:fld>
             <a:endParaRPr lang="en-US" dirty="0"/>
           </a:p>
@@ -4045,7 +4058,7 @@
             <a:fld id="{1D8BD707-D9CF-40AE-B4C6-C98DA3205C09}" type="datetimeFigureOut">
               <a:rPr lang="en-US" smtClean="0"/>
               <a:pPr/>
-              <a:t>4/14/2015</a:t>
+              <a:t>4/15/2015</a:t>
             </a:fld>
             <a:endParaRPr lang="en-US" dirty="0"/>
           </a:p>
@@ -4197,7 +4210,7 @@
             <a:fld id="{1D8BD707-D9CF-40AE-B4C6-C98DA3205C09}" type="datetimeFigureOut">
               <a:rPr lang="en-US" smtClean="0"/>
               <a:pPr/>
-              <a:t>4/14/2015</a:t>
+              <a:t>4/15/2015</a:t>
             </a:fld>
             <a:endParaRPr lang="en-US" dirty="0"/>
           </a:p>
@@ -4453,7 +4466,7 @@
           <a:p>
             <a:fld id="{7D698992-9F5B-4E9D-871D-4517B2EC8643}" type="datetimeFigureOut">
               <a:rPr lang="en-US" smtClean="0"/>
-              <a:t>4/14/2015</a:t>
+              <a:t>4/15/2015</a:t>
             </a:fld>
             <a:endParaRPr lang="en-US" dirty="0"/>
           </a:p>
@@ -4863,7 +4876,7 @@
             <a:fld id="{1D8BD707-D9CF-40AE-B4C6-C98DA3205C09}" type="datetimeFigureOut">
               <a:rPr lang="en-US" smtClean="0"/>
               <a:pPr/>
-              <a:t>4/14/2015</a:t>
+              <a:t>4/15/2015</a:t>
             </a:fld>
             <a:endParaRPr lang="en-US" dirty="0"/>
           </a:p>
@@ -5311,7 +5324,7 @@
             <a:fld id="{1D8BD707-D9CF-40AE-B4C6-C98DA3205C09}" type="datetimeFigureOut">
               <a:rPr lang="en-US" smtClean="0"/>
               <a:pPr/>
-              <a:t>4/14/2015</a:t>
+              <a:t>4/15/2015</a:t>
             </a:fld>
             <a:endParaRPr lang="en-US" dirty="0"/>
           </a:p>
@@ -5414,7 +5427,7 @@
             <a:fld id="{1D8BD707-D9CF-40AE-B4C6-C98DA3205C09}" type="datetimeFigureOut">
               <a:rPr lang="en-US" smtClean="0"/>
               <a:pPr/>
-              <a:t>4/14/2015</a:t>
+              <a:t>4/15/2015</a:t>
             </a:fld>
             <a:endParaRPr lang="en-US" dirty="0"/>
           </a:p>
@@ -5537,7 +5550,7 @@
             <a:fld id="{1D8BD707-D9CF-40AE-B4C6-C98DA3205C09}" type="datetimeFigureOut">
               <a:rPr lang="en-US" smtClean="0"/>
               <a:pPr/>
-              <a:t>4/14/2015</a:t>
+              <a:t>4/15/2015</a:t>
             </a:fld>
             <a:endParaRPr lang="en-US" dirty="0"/>
           </a:p>
@@ -5813,7 +5826,7 @@
             <a:fld id="{1D8BD707-D9CF-40AE-B4C6-C98DA3205C09}" type="datetimeFigureOut">
               <a:rPr lang="en-US" smtClean="0"/>
               <a:pPr/>
-              <a:t>4/14/2015</a:t>
+              <a:t>4/15/2015</a:t>
             </a:fld>
             <a:endParaRPr lang="en-US" dirty="0"/>
           </a:p>
@@ -6020,7 +6033,7 @@
             <a:fld id="{1D8BD707-D9CF-40AE-B4C6-C98DA3205C09}" type="datetimeFigureOut">
               <a:rPr lang="en-US" smtClean="0"/>
               <a:pPr/>
-              <a:t>4/14/2015</a:t>
+              <a:t>4/15/2015</a:t>
             </a:fld>
             <a:endParaRPr lang="en-US" dirty="0"/>
           </a:p>
@@ -7131,7 +7144,7 @@
             <a:fld id="{1D8BD707-D9CF-40AE-B4C6-C98DA3205C09}" type="datetimeFigureOut">
               <a:rPr lang="en-US" smtClean="0"/>
               <a:pPr/>
-              <a:t>4/14/2015</a:t>
+              <a:t>4/15/2015</a:t>
             </a:fld>
             <a:endParaRPr lang="en-US" dirty="0"/>
           </a:p>
@@ -8648,11 +8661,7 @@
           <a:p>
             <a:r>
               <a:rPr lang="en-US" dirty="0" smtClean="0"/>
-              <a:t>Kernel: </a:t>
-            </a:r>
-            <a:r>
-              <a:rPr lang="en-US" dirty="0" smtClean="0"/>
-              <a:t>Summary</a:t>
+              <a:t>Kernel: Summary</a:t>
             </a:r>
             <a:endParaRPr lang="en-US" dirty="0"/>
           </a:p>
@@ -8840,15 +8849,7 @@
           <a:p>
             <a:r>
               <a:rPr lang="en-US" dirty="0" smtClean="0"/>
-              <a:t>Kernel: </a:t>
-            </a:r>
-            <a:r>
-              <a:rPr lang="en-US" dirty="0" smtClean="0"/>
-              <a:t>Makefile </a:t>
-            </a:r>
-            <a:r>
-              <a:rPr lang="en-US" dirty="0" smtClean="0"/>
-              <a:t>Modification</a:t>
+              <a:t>Kernel: Makefile Modification</a:t>
             </a:r>
             <a:endParaRPr lang="en-US" dirty="0"/>
           </a:p>
@@ -9961,11 +9962,7 @@
           <a:p>
             <a:r>
               <a:rPr lang="en-US" dirty="0" smtClean="0"/>
-              <a:t>Experimental </a:t>
-            </a:r>
-            <a:r>
-              <a:rPr lang="en-US" dirty="0" smtClean="0"/>
-              <a:t>Results</a:t>
+              <a:t>Experimental Results</a:t>
             </a:r>
             <a:endParaRPr lang="en-US" dirty="0"/>
           </a:p>
@@ -10033,15 +10030,7 @@
             </a:r>
             <a:r>
               <a:rPr lang="en-US" dirty="0" smtClean="0"/>
-              <a:t>esults (con</a:t>
-            </a:r>
-            <a:r>
-              <a:rPr lang="en-US" dirty="0" smtClean="0"/>
-              <a:t>t’d</a:t>
-            </a:r>
-            <a:r>
-              <a:rPr lang="en-US" dirty="0" smtClean="0"/>
-              <a:t>)</a:t>
+              <a:t>esults (cont’d)</a:t>
             </a:r>
             <a:endParaRPr lang="en-US" dirty="0"/>
           </a:p>
@@ -10729,7 +10718,6 @@
               <a:rPr lang="en-US" sz="1900" dirty="0" smtClean="0"/>
               <a:t>Configure the Bash shell script to work for each system user</a:t>
             </a:r>
-            <a:endParaRPr lang="en-US" sz="1900" dirty="0" smtClean="0"/>
           </a:p>
         </p:txBody>
       </p:sp>
@@ -11184,6 +11172,9 @@
             <a:endParaRPr lang="en-US" sz="2000" dirty="0"/>
           </a:p>
           <a:p>
+            <a:pPr marL="109728" indent="0">
+              <a:buNone/>
+            </a:pPr>
             <a:r>
               <a:rPr lang="en-US" sz="2000" dirty="0" smtClean="0"/>
               <a:t>Two phases of the project:</a:t>
@@ -11452,7 +11443,7 @@
         <p:spPr>
           <a:xfrm>
             <a:off x="685800" y="1600200"/>
-            <a:ext cx="7772400" cy="4190999"/>
+            <a:ext cx="7772400" cy="4648200"/>
           </a:xfrm>
         </p:spPr>
         <p:txBody>
@@ -11461,7 +11452,148 @@
           </a:bodyPr>
           <a:lstStyle/>
           <a:p>
-            <a:endParaRPr lang="en-US" dirty="0" smtClean="0"/>
+            <a:r>
+              <a:rPr lang="en-US" sz="2000" dirty="0" smtClean="0"/>
+              <a:t>S. </a:t>
+            </a:r>
+            <a:r>
+              <a:rPr lang="en-US" sz="2000" dirty="0" err="1" smtClean="0"/>
+              <a:t>Kamkar</a:t>
+            </a:r>
+            <a:r>
+              <a:rPr lang="en-US" sz="2000" dirty="0" smtClean="0"/>
+              <a:t> – “</a:t>
+            </a:r>
+            <a:r>
+              <a:rPr lang="en-US" sz="2000" dirty="0" err="1" smtClean="0"/>
+              <a:t>USBDriveby</a:t>
+            </a:r>
+            <a:r>
+              <a:rPr lang="en-US" sz="2000" dirty="0" smtClean="0"/>
+              <a:t>”</a:t>
+            </a:r>
+          </a:p>
+          <a:p>
+            <a:pPr lvl="1"/>
+            <a:r>
+              <a:rPr lang="en-US" sz="1600" dirty="0" smtClean="0"/>
+              <a:t>Using Teensy microcontroller to create a permanent connection to a remote server that is controller by the attacker.</a:t>
+            </a:r>
+          </a:p>
+          <a:p>
+            <a:r>
+              <a:rPr lang="en-US" sz="2000" dirty="0" smtClean="0"/>
+              <a:t>Z. Wang and A. </a:t>
+            </a:r>
+            <a:r>
+              <a:rPr lang="en-US" sz="2000" dirty="0" err="1" smtClean="0"/>
+              <a:t>Stavrou</a:t>
+            </a:r>
+            <a:endParaRPr lang="en-US" sz="2000" dirty="0" smtClean="0"/>
+          </a:p>
+          <a:p>
+            <a:pPr lvl="1"/>
+            <a:r>
+              <a:rPr lang="en-US" sz="1600" dirty="0" smtClean="0"/>
+              <a:t>Proposes an extension to the USB driver.</a:t>
+            </a:r>
+          </a:p>
+          <a:p>
+            <a:pPr lvl="1"/>
+            <a:r>
+              <a:rPr lang="en-US" sz="1600" dirty="0" smtClean="0"/>
+              <a:t>Excludes “non-programmable devices” such as keyboards and mice.</a:t>
+            </a:r>
+          </a:p>
+          <a:p>
+            <a:r>
+              <a:rPr lang="en-US" sz="2000" dirty="0" smtClean="0"/>
+              <a:t>A. Crenshaw – “Plug and Prey”</a:t>
+            </a:r>
+          </a:p>
+          <a:p>
+            <a:pPr lvl="1"/>
+            <a:r>
+              <a:rPr lang="en-US" sz="1600" dirty="0" smtClean="0"/>
+              <a:t>Use registry changes to prevent USB devices from being installed.</a:t>
+            </a:r>
+          </a:p>
+          <a:p>
+            <a:pPr lvl="1"/>
+            <a:r>
+              <a:rPr lang="en-US" sz="1600" dirty="0" smtClean="0"/>
+              <a:t>Will also prevent legitimate HIDs from being installed.</a:t>
+            </a:r>
+          </a:p>
+          <a:p>
+            <a:r>
+              <a:rPr lang="en-US" sz="2000" dirty="0" smtClean="0"/>
+              <a:t>F. </a:t>
+            </a:r>
+            <a:r>
+              <a:rPr lang="en-US" sz="2000" dirty="0" err="1" smtClean="0"/>
+              <a:t>Barbhuiya</a:t>
+            </a:r>
+            <a:endParaRPr lang="en-US" sz="2000" dirty="0" smtClean="0"/>
+          </a:p>
+          <a:p>
+            <a:pPr lvl="1"/>
+            <a:r>
+              <a:rPr lang="en-US" sz="1600" dirty="0" smtClean="0"/>
+              <a:t>Authentication based on keystroke dynamics</a:t>
+            </a:r>
+          </a:p>
+          <a:p>
+            <a:pPr lvl="1"/>
+            <a:r>
+              <a:rPr lang="en-US" sz="1600" dirty="0" smtClean="0"/>
+              <a:t>Would not work if attack is very short</a:t>
+            </a:r>
+          </a:p>
+          <a:p>
+            <a:r>
+              <a:rPr lang="en-US" sz="2000" dirty="0" smtClean="0"/>
+              <a:t>K. </a:t>
+            </a:r>
+            <a:r>
+              <a:rPr lang="en-US" sz="2000" dirty="0" err="1" smtClean="0"/>
+              <a:t>Nohl</a:t>
+            </a:r>
+            <a:r>
+              <a:rPr lang="en-US" sz="2000" dirty="0" smtClean="0"/>
+              <a:t> and J. </a:t>
+            </a:r>
+            <a:r>
+              <a:rPr lang="en-US" sz="2000" dirty="0" err="1" smtClean="0"/>
+              <a:t>Lell</a:t>
+            </a:r>
+            <a:r>
+              <a:rPr lang="en-US" sz="2000" dirty="0" smtClean="0"/>
+              <a:t> – “</a:t>
+            </a:r>
+            <a:r>
+              <a:rPr lang="en-US" sz="2000" dirty="0" err="1" smtClean="0"/>
+              <a:t>BadUSB</a:t>
+            </a:r>
+            <a:r>
+              <a:rPr lang="en-US" sz="2000" dirty="0" smtClean="0"/>
+              <a:t>”</a:t>
+            </a:r>
+          </a:p>
+          <a:p>
+            <a:pPr lvl="1"/>
+            <a:r>
+              <a:rPr lang="en-US" sz="1600" dirty="0" smtClean="0"/>
+              <a:t>Describes how an emulated keyboard could steal the administrative password on a Linux OS.</a:t>
+            </a:r>
+          </a:p>
+          <a:p>
+            <a:pPr lvl="1"/>
+            <a:endParaRPr lang="en-US" sz="1600" dirty="0" smtClean="0"/>
+          </a:p>
+          <a:p>
+            <a:pPr lvl="1"/>
+            <a:endParaRPr lang="en-US" sz="1600" dirty="0" smtClean="0"/>
           </a:p>
         </p:txBody>
       </p:sp>

</xml_diff>

<commit_message>
Made edits to the presentation and notes. Should be ready for submission.
</commit_message>
<xml_diff>
--- a/Project/Final_Project_Presentation_Fasburg_Reiff_Thomas.pptx
+++ b/Project/Final_Project_Presentation_Fasburg_Reiff_Thomas.pptx
@@ -131,7 +131,7 @@
   </p:defaultTextStyle>
   <p:extLst>
     <p:ext uri="{EFAFB233-063F-42B5-8137-9DF3F51BA10A}">
-      <p15:sldGuideLst xmlns:p15="http://schemas.microsoft.com/office/powerpoint/2012/main" xmlns="">
+      <p15:sldGuideLst xmlns:p15="http://schemas.microsoft.com/office/powerpoint/2012/main">
         <p15:guide id="1" orient="horz" pos="2160">
           <p15:clr>
             <a:srgbClr val="A4A3A4"/>
@@ -230,7 +230,7 @@
           <a:p>
             <a:fld id="{A63B8CFC-D614-4432-A7DB-A65856E85B43}" type="datetimeFigureOut">
               <a:rPr lang="en-US" smtClean="0"/>
-              <a:t>4/15/2015</a:t>
+              <a:t>4/19/2015</a:t>
             </a:fld>
             <a:endParaRPr lang="en-US" dirty="0"/>
           </a:p>
@@ -742,8 +742,12 @@
               <a:buChar char="•"/>
             </a:pPr>
             <a:r>
-              <a:rPr lang="en-US" baseline="0" dirty="0" smtClean="0"/>
-              <a:t>The system will not block on script execution due to the creation of a separate thread to run the shell commands</a:t>
+              <a:rPr lang="en-US" b="1" baseline="0" dirty="0" smtClean="0"/>
+              <a:t>SEPARATE THREAD: The </a:t>
+            </a:r>
+            <a:r>
+              <a:rPr lang="en-US" b="1" baseline="0" dirty="0" smtClean="0"/>
+              <a:t>system will not block on script execution due to the creation of a separate thread to run the shell commands</a:t>
             </a:r>
           </a:p>
           <a:p>
@@ -1033,7 +1037,41 @@
             </a:r>
             <a:r>
               <a:rPr lang="en-US" baseline="0" dirty="0" smtClean="0"/>
-              <a:t> additions</a:t>
+              <a:t> </a:t>
+            </a:r>
+            <a:r>
+              <a:rPr lang="en-US" baseline="0" dirty="0" smtClean="0"/>
+              <a:t>additions</a:t>
+            </a:r>
+          </a:p>
+          <a:p>
+            <a:r>
+              <a:rPr lang="en-US" baseline="0" dirty="0" smtClean="0"/>
+              <a:t>Note: the </a:t>
+            </a:r>
+            <a:r>
+              <a:rPr lang="en-US" baseline="0" dirty="0" err="1" smtClean="0"/>
+              <a:t>Makefile</a:t>
+            </a:r>
+            <a:r>
+              <a:rPr lang="en-US" baseline="0" dirty="0" smtClean="0"/>
+              <a:t> also builds the </a:t>
+            </a:r>
+            <a:r>
+              <a:rPr lang="en-US" baseline="0" dirty="0" err="1" smtClean="0"/>
+              <a:t>usbkbd</a:t>
+            </a:r>
+            <a:r>
+              <a:rPr lang="en-US" baseline="0" dirty="0" smtClean="0"/>
+              <a:t> and </a:t>
+            </a:r>
+            <a:r>
+              <a:rPr lang="en-US" baseline="0" dirty="0" err="1" smtClean="0"/>
+              <a:t>usbmouse</a:t>
+            </a:r>
+            <a:r>
+              <a:rPr lang="en-US" baseline="0" dirty="0" smtClean="0"/>
+              <a:t> drivers – modification of these was outside the scope of the project but these drivers are important for the Future Work</a:t>
             </a:r>
             <a:endParaRPr lang="en-US" dirty="0" smtClean="0"/>
           </a:p>
@@ -1077,24 +1115,15 @@
             </a:pPr>
             <a:r>
               <a:rPr lang="en-US" baseline="0" dirty="0" smtClean="0"/>
-              <a:t>“M=&lt;directory&gt;”: provides the absolute path to the external module being built </a:t>
-            </a:r>
-          </a:p>
-          <a:p>
-            <a:pPr marL="171450" indent="-171450">
-              <a:buFont typeface="Arial" panose="020B0604020202020204" pitchFamily="34" charset="0"/>
-              <a:buChar char="•"/>
-            </a:pPr>
-            <a:endParaRPr lang="en-US" baseline="0" dirty="0" smtClean="0"/>
-          </a:p>
-          <a:p>
-            <a:pPr marL="0" indent="0">
-              <a:buFont typeface="Arial" panose="020B0604020202020204" pitchFamily="34" charset="0"/>
-              <a:buNone/>
-            </a:pPr>
+              <a:t>“M=&lt;directory&gt;”: provides the absolute path to the </a:t>
+            </a:r>
+            <a:r>
+              <a:rPr lang="en-US" b="1" baseline="0" dirty="0" smtClean="0"/>
+              <a:t>external module </a:t>
+            </a:r>
             <a:r>
               <a:rPr lang="en-US" baseline="0" dirty="0" smtClean="0"/>
-              <a:t>Note: the Makefile also builds the usbkbd and usbmouse drivers – modification of these was outside the scope of the project but these drivers are important for the Future Work</a:t>
+              <a:t>being built </a:t>
             </a:r>
             <a:br>
               <a:rPr lang="en-US" baseline="0" dirty="0" smtClean="0"/>
@@ -1430,6 +1459,34 @@
           <a:bodyPr/>
           <a:lstStyle/>
           <a:p>
+            <a:pPr marL="171450" indent="-171450">
+              <a:buFont typeface="Arial" panose="020B0604020202020204" pitchFamily="34" charset="0"/>
+              <a:buChar char="•"/>
+            </a:pPr>
+            <a:r>
+              <a:rPr lang="en-US" dirty="0" smtClean="0"/>
+              <a:t>Keyboard and mouse</a:t>
+            </a:r>
+            <a:r>
+              <a:rPr lang="en-US" baseline="0" dirty="0" smtClean="0"/>
+              <a:t> restriction and un-restriction done via xmodmap utility (part of the overall X Window System  / X Server)</a:t>
+            </a:r>
+          </a:p>
+          <a:p>
+            <a:pPr marL="171450" indent="-171450">
+              <a:buFont typeface="Arial" panose="020B0604020202020204" pitchFamily="34" charset="0"/>
+              <a:buChar char="•"/>
+            </a:pPr>
+            <a:r>
+              <a:rPr lang="en-US" baseline="0" dirty="0" smtClean="0"/>
+              <a:t>Captcha must be completed to un-restrict devices because all other ways of exiting the program have been disabled</a:t>
+            </a:r>
+          </a:p>
+          <a:p>
+            <a:pPr marL="171450" indent="-171450">
+              <a:buFont typeface="Arial" panose="020B0604020202020204" pitchFamily="34" charset="0"/>
+              <a:buChar char="•"/>
+            </a:pPr>
             <a:endParaRPr lang="en-US" dirty="0"/>
           </a:p>
         </p:txBody>
@@ -1775,14 +1832,40 @@
             <a:endParaRPr lang="en-US" dirty="0" smtClean="0"/>
           </a:p>
           <a:p>
+            <a:pPr marL="0" marR="0" indent="0" algn="l" defTabSz="914400" rtl="0" eaLnBrk="1" fontAlgn="auto" latinLnBrk="0" hangingPunct="1">
+              <a:lnSpc>
+                <a:spcPct val="100000"/>
+              </a:lnSpc>
+              <a:spcBef>
+                <a:spcPts val="0"/>
+              </a:spcBef>
+              <a:spcAft>
+                <a:spcPts val="0"/>
+              </a:spcAft>
+              <a:buClrTx/>
+              <a:buSzTx/>
+              <a:buFontTx/>
+              <a:buNone/>
+              <a:tabLst/>
+              <a:defRPr/>
+            </a:pPr>
             <a:r>
               <a:rPr lang="en-US" b="1" dirty="0" smtClean="0"/>
               <a:t>Limitations of testing:</a:t>
             </a:r>
             <a:r>
               <a:rPr lang="en-US" b="1" baseline="0" dirty="0" smtClean="0"/>
-              <a:t> no testing done for keyboard based attack on the # of keystrokes entered into the terminal or the % of time that the terminal is spawned</a:t>
-            </a:r>
+              <a:t> no testing done </a:t>
+            </a:r>
+            <a:r>
+              <a:rPr lang="en-US" b="1" baseline="0" dirty="0" smtClean="0"/>
+              <a:t>for keyboard-based attack on the % of time that the terminal is spawned or </a:t>
+            </a:r>
+            <a:r>
+              <a:rPr lang="en-US" b="1" baseline="0" dirty="0" smtClean="0"/>
+              <a:t>the # of keystrokes entered into the terminal </a:t>
+            </a:r>
+            <a:endParaRPr lang="en-US" b="1" baseline="0" dirty="0" smtClean="0"/>
           </a:p>
           <a:p>
             <a:pPr marL="171450" indent="-171450">
@@ -1791,19 +1874,23 @@
             </a:pPr>
             <a:r>
               <a:rPr lang="en-US" b="1" baseline="0" dirty="0" smtClean="0"/>
-              <a:t>Results inconsistent due to variables such as hardware performance, CPU usage, and delay/optimization of Teensy attack code</a:t>
-            </a:r>
-          </a:p>
-          <a:p>
-            <a:pPr marL="171450" indent="-171450">
+              <a:t>Results </a:t>
+            </a:r>
+            <a:r>
+              <a:rPr lang="en-US" b="1" baseline="0" dirty="0" smtClean="0"/>
+              <a:t>inconsistent due to variables such as hardware performance, CPU usage, and delay/optimization of Teensy attack </a:t>
+            </a:r>
+            <a:r>
+              <a:rPr lang="en-US" b="1" baseline="0" dirty="0" smtClean="0"/>
+              <a:t>code</a:t>
+            </a:r>
+          </a:p>
+          <a:p>
+            <a:pPr marL="0" indent="0">
               <a:buFont typeface="Arial" panose="020B0604020202020204" pitchFamily="34" charset="0"/>
-              <a:buChar char="•"/>
+              <a:buNone/>
             </a:pPr>
-            <a:r>
-              <a:rPr lang="en-US" b="1" baseline="0" dirty="0" smtClean="0"/>
-              <a:t>Implementation specific problem</a:t>
-            </a:r>
-            <a:endParaRPr lang="en-US" b="1" dirty="0" smtClean="0"/>
+            <a:endParaRPr lang="en-US" b="1" baseline="0" dirty="0" smtClean="0"/>
           </a:p>
         </p:txBody>
       </p:sp>
@@ -1990,13 +2077,21 @@
             <a:endParaRPr lang="en-US" b="1" u="sng" dirty="0" smtClean="0"/>
           </a:p>
           <a:p>
-            <a:pPr marL="171450" indent="-171450">
+            <a:pPr marL="171450" lvl="0" indent="-171450">
               <a:buFont typeface="Arial" panose="020B0604020202020204" pitchFamily="34" charset="0"/>
               <a:buChar char="•"/>
             </a:pPr>
             <a:r>
+              <a:rPr lang="en-US" u="none" dirty="0" smtClean="0"/>
+              <a:t>Consequences</a:t>
+            </a:r>
+            <a:r>
               <a:rPr lang="en-US" u="none" baseline="0" dirty="0" smtClean="0"/>
-              <a:t>Weaknesses revealed via testing:</a:t>
+              <a:t> </a:t>
+            </a:r>
+            <a:r>
+              <a:rPr lang="en-US" u="none" baseline="0" dirty="0" smtClean="0"/>
+              <a:t>of using any connected keyboard or mouse:</a:t>
             </a:r>
           </a:p>
           <a:p>
@@ -2006,13 +2101,29 @@
             </a:pPr>
             <a:r>
               <a:rPr lang="en-US" u="none" baseline="0" dirty="0" smtClean="0"/>
-              <a:t>Bullet #1: see experimental results related to the emulated HID </a:t>
-            </a:r>
-            <a:r>
-              <a:rPr lang="en-US" u="none" baseline="0" dirty="0" smtClean="0">
-                <a:sym typeface="Wingdings" panose="05000000000000000000" pitchFamily="2" charset="2"/>
-              </a:rPr>
-              <a:t> delay allows the Teensy to execute some commands before the restrictions are imposed and the CAPTCHA GUI loads and grabs focus</a:t>
+              <a:t>Users may complete the </a:t>
+            </a:r>
+            <a:r>
+              <a:rPr lang="en-US" u="none" baseline="0" dirty="0" smtClean="0"/>
+              <a:t>captcha </a:t>
+            </a:r>
+            <a:r>
+              <a:rPr lang="en-US" u="none" baseline="0" dirty="0" smtClean="0"/>
+              <a:t>for an emulated HID if they fail to heed warning about completing the validation for malicious devices</a:t>
+            </a:r>
+          </a:p>
+          <a:p>
+            <a:pPr marL="171450" lvl="0" indent="-171450">
+              <a:buFont typeface="Arial" panose="020B0604020202020204" pitchFamily="34" charset="0"/>
+              <a:buChar char="•"/>
+            </a:pPr>
+            <a:r>
+              <a:rPr lang="en-US" b="1" u="none" baseline="0" dirty="0" smtClean="0"/>
+              <a:t>(Out of Scope)</a:t>
+            </a:r>
+            <a:r>
+              <a:rPr lang="en-US" b="0" u="none" baseline="0" dirty="0" smtClean="0"/>
+              <a:t> </a:t>
             </a:r>
           </a:p>
           <a:p>
@@ -2021,24 +2132,8 @@
               <a:buChar char="•"/>
             </a:pPr>
             <a:r>
-              <a:rPr lang="en-US" u="none" baseline="0" dirty="0" smtClean="0">
-                <a:sym typeface="Wingdings" panose="05000000000000000000" pitchFamily="2" charset="2"/>
-              </a:rPr>
-              <a:t>Bullet #2: N/A</a:t>
-            </a:r>
-          </a:p>
-          <a:p>
-            <a:pPr marL="171450" lvl="0" indent="-171450">
-              <a:buFont typeface="Arial" panose="020B0604020202020204" pitchFamily="34" charset="0"/>
-              <a:buChar char="•"/>
-            </a:pPr>
-            <a:r>
-              <a:rPr lang="en-US" u="none" dirty="0" smtClean="0"/>
-              <a:t>Consequences</a:t>
-            </a:r>
-            <a:r>
-              <a:rPr lang="en-US" u="none" baseline="0" dirty="0" smtClean="0"/>
-              <a:t> of using any connected keyboard or mouse:</a:t>
+              <a:rPr lang="en-US" b="0" u="none" baseline="0" dirty="0" smtClean="0"/>
+              <a:t>Example: embed Teensy microcontroller with an attack loaded into a real keyboard</a:t>
             </a:r>
           </a:p>
           <a:p>
@@ -2047,22 +2142,16 @@
               <a:buChar char="•"/>
             </a:pPr>
             <a:r>
-              <a:rPr lang="en-US" u="none" baseline="0" dirty="0" smtClean="0"/>
-              <a:t>Users may complete the CAPTCHA for an emulated HID if they fail to heed warning about completing the validation for malicious devices</a:t>
-            </a:r>
-          </a:p>
-          <a:p>
-            <a:pPr marL="171450" lvl="0" indent="-171450">
-              <a:buFont typeface="Arial" panose="020B0604020202020204" pitchFamily="34" charset="0"/>
-              <a:buChar char="•"/>
-            </a:pPr>
-            <a:r>
-              <a:rPr lang="en-US" b="1" u="none" baseline="0" dirty="0" smtClean="0"/>
-              <a:t>(Out of Scope)</a:t>
-            </a:r>
-            <a:r>
               <a:rPr lang="en-US" b="0" u="none" baseline="0" dirty="0" smtClean="0"/>
-              <a:t> </a:t>
+              <a:t>Scenario: user plugs in the keyboard with the embedded Teensy and completes the </a:t>
+            </a:r>
+            <a:r>
+              <a:rPr lang="en-US" b="0" u="none" baseline="0" dirty="0" smtClean="0"/>
+              <a:t>captcha </a:t>
+            </a:r>
+            <a:r>
+              <a:rPr lang="en-US" b="0" u="none" baseline="0" dirty="0" smtClean="0"/>
+              <a:t>GUI</a:t>
             </a:r>
           </a:p>
           <a:p>
@@ -2072,27 +2161,15 @@
             </a:pPr>
             <a:r>
               <a:rPr lang="en-US" b="0" u="none" baseline="0" dirty="0" smtClean="0"/>
-              <a:t>Example: embed Teensy microcontroller with an attack loaded into a real keyboard</a:t>
-            </a:r>
-          </a:p>
-          <a:p>
-            <a:pPr marL="628650" lvl="1" indent="-171450">
-              <a:buFont typeface="Arial" panose="020B0604020202020204" pitchFamily="34" charset="0"/>
-              <a:buChar char="•"/>
-            </a:pPr>
+              <a:t>Consequences: Teensy can begin executing attack commands after the </a:t>
+            </a:r>
             <a:r>
               <a:rPr lang="en-US" b="0" u="none" baseline="0" dirty="0" smtClean="0"/>
-              <a:t>Scenario: user plugs in the keyboard with the embedded Teensy and completes the CAPTCHA GUI</a:t>
-            </a:r>
-          </a:p>
-          <a:p>
-            <a:pPr marL="628650" lvl="1" indent="-171450">
-              <a:buFont typeface="Arial" panose="020B0604020202020204" pitchFamily="34" charset="0"/>
-              <a:buChar char="•"/>
-            </a:pPr>
+              <a:t>captcha </a:t>
+            </a:r>
             <a:r>
               <a:rPr lang="en-US" b="0" u="none" baseline="0" dirty="0" smtClean="0"/>
-              <a:t>Consequences: Teensy can begin executing attack commands after the CAPTCHA is completed by the human user</a:t>
+              <a:t>is completed by the human user</a:t>
             </a:r>
             <a:endParaRPr lang="en-US" b="1" u="none" baseline="0" dirty="0" smtClean="0"/>
           </a:p>
@@ -2191,16 +2268,6 @@
             </a:r>
           </a:p>
           <a:p>
-            <a:pPr marL="171450" indent="-171450">
-              <a:buFont typeface="Arial" panose="020B0604020202020204" pitchFamily="34" charset="0"/>
-              <a:buChar char="•"/>
-            </a:pPr>
-            <a:r>
-              <a:rPr lang="en-US" u="none" baseline="0" dirty="0" smtClean="0"/>
-              <a:t>CAPTCHA Improvements: N/A</a:t>
-            </a:r>
-          </a:p>
-          <a:p>
             <a:pPr marL="171450" marR="0" lvl="1" indent="-171450" algn="l" defTabSz="914400" rtl="0" eaLnBrk="1" fontAlgn="auto" latinLnBrk="0" hangingPunct="1">
               <a:lnSpc>
                 <a:spcPct val="100000"/>
@@ -2220,7 +2287,11 @@
             </a:pPr>
             <a:r>
               <a:rPr lang="en-US" u="none" baseline="0" dirty="0" smtClean="0"/>
-              <a:t>Driver Modification Improvements: </a:t>
+              <a:t>Driver </a:t>
+            </a:r>
+            <a:r>
+              <a:rPr lang="en-US" u="none" baseline="0" dirty="0" smtClean="0"/>
+              <a:t>Modification Improvements: </a:t>
             </a:r>
             <a:r>
               <a:rPr lang="en-US" b="1" u="none" baseline="0" dirty="0" smtClean="0"/>
@@ -3673,7 +3744,7 @@
           <a:p>
             <a:fld id="{ADE5661A-BDAA-4579-B2F5-AA9011776D83}" type="datetimeFigureOut">
               <a:rPr lang="en-US" smtClean="0"/>
-              <a:t>4/15/2015</a:t>
+              <a:t>4/19/2015</a:t>
             </a:fld>
             <a:endParaRPr lang="en-US" dirty="0"/>
           </a:p>
@@ -3871,7 +3942,7 @@
             <a:fld id="{1D8BD707-D9CF-40AE-B4C6-C98DA3205C09}" type="datetimeFigureOut">
               <a:rPr lang="en-US" smtClean="0"/>
               <a:pPr/>
-              <a:t>4/15/2015</a:t>
+              <a:t>4/19/2015</a:t>
             </a:fld>
             <a:endParaRPr lang="en-US" dirty="0"/>
           </a:p>
@@ -4058,7 +4129,7 @@
             <a:fld id="{1D8BD707-D9CF-40AE-B4C6-C98DA3205C09}" type="datetimeFigureOut">
               <a:rPr lang="en-US" smtClean="0"/>
               <a:pPr/>
-              <a:t>4/15/2015</a:t>
+              <a:t>4/19/2015</a:t>
             </a:fld>
             <a:endParaRPr lang="en-US" dirty="0"/>
           </a:p>
@@ -4210,7 +4281,7 @@
             <a:fld id="{1D8BD707-D9CF-40AE-B4C6-C98DA3205C09}" type="datetimeFigureOut">
               <a:rPr lang="en-US" smtClean="0"/>
               <a:pPr/>
-              <a:t>4/15/2015</a:t>
+              <a:t>4/19/2015</a:t>
             </a:fld>
             <a:endParaRPr lang="en-US" dirty="0"/>
           </a:p>
@@ -4466,7 +4537,7 @@
           <a:p>
             <a:fld id="{7D698992-9F5B-4E9D-871D-4517B2EC8643}" type="datetimeFigureOut">
               <a:rPr lang="en-US" smtClean="0"/>
-              <a:t>4/15/2015</a:t>
+              <a:t>4/19/2015</a:t>
             </a:fld>
             <a:endParaRPr lang="en-US" dirty="0"/>
           </a:p>
@@ -4876,7 +4947,7 @@
             <a:fld id="{1D8BD707-D9CF-40AE-B4C6-C98DA3205C09}" type="datetimeFigureOut">
               <a:rPr lang="en-US" smtClean="0"/>
               <a:pPr/>
-              <a:t>4/15/2015</a:t>
+              <a:t>4/19/2015</a:t>
             </a:fld>
             <a:endParaRPr lang="en-US" dirty="0"/>
           </a:p>
@@ -5324,7 +5395,7 @@
             <a:fld id="{1D8BD707-D9CF-40AE-B4C6-C98DA3205C09}" type="datetimeFigureOut">
               <a:rPr lang="en-US" smtClean="0"/>
               <a:pPr/>
-              <a:t>4/15/2015</a:t>
+              <a:t>4/19/2015</a:t>
             </a:fld>
             <a:endParaRPr lang="en-US" dirty="0"/>
           </a:p>
@@ -5427,7 +5498,7 @@
             <a:fld id="{1D8BD707-D9CF-40AE-B4C6-C98DA3205C09}" type="datetimeFigureOut">
               <a:rPr lang="en-US" smtClean="0"/>
               <a:pPr/>
-              <a:t>4/15/2015</a:t>
+              <a:t>4/19/2015</a:t>
             </a:fld>
             <a:endParaRPr lang="en-US" dirty="0"/>
           </a:p>
@@ -5550,7 +5621,7 @@
             <a:fld id="{1D8BD707-D9CF-40AE-B4C6-C98DA3205C09}" type="datetimeFigureOut">
               <a:rPr lang="en-US" smtClean="0"/>
               <a:pPr/>
-              <a:t>4/15/2015</a:t>
+              <a:t>4/19/2015</a:t>
             </a:fld>
             <a:endParaRPr lang="en-US" dirty="0"/>
           </a:p>
@@ -5826,7 +5897,7 @@
             <a:fld id="{1D8BD707-D9CF-40AE-B4C6-C98DA3205C09}" type="datetimeFigureOut">
               <a:rPr lang="en-US" smtClean="0"/>
               <a:pPr/>
-              <a:t>4/15/2015</a:t>
+              <a:t>4/19/2015</a:t>
             </a:fld>
             <a:endParaRPr lang="en-US" dirty="0"/>
           </a:p>
@@ -6033,7 +6104,7 @@
             <a:fld id="{1D8BD707-D9CF-40AE-B4C6-C98DA3205C09}" type="datetimeFigureOut">
               <a:rPr lang="en-US" smtClean="0"/>
               <a:pPr/>
-              <a:t>4/15/2015</a:t>
+              <a:t>4/19/2015</a:t>
             </a:fld>
             <a:endParaRPr lang="en-US" dirty="0"/>
           </a:p>
@@ -7144,7 +7215,7 @@
             <a:fld id="{1D8BD707-D9CF-40AE-B4C6-C98DA3205C09}" type="datetimeFigureOut">
               <a:rPr lang="en-US" smtClean="0"/>
               <a:pPr/>
-              <a:t>4/15/2015</a:t>
+              <a:t>4/19/2015</a:t>
             </a:fld>
             <a:endParaRPr lang="en-US" dirty="0"/>
           </a:p>
@@ -9402,21 +9473,20 @@
           <a:p>
             <a:r>
               <a:rPr lang="en-US" dirty="0" smtClean="0"/>
-              <a:t>Called from usbhid kernel code</a:t>
-            </a:r>
-          </a:p>
-          <a:p>
+              <a:t>Restricts </a:t>
+            </a:r>
             <a:r>
               <a:rPr lang="en-US" dirty="0" smtClean="0"/>
-              <a:t>Restricts mouse and keyboard</a:t>
+              <a:t>mouse and keyboard</a:t>
             </a:r>
           </a:p>
           <a:p>
             <a:pPr lvl="1"/>
             <a:r>
               <a:rPr lang="en-US" dirty="0" smtClean="0"/>
-              <a:t>No mouse clicks</a:t>
-            </a:r>
+              <a:t>Mouse clicking disabled</a:t>
+            </a:r>
+            <a:endParaRPr lang="en-US" dirty="0" smtClean="0"/>
           </a:p>
           <a:p>
             <a:pPr lvl="1"/>
@@ -9428,13 +9498,33 @@
           <a:p>
             <a:r>
               <a:rPr lang="en-US" dirty="0" smtClean="0"/>
-              <a:t>Calls Captcha GUI</a:t>
-            </a:r>
-          </a:p>
-          <a:p>
+              <a:t>Calls </a:t>
+            </a:r>
             <a:r>
               <a:rPr lang="en-US" dirty="0" smtClean="0"/>
-              <a:t>Un-restricts devices when Captcha is completed</a:t>
+              <a:t>captcha GUI</a:t>
+            </a:r>
+          </a:p>
+          <a:p>
+            <a:pPr lvl="1"/>
+            <a:r>
+              <a:rPr lang="en-US" dirty="0" smtClean="0"/>
+              <a:t>Contains mechanism to ensure that only one instance of the captcha GUI is running at any given time</a:t>
+            </a:r>
+            <a:endParaRPr lang="en-US" dirty="0" smtClean="0"/>
+          </a:p>
+          <a:p>
+            <a:r>
+              <a:rPr lang="en-US" dirty="0" smtClean="0"/>
+              <a:t>Un-restricts devices when </a:t>
+            </a:r>
+            <a:r>
+              <a:rPr lang="en-US" dirty="0" smtClean="0"/>
+              <a:t>captcha </a:t>
+            </a:r>
+            <a:r>
+              <a:rPr lang="en-US" dirty="0" smtClean="0"/>
+              <a:t>is completed</a:t>
             </a:r>
           </a:p>
         </p:txBody>
@@ -9571,7 +9661,15 @@
             </a:pPr>
             <a:r>
               <a:rPr lang="en-US" sz="1600" dirty="0" smtClean="0"/>
-              <a:t>Use virtual keyboard - mouse</a:t>
+              <a:t>Use </a:t>
+            </a:r>
+            <a:r>
+              <a:rPr lang="en-US" sz="1600" dirty="0" smtClean="0"/>
+              <a:t>hovering over keys on virtual </a:t>
+            </a:r>
+            <a:r>
+              <a:rPr lang="en-US" sz="1600" dirty="0" smtClean="0"/>
+              <a:t>keyboard - mouse</a:t>
             </a:r>
           </a:p>
           <a:p>
@@ -9895,7 +9993,15 @@
             <a:pPr lvl="2"/>
             <a:r>
               <a:rPr lang="en-US" dirty="0" smtClean="0"/>
-              <a:t>No appearance of the CAPTCHA GUI</a:t>
+              <a:t>No appearance of the </a:t>
+            </a:r>
+            <a:r>
+              <a:rPr lang="en-US" dirty="0" smtClean="0"/>
+              <a:t>captcha </a:t>
+            </a:r>
+            <a:r>
+              <a:rPr lang="en-US" dirty="0" smtClean="0"/>
+              <a:t>GUI</a:t>
             </a:r>
           </a:p>
           <a:p>
@@ -9920,7 +10026,15 @@
             </a:r>
             <a:r>
               <a:rPr lang="en-US" sz="2100" dirty="0" smtClean="0"/>
-              <a:t>verify the CAPTCHA program runs for expected human interface devices</a:t>
+              <a:t>verify the </a:t>
+            </a:r>
+            <a:r>
+              <a:rPr lang="en-US" sz="2100" dirty="0" smtClean="0"/>
+              <a:t>captcha </a:t>
+            </a:r>
+            <a:r>
+              <a:rPr lang="en-US" sz="2100" dirty="0" smtClean="0"/>
+              <a:t>program runs for expected human interface devices</a:t>
             </a:r>
           </a:p>
           <a:p>
@@ -9939,7 +10053,15 @@
             </a:r>
             <a:r>
               <a:rPr lang="en-US" sz="1900" dirty="0" smtClean="0"/>
-              <a:t>Keyboard and mouse functionalities restricted while the CAPTCHA program is active and restored after validation</a:t>
+              <a:t>Keyboard and mouse functionalities restricted while the </a:t>
+            </a:r>
+            <a:r>
+              <a:rPr lang="en-US" sz="1900" dirty="0" smtClean="0"/>
+              <a:t>captcha </a:t>
+            </a:r>
+            <a:r>
+              <a:rPr lang="en-US" sz="1900" dirty="0" smtClean="0"/>
+              <a:t>program is active and restored after validation</a:t>
             </a:r>
             <a:endParaRPr lang="en-US" sz="1900" dirty="0"/>
           </a:p>
@@ -10383,7 +10505,15 @@
             </a:pPr>
             <a:r>
               <a:rPr lang="en-US" sz="2000" dirty="0" smtClean="0"/>
-              <a:t>USB devices have become the standard for connecting devices, such as keyboard and mice, to computers.  The security and protection of the computers that they are being connect to is a concern.</a:t>
+              <a:t>USB devices have become the standard for connecting devices, such as keyboard and mice, to computers.  The security and protection of the computers that they are being </a:t>
+            </a:r>
+            <a:r>
+              <a:rPr lang="en-US" sz="2000" dirty="0" smtClean="0"/>
+              <a:t>connected </a:t>
+            </a:r>
+            <a:r>
+              <a:rPr lang="en-US" sz="2000" dirty="0" smtClean="0"/>
+              <a:t>to is a concern.</a:t>
             </a:r>
           </a:p>
           <a:p>
@@ -10567,7 +10697,11 @@
           <a:p>
             <a:r>
               <a:rPr lang="en-US" sz="2400" dirty="0" smtClean="0"/>
-              <a:t>CAPTCHA GUI may be completed using any connected keyboard or mouse</a:t>
+              <a:t>Captcha </a:t>
+            </a:r>
+            <a:r>
+              <a:rPr lang="en-US" sz="2400" dirty="0" smtClean="0"/>
+              <a:t>GUI may be completed using any connected keyboard or mouse</a:t>
             </a:r>
           </a:p>
           <a:p>
@@ -10668,14 +10802,26 @@
           <a:p>
             <a:r>
               <a:rPr lang="en-US" sz="2300" dirty="0" smtClean="0"/>
-              <a:t>CAPTCHA Improvements</a:t>
+              <a:t>Captcha </a:t>
+            </a:r>
+            <a:r>
+              <a:rPr lang="en-US" sz="2300" dirty="0" smtClean="0"/>
+              <a:t>Improvements</a:t>
             </a:r>
           </a:p>
           <a:p>
             <a:pPr lvl="1"/>
             <a:r>
               <a:rPr lang="en-US" sz="1900" dirty="0" smtClean="0"/>
-              <a:t>Use more advanced CAPTCHA characteristics or a professionally developed version</a:t>
+              <a:t>Use more advanced </a:t>
+            </a:r>
+            <a:r>
+              <a:rPr lang="en-US" sz="1900" dirty="0" smtClean="0"/>
+              <a:t>captcha </a:t>
+            </a:r>
+            <a:r>
+              <a:rPr lang="en-US" sz="1900" dirty="0" smtClean="0"/>
+              <a:t>characteristics or a professionally developed version</a:t>
             </a:r>
           </a:p>
           <a:p>
@@ -10692,14 +10838,30 @@
             <a:pPr lvl="1"/>
             <a:r>
               <a:rPr lang="en-US" sz="1900" dirty="0" smtClean="0"/>
-              <a:t>Port restriction of HID functionalities and execution of the CAPTCHA program to the driver code (remove Bash script call)</a:t>
+              <a:t>Port restriction of HID functionalities and execution of the </a:t>
+            </a:r>
+            <a:r>
+              <a:rPr lang="en-US" sz="1900" dirty="0" smtClean="0"/>
+              <a:t>captcha </a:t>
+            </a:r>
+            <a:r>
+              <a:rPr lang="en-US" sz="1900" dirty="0" smtClean="0"/>
+              <a:t>program to the driver code (remove Bash script call)</a:t>
             </a:r>
           </a:p>
           <a:p>
             <a:pPr lvl="1"/>
             <a:r>
               <a:rPr lang="en-US" sz="1900" dirty="0" smtClean="0"/>
-              <a:t>Programmatically ensure that the CAPTCHA is completed by the device that triggered it</a:t>
+              <a:t>Programmatically ensure that the </a:t>
+            </a:r>
+            <a:r>
+              <a:rPr lang="en-US" sz="1900" dirty="0" smtClean="0"/>
+              <a:t>captcha </a:t>
+            </a:r>
+            <a:r>
+              <a:rPr lang="en-US" sz="1900" dirty="0" smtClean="0"/>
+              <a:t>is completed by the device that triggered it</a:t>
             </a:r>
           </a:p>
           <a:p>
@@ -11187,7 +11349,27 @@
             </a:pPr>
             <a:r>
               <a:rPr lang="en-US" sz="1600" dirty="0" smtClean="0"/>
-              <a:t>Create a suite of attacks on a Linux OS with the Teensy microcontroller which emulate a keyboard and mouse.</a:t>
+              <a:t>Create a suite of attacks on a Linux </a:t>
+            </a:r>
+            <a:r>
+              <a:rPr lang="en-US" sz="1600" dirty="0" smtClean="0"/>
+              <a:t>OS using </a:t>
+            </a:r>
+            <a:r>
+              <a:rPr lang="en-US" sz="1600" dirty="0" smtClean="0"/>
+              <a:t>the Teensy microcontroller </a:t>
+            </a:r>
+            <a:r>
+              <a:rPr lang="en-US" sz="1600" dirty="0" smtClean="0"/>
+              <a:t>to </a:t>
+            </a:r>
+            <a:r>
+              <a:rPr lang="en-US" sz="1600" dirty="0" smtClean="0"/>
+              <a:t>emulate </a:t>
+            </a:r>
+            <a:r>
+              <a:rPr lang="en-US" sz="1600" dirty="0" smtClean="0"/>
+              <a:t>a keyboard and mouse.</a:t>
             </a:r>
           </a:p>
           <a:p>
@@ -11204,7 +11386,7 @@
             </a:pPr>
             <a:r>
               <a:rPr lang="en-US" sz="1600" dirty="0" smtClean="0"/>
-              <a:t>Prevent the attacks by making a modification to the USB-HID driver which disables key features of the device, then locks and grabs focus and displays a captcha GUI for verification.</a:t>
+              <a:t>Develop a defense against the attacks by making a modification to the usbhid driver that disables key features of the device, then locks and grabs system focus and displays a captcha GUI for validation that the device is human-controlled.</a:t>
             </a:r>
           </a:p>
         </p:txBody>
@@ -11365,7 +11547,7 @@
             </a:pPr>
             <a:r>
               <a:rPr lang="en-US" sz="2000" dirty="0" smtClean="0"/>
-              <a:t>How will users react to the USB device verification?</a:t>
+              <a:t>How will users react to the USB device validation?</a:t>
             </a:r>
           </a:p>
         </p:txBody>
@@ -11442,7 +11624,7 @@
         </p:nvSpPr>
         <p:spPr>
           <a:xfrm>
-            <a:off x="685800" y="1600200"/>
+            <a:off x="685800" y="1524000"/>
             <a:ext cx="7772400" cy="4648200"/>
           </a:xfrm>
         </p:spPr>
@@ -11454,23 +11636,7 @@
           <a:p>
             <a:r>
               <a:rPr lang="en-US" sz="2000" dirty="0" smtClean="0"/>
-              <a:t>S. </a:t>
-            </a:r>
-            <a:r>
-              <a:rPr lang="en-US" sz="2000" dirty="0" err="1" smtClean="0"/>
-              <a:t>Kamkar</a:t>
-            </a:r>
-            <a:r>
-              <a:rPr lang="en-US" sz="2000" dirty="0" smtClean="0"/>
-              <a:t> – “</a:t>
-            </a:r>
-            <a:r>
-              <a:rPr lang="en-US" sz="2000" dirty="0" err="1" smtClean="0"/>
-              <a:t>USBDriveby</a:t>
-            </a:r>
-            <a:r>
-              <a:rPr lang="en-US" sz="2000" dirty="0" smtClean="0"/>
-              <a:t>”</a:t>
+              <a:t>S. Kamkar – “USBDriveby”</a:t>
             </a:r>
           </a:p>
           <a:p>
@@ -11483,13 +11649,8 @@
           <a:p>
             <a:r>
               <a:rPr lang="en-US" sz="2000" dirty="0" smtClean="0"/>
-              <a:t>Z. Wang and A. </a:t>
-            </a:r>
-            <a:r>
-              <a:rPr lang="en-US" sz="2000" dirty="0" err="1" smtClean="0"/>
-              <a:t>Stavrou</a:t>
-            </a:r>
-            <a:endParaRPr lang="en-US" sz="2000" dirty="0" smtClean="0"/>
+              <a:t>Z. Wang and A. Stavrou</a:t>
+            </a:r>
           </a:p>
           <a:p>
             <a:pPr lvl="1"/>
@@ -11528,56 +11689,37 @@
           <a:p>
             <a:r>
               <a:rPr lang="en-US" sz="2000" dirty="0" smtClean="0"/>
-              <a:t>F. </a:t>
-            </a:r>
-            <a:r>
-              <a:rPr lang="en-US" sz="2000" dirty="0" err="1" smtClean="0"/>
-              <a:t>Barbhuiya</a:t>
-            </a:r>
-            <a:endParaRPr lang="en-US" sz="2000" dirty="0" smtClean="0"/>
+              <a:t>F. Barbhuiya</a:t>
+            </a:r>
           </a:p>
           <a:p>
             <a:pPr lvl="1"/>
             <a:r>
               <a:rPr lang="en-US" sz="1600" dirty="0" smtClean="0"/>
-              <a:t>Authentication based on keystroke dynamics</a:t>
-            </a:r>
+              <a:t>Authentication based on keystroke </a:t>
+            </a:r>
+            <a:r>
+              <a:rPr lang="en-US" sz="1600" dirty="0" smtClean="0"/>
+              <a:t>dynamics.</a:t>
+            </a:r>
+            <a:endParaRPr lang="en-US" sz="1600" dirty="0" smtClean="0"/>
           </a:p>
           <a:p>
             <a:pPr lvl="1"/>
             <a:r>
               <a:rPr lang="en-US" sz="1600" dirty="0" smtClean="0"/>
-              <a:t>Would not work if attack is very short</a:t>
-            </a:r>
+              <a:t>Would not work if attack is very </a:t>
+            </a:r>
+            <a:r>
+              <a:rPr lang="en-US" sz="1600" dirty="0" smtClean="0"/>
+              <a:t>short.</a:t>
+            </a:r>
+            <a:endParaRPr lang="en-US" sz="1600" dirty="0" smtClean="0"/>
           </a:p>
           <a:p>
             <a:r>
               <a:rPr lang="en-US" sz="2000" dirty="0" smtClean="0"/>
-              <a:t>K. </a:t>
-            </a:r>
-            <a:r>
-              <a:rPr lang="en-US" sz="2000" dirty="0" err="1" smtClean="0"/>
-              <a:t>Nohl</a:t>
-            </a:r>
-            <a:r>
-              <a:rPr lang="en-US" sz="2000" dirty="0" smtClean="0"/>
-              <a:t> and J. </a:t>
-            </a:r>
-            <a:r>
-              <a:rPr lang="en-US" sz="2000" dirty="0" err="1" smtClean="0"/>
-              <a:t>Lell</a:t>
-            </a:r>
-            <a:r>
-              <a:rPr lang="en-US" sz="2000" dirty="0" smtClean="0"/>
-              <a:t> – “</a:t>
-            </a:r>
-            <a:r>
-              <a:rPr lang="en-US" sz="2000" dirty="0" err="1" smtClean="0"/>
-              <a:t>BadUSB</a:t>
-            </a:r>
-            <a:r>
-              <a:rPr lang="en-US" sz="2000" dirty="0" smtClean="0"/>
-              <a:t>”</a:t>
+              <a:t>K. Nohl and J. Lell – “BadUSB”</a:t>
             </a:r>
           </a:p>
           <a:p>
@@ -11688,15 +11830,7 @@
             <a:pPr lvl="1"/>
             <a:r>
               <a:rPr lang="en-US" dirty="0" smtClean="0"/>
-              <a:t>No combination </a:t>
-            </a:r>
-            <a:r>
-              <a:rPr lang="en-US" dirty="0" err="1" smtClean="0"/>
-              <a:t>HID+file</a:t>
-            </a:r>
-            <a:r>
-              <a:rPr lang="en-US" dirty="0" smtClean="0"/>
-              <a:t> storage systems known</a:t>
+              <a:t>No combination HID+file storage systems known</a:t>
             </a:r>
           </a:p>
           <a:p>

</xml_diff>

<commit_message>
More minor edits for my parts.
</commit_message>
<xml_diff>
--- a/Project/Final_Project_Presentation_Fasburg_Reiff_Thomas.pptx
+++ b/Project/Final_Project_Presentation_Fasburg_Reiff_Thomas.pptx
@@ -1047,31 +1047,7 @@
           <a:p>
             <a:r>
               <a:rPr lang="en-US" baseline="0" dirty="0" smtClean="0"/>
-              <a:t>Note: the </a:t>
-            </a:r>
-            <a:r>
-              <a:rPr lang="en-US" baseline="0" dirty="0" err="1" smtClean="0"/>
-              <a:t>Makefile</a:t>
-            </a:r>
-            <a:r>
-              <a:rPr lang="en-US" baseline="0" dirty="0" smtClean="0"/>
-              <a:t> also builds the </a:t>
-            </a:r>
-            <a:r>
-              <a:rPr lang="en-US" baseline="0" dirty="0" err="1" smtClean="0"/>
-              <a:t>usbkbd</a:t>
-            </a:r>
-            <a:r>
-              <a:rPr lang="en-US" baseline="0" dirty="0" smtClean="0"/>
-              <a:t> and </a:t>
-            </a:r>
-            <a:r>
-              <a:rPr lang="en-US" baseline="0" dirty="0" err="1" smtClean="0"/>
-              <a:t>usbmouse</a:t>
-            </a:r>
-            <a:r>
-              <a:rPr lang="en-US" baseline="0" dirty="0" smtClean="0"/>
-              <a:t> drivers – modification of these was outside the scope of the project but these drivers are important for the Future Work</a:t>
+              <a:t>Note: the Makefile also builds the usbkbd and usbmouse drivers – modification of these was outside the scope of the project but these drivers are important for the Future Work</a:t>
             </a:r>
             <a:endParaRPr lang="en-US" dirty="0" smtClean="0"/>
           </a:p>
@@ -1244,15 +1220,7 @@
             </a:pPr>
             <a:r>
               <a:rPr lang="en-US" u="none" baseline="0" dirty="0" smtClean="0"/>
-              <a:t>Logger: verification that the function was running (output found in /</a:t>
-            </a:r>
-            <a:r>
-              <a:rPr lang="en-US" u="none" baseline="0" dirty="0" err="1" smtClean="0"/>
-              <a:t>var</a:t>
-            </a:r>
-            <a:r>
-              <a:rPr lang="en-US" u="none" baseline="0" dirty="0" smtClean="0"/>
-              <a:t>/log/syslog)</a:t>
+              <a:t>Logger: verification that the function was running (output found in /var/log/syslog)</a:t>
             </a:r>
           </a:p>
           <a:p>
@@ -1271,12 +1239,8 @@
           </a:p>
           <a:p>
             <a:r>
-              <a:rPr lang="en-US" u="sng" dirty="0" err="1" smtClean="0"/>
-              <a:t>call_usermodehelper</a:t>
-            </a:r>
-            <a:r>
               <a:rPr lang="en-US" u="sng" dirty="0" smtClean="0"/>
-              <a:t> function</a:t>
+              <a:t>call_usermodehelper function</a:t>
             </a:r>
           </a:p>
           <a:p>
@@ -2728,11 +2692,7 @@
             </a:r>
             <a:r>
               <a:rPr lang="en-US" baseline="0" dirty="0" smtClean="0"/>
-              <a:t> less attention has been paid to authentication of </a:t>
-            </a:r>
-            <a:r>
-              <a:rPr lang="en-US" baseline="0" smtClean="0"/>
-              <a:t>USB HIDs</a:t>
+              <a:t> less attention has been paid to authentication of USB HIDs</a:t>
             </a:r>
           </a:p>
           <a:p>
@@ -3204,7 +3164,7 @@
           </a:lstStyle>
           <a:p>
             <a:pPr algn="ctr" eaLnBrk="1" latinLnBrk="0" hangingPunct="1"/>
-            <a:endParaRPr kumimoji="0" lang="en-US"/>
+            <a:endParaRPr kumimoji="0" lang="en-US" dirty="0"/>
           </a:p>
         </p:txBody>
       </p:sp>
@@ -3418,7 +3378,7 @@
               <a:extLst/>
             </a:lstStyle>
             <a:p>
-              <a:endParaRPr kumimoji="0" lang="en-US"/>
+              <a:endParaRPr kumimoji="0" lang="en-US" dirty="0"/>
             </a:p>
           </p:txBody>
         </p:sp>
@@ -3500,7 +3460,7 @@
               <a:extLst/>
             </a:lstStyle>
             <a:p>
-              <a:endParaRPr kumimoji="0" lang="en-US"/>
+              <a:endParaRPr kumimoji="0" lang="en-US" dirty="0"/>
             </a:p>
           </p:txBody>
         </p:sp>
@@ -3660,7 +3620,7 @@
             </a:lstStyle>
             <a:p>
               <a:pPr algn="ctr" eaLnBrk="1" latinLnBrk="0" hangingPunct="1"/>
-              <a:endParaRPr kumimoji="0" lang="en-US"/>
+              <a:endParaRPr kumimoji="0" lang="en-US" dirty="0"/>
             </a:p>
           </p:txBody>
         </p:sp>
@@ -4665,7 +4625,7 @@
           </a:lstStyle>
           <a:p>
             <a:pPr algn="l" eaLnBrk="1" latinLnBrk="0" hangingPunct="1"/>
-            <a:endParaRPr kumimoji="0" lang="en-US"/>
+            <a:endParaRPr kumimoji="0" lang="en-US" dirty="0"/>
           </a:p>
         </p:txBody>
       </p:sp>
@@ -4745,7 +4705,7 @@
           </a:lstStyle>
           <a:p>
             <a:pPr algn="l" eaLnBrk="1" latinLnBrk="0" hangingPunct="1"/>
-            <a:endParaRPr kumimoji="0" lang="en-US"/>
+            <a:endParaRPr kumimoji="0" lang="en-US" dirty="0"/>
           </a:p>
         </p:txBody>
       </p:sp>
@@ -6070,7 +6030,7 @@
           </a:lstStyle>
           <a:p>
             <a:r>
-              <a:rPr kumimoji="0" lang="en-US" smtClean="0"/>
+              <a:rPr kumimoji="0" lang="en-US" dirty="0" smtClean="0"/>
               <a:t>Click icon to add picture</a:t>
             </a:r>
             <a:endParaRPr kumimoji="0" lang="en-US" dirty="0"/>
@@ -6304,7 +6264,7 @@
             <a:extLst/>
           </a:lstStyle>
           <a:p>
-            <a:endParaRPr kumimoji="0" lang="en-US"/>
+            <a:endParaRPr kumimoji="0" lang="en-US" dirty="0"/>
           </a:p>
         </p:txBody>
       </p:sp>
@@ -6386,7 +6346,7 @@
             <a:extLst/>
           </a:lstStyle>
           <a:p>
-            <a:endParaRPr kumimoji="0" lang="en-US"/>
+            <a:endParaRPr kumimoji="0" lang="en-US" dirty="0"/>
           </a:p>
         </p:txBody>
       </p:sp>
@@ -6497,7 +6457,7 @@
           </a:lstStyle>
           <a:p>
             <a:pPr algn="ctr" eaLnBrk="1" latinLnBrk="0" hangingPunct="1"/>
-            <a:endParaRPr kumimoji="0" lang="en-US"/>
+            <a:endParaRPr kumimoji="0" lang="en-US" dirty="0"/>
           </a:p>
         </p:txBody>
       </p:sp>
@@ -6630,7 +6590,7 @@
           </a:lstStyle>
           <a:p>
             <a:pPr algn="l" eaLnBrk="1" latinLnBrk="0" hangingPunct="1"/>
-            <a:endParaRPr kumimoji="0" lang="en-US"/>
+            <a:endParaRPr kumimoji="0" lang="en-US" dirty="0"/>
           </a:p>
         </p:txBody>
       </p:sp>
@@ -6710,7 +6670,7 @@
           </a:lstStyle>
           <a:p>
             <a:pPr algn="l" eaLnBrk="1" latinLnBrk="0" hangingPunct="1"/>
-            <a:endParaRPr kumimoji="0" lang="en-US"/>
+            <a:endParaRPr kumimoji="0" lang="en-US" dirty="0"/>
           </a:p>
         </p:txBody>
       </p:sp>
@@ -6824,7 +6784,7 @@
             <a:extLst/>
           </a:lstStyle>
           <a:p>
-            <a:endParaRPr kumimoji="0" lang="en-US"/>
+            <a:endParaRPr kumimoji="0" lang="en-US" dirty="0"/>
           </a:p>
         </p:txBody>
       </p:sp>
@@ -6906,7 +6866,7 @@
             <a:extLst/>
           </a:lstStyle>
           <a:p>
-            <a:endParaRPr kumimoji="0" lang="en-US"/>
+            <a:endParaRPr kumimoji="0" lang="en-US" dirty="0"/>
           </a:p>
         </p:txBody>
       </p:sp>
@@ -7017,7 +6977,7 @@
           </a:lstStyle>
           <a:p>
             <a:pPr algn="ctr" eaLnBrk="1" latinLnBrk="0" hangingPunct="1"/>
-            <a:endParaRPr kumimoji="0" lang="en-US"/>
+            <a:endParaRPr kumimoji="0" lang="en-US" dirty="0"/>
           </a:p>
         </p:txBody>
       </p:sp>
@@ -7843,20 +7803,8 @@
           <a:p>
             <a:pPr lvl="1"/>
             <a:r>
-              <a:rPr lang="en-US" dirty="0" err="1" smtClean="0"/>
-              <a:t>rm</a:t>
-            </a:r>
-            <a:r>
               <a:rPr lang="en-US" dirty="0" smtClean="0"/>
-              <a:t> –</a:t>
-            </a:r>
-            <a:r>
-              <a:rPr lang="en-US" dirty="0" err="1" smtClean="0"/>
-              <a:t>rf</a:t>
-            </a:r>
-            <a:r>
-              <a:rPr lang="en-US" dirty="0" smtClean="0"/>
-              <a:t> *</a:t>
+              <a:t>rm –rf *</a:t>
             </a:r>
           </a:p>
           <a:p>
@@ -9546,7 +9494,11 @@
           <a:p>
             <a:r>
               <a:rPr lang="en-US" dirty="0" smtClean="0"/>
-              <a:t>Bash script</a:t>
+              <a:t>Bash </a:t>
+            </a:r>
+            <a:r>
+              <a:rPr lang="en-US" dirty="0" smtClean="0"/>
+              <a:t>Script</a:t>
             </a:r>
             <a:endParaRPr lang="en-US" dirty="0"/>
           </a:p>
@@ -10404,40 +10356,76 @@
           <a:p>
             <a:pPr lvl="2"/>
             <a:r>
+              <a:rPr lang="en-US" dirty="0"/>
+              <a:t>Mouse-based </a:t>
+            </a:r>
+            <a:r>
               <a:rPr lang="en-US" dirty="0" smtClean="0"/>
-              <a:t>Keyboard-based attacks:</a:t>
-            </a:r>
+              <a:t>attack:</a:t>
+            </a:r>
+            <a:endParaRPr lang="en-US" dirty="0"/>
           </a:p>
           <a:p>
             <a:pPr lvl="3"/>
             <a:r>
+              <a:rPr lang="en-US" sz="2100" dirty="0"/>
+              <a:t>Unable to open terminal window and execute commands before the </a:t>
+            </a:r>
+            <a:r>
               <a:rPr lang="en-US" sz="2100" dirty="0" smtClean="0"/>
-              <a:t>Teensy has the ability to open a terminal window before the CAPTCHA GUI loads</a:t>
+              <a:t>captcha </a:t>
+            </a:r>
+            <a:r>
+              <a:rPr lang="en-US" sz="2100" dirty="0"/>
+              <a:t>GUI </a:t>
+            </a:r>
+            <a:r>
+              <a:rPr lang="en-US" sz="2100" dirty="0" smtClean="0"/>
+              <a:t>loads</a:t>
+            </a:r>
+            <a:endParaRPr lang="en-US" dirty="0" smtClean="0"/>
+          </a:p>
+          <a:p>
+            <a:pPr lvl="2"/>
+            <a:r>
+              <a:rPr lang="en-US" dirty="0" smtClean="0"/>
+              <a:t>Keyboard-based </a:t>
+            </a:r>
+            <a:r>
+              <a:rPr lang="en-US" dirty="0" smtClean="0"/>
+              <a:t>attacks:</a:t>
             </a:r>
           </a:p>
           <a:p>
             <a:pPr lvl="3"/>
             <a:r>
               <a:rPr lang="en-US" sz="2100" dirty="0" smtClean="0"/>
-              <a:t>Attacks unsuccessful in executing malicious commands</a:t>
-            </a:r>
-          </a:p>
-          <a:p>
-            <a:pPr lvl="2"/>
-            <a:r>
-              <a:rPr lang="en-US" dirty="0" smtClean="0"/>
-              <a:t>Mouse-based attacks:</a:t>
+              <a:t>Teensy has the ability to open a terminal window before the </a:t>
+            </a:r>
+            <a:r>
+              <a:rPr lang="en-US" sz="2100" dirty="0" smtClean="0"/>
+              <a:t>captcha</a:t>
+            </a:r>
+            <a:r>
+              <a:rPr lang="en-US" sz="2100" dirty="0" smtClean="0"/>
+              <a:t> </a:t>
+            </a:r>
+            <a:r>
+              <a:rPr lang="en-US" sz="2100" dirty="0" smtClean="0"/>
+              <a:t>GUI loads</a:t>
             </a:r>
           </a:p>
           <a:p>
             <a:pPr lvl="3"/>
             <a:r>
               <a:rPr lang="en-US" sz="2100" dirty="0" smtClean="0"/>
-              <a:t>Unable to open terminal window and execute commands before the CAPTCHA GUI loads</a:t>
-            </a:r>
-          </a:p>
-          <a:p>
-            <a:endParaRPr lang="en-US" sz="1900" dirty="0"/>
+              <a:t>Attacks unsuccessful in executing malicious </a:t>
+            </a:r>
+            <a:r>
+              <a:rPr lang="en-US" sz="2100" dirty="0" smtClean="0"/>
+              <a:t>commands</a:t>
+            </a:r>
+            <a:endParaRPr lang="en-US" sz="2100" dirty="0" smtClean="0"/>
           </a:p>
         </p:txBody>
       </p:sp>
@@ -12495,7 +12483,7 @@
           </a:bodyPr>
           <a:lstStyle/>
           <a:p>
-            <a:endParaRPr lang="en-US"/>
+            <a:endParaRPr lang="en-US" dirty="0"/>
           </a:p>
         </p:txBody>
       </p:sp>
@@ -12534,7 +12522,7 @@
           </a:bodyPr>
           <a:lstStyle/>
           <a:p>
-            <a:endParaRPr lang="en-US"/>
+            <a:endParaRPr lang="en-US" dirty="0"/>
           </a:p>
         </p:txBody>
       </p:sp>
@@ -12573,7 +12561,7 @@
           </a:bodyPr>
           <a:lstStyle/>
           <a:p>
-            <a:endParaRPr lang="en-US"/>
+            <a:endParaRPr lang="en-US" dirty="0"/>
           </a:p>
         </p:txBody>
       </p:sp>
@@ -12612,7 +12600,7 @@
           </a:bodyPr>
           <a:lstStyle/>
           <a:p>
-            <a:endParaRPr lang="en-US"/>
+            <a:endParaRPr lang="en-US" dirty="0"/>
           </a:p>
         </p:txBody>
       </p:sp>
@@ -12651,7 +12639,7 @@
           </a:bodyPr>
           <a:lstStyle/>
           <a:p>
-            <a:endParaRPr lang="en-US"/>
+            <a:endParaRPr lang="en-US" dirty="0"/>
           </a:p>
         </p:txBody>
       </p:sp>
@@ -12690,7 +12678,7 @@
           </a:bodyPr>
           <a:lstStyle/>
           <a:p>
-            <a:endParaRPr lang="en-US"/>
+            <a:endParaRPr lang="en-US" dirty="0"/>
           </a:p>
         </p:txBody>
       </p:sp>

</xml_diff>

<commit_message>
Added some presentation notes to my slides
</commit_message>
<xml_diff>
--- a/Project/Final_Project_Presentation_Fasburg_Reiff_Thomas.pptx
+++ b/Project/Final_Project_Presentation_Fasburg_Reiff_Thomas.pptx
@@ -131,7 +131,7 @@
   </p:defaultTextStyle>
   <p:extLst>
     <p:ext uri="{EFAFB233-063F-42B5-8137-9DF3F51BA10A}">
-      <p15:sldGuideLst xmlns:p15="http://schemas.microsoft.com/office/powerpoint/2012/main">
+      <p15:sldGuideLst xmlns:p15="http://schemas.microsoft.com/office/powerpoint/2012/main" xmlns="">
         <p15:guide id="1" orient="horz" pos="2160">
           <p15:clr>
             <a:srgbClr val="A4A3A4"/>
@@ -626,6 +626,14 @@
           <a:bodyPr/>
           <a:lstStyle/>
           <a:p>
+            <a:r>
+              <a:rPr lang="en-US" dirty="0" smtClean="0"/>
+              <a:t>Our captcha</a:t>
+            </a:r>
+            <a:r>
+              <a:rPr lang="en-US" baseline="0" dirty="0" smtClean="0"/>
+              <a:t> GUI works by disabling special keys, so this shows an example of why it is necessary to protect a mouse in addition to a keyboard. </a:t>
+            </a:r>
             <a:endParaRPr lang="en-US" dirty="0"/>
           </a:p>
         </p:txBody>
@@ -743,11 +751,7 @@
             </a:pPr>
             <a:r>
               <a:rPr lang="en-US" b="1" baseline="0" dirty="0" smtClean="0"/>
-              <a:t>SEPARATE THREAD: The </a:t>
-            </a:r>
-            <a:r>
-              <a:rPr lang="en-US" b="1" baseline="0" dirty="0" smtClean="0"/>
-              <a:t>system will not block on script execution due to the creation of a separate thread to run the shell commands</a:t>
+              <a:t>SEPARATE THREAD: The system will not block on script execution due to the creation of a separate thread to run the shell commands</a:t>
             </a:r>
           </a:p>
           <a:p>
@@ -1037,11 +1041,7 @@
             </a:r>
             <a:r>
               <a:rPr lang="en-US" baseline="0" dirty="0" smtClean="0"/>
-              <a:t> </a:t>
-            </a:r>
-            <a:r>
-              <a:rPr lang="en-US" baseline="0" dirty="0" smtClean="0"/>
-              <a:t>additions</a:t>
+              <a:t> additions</a:t>
             </a:r>
           </a:p>
           <a:p>
@@ -1819,17 +1819,8 @@
             </a:r>
             <a:r>
               <a:rPr lang="en-US" b="1" baseline="0" dirty="0" smtClean="0"/>
-              <a:t> no testing done </a:t>
-            </a:r>
-            <a:r>
-              <a:rPr lang="en-US" b="1" baseline="0" dirty="0" smtClean="0"/>
-              <a:t>for keyboard-based attack on the % of time that the terminal is spawned or </a:t>
-            </a:r>
-            <a:r>
-              <a:rPr lang="en-US" b="1" baseline="0" dirty="0" smtClean="0"/>
-              <a:t>the # of keystrokes entered into the terminal </a:t>
-            </a:r>
-            <a:endParaRPr lang="en-US" b="1" baseline="0" dirty="0" smtClean="0"/>
+              <a:t> no testing done for keyboard-based attack on the % of time that the terminal is spawned or the # of keystrokes entered into the terminal </a:t>
+            </a:r>
           </a:p>
           <a:p>
             <a:pPr marL="171450" indent="-171450">
@@ -1838,15 +1829,7 @@
             </a:pPr>
             <a:r>
               <a:rPr lang="en-US" b="1" baseline="0" dirty="0" smtClean="0"/>
-              <a:t>Results </a:t>
-            </a:r>
-            <a:r>
-              <a:rPr lang="en-US" b="1" baseline="0" dirty="0" smtClean="0"/>
-              <a:t>inconsistent due to variables such as hardware performance, CPU usage, and delay/optimization of Teensy attack </a:t>
-            </a:r>
-            <a:r>
-              <a:rPr lang="en-US" b="1" baseline="0" dirty="0" smtClean="0"/>
-              <a:t>code</a:t>
+              <a:t>Results inconsistent due to variables such as hardware performance, CPU usage, and delay/optimization of Teensy attack code</a:t>
             </a:r>
           </a:p>
           <a:p>
@@ -2051,11 +2034,7 @@
             </a:r>
             <a:r>
               <a:rPr lang="en-US" u="none" baseline="0" dirty="0" smtClean="0"/>
-              <a:t> </a:t>
-            </a:r>
-            <a:r>
-              <a:rPr lang="en-US" u="none" baseline="0" dirty="0" smtClean="0"/>
-              <a:t>of using any connected keyboard or mouse:</a:t>
+              <a:t> of using any connected keyboard or mouse:</a:t>
             </a:r>
           </a:p>
           <a:p>
@@ -2065,15 +2044,7 @@
             </a:pPr>
             <a:r>
               <a:rPr lang="en-US" u="none" baseline="0" dirty="0" smtClean="0"/>
-              <a:t>Users may complete the </a:t>
-            </a:r>
-            <a:r>
-              <a:rPr lang="en-US" u="none" baseline="0" dirty="0" smtClean="0"/>
-              <a:t>captcha </a:t>
-            </a:r>
-            <a:r>
-              <a:rPr lang="en-US" u="none" baseline="0" dirty="0" smtClean="0"/>
-              <a:t>for an emulated HID if they fail to heed warning about completing the validation for malicious devices</a:t>
+              <a:t>Users may complete the captcha for an emulated HID if they fail to heed warning about completing the validation for malicious devices</a:t>
             </a:r>
           </a:p>
           <a:p>
@@ -2107,15 +2078,7 @@
             </a:pPr>
             <a:r>
               <a:rPr lang="en-US" b="0" u="none" baseline="0" dirty="0" smtClean="0"/>
-              <a:t>Scenario: user plugs in the keyboard with the embedded Teensy and completes the </a:t>
-            </a:r>
-            <a:r>
-              <a:rPr lang="en-US" b="0" u="none" baseline="0" dirty="0" smtClean="0"/>
-              <a:t>captcha </a:t>
-            </a:r>
-            <a:r>
-              <a:rPr lang="en-US" b="0" u="none" baseline="0" dirty="0" smtClean="0"/>
-              <a:t>GUI</a:t>
+              <a:t>Scenario: user plugs in the keyboard with the embedded Teensy and completes the captcha GUI</a:t>
             </a:r>
           </a:p>
           <a:p>
@@ -2125,15 +2088,7 @@
             </a:pPr>
             <a:r>
               <a:rPr lang="en-US" b="0" u="none" baseline="0" dirty="0" smtClean="0"/>
-              <a:t>Consequences: Teensy can begin executing attack commands after the </a:t>
-            </a:r>
-            <a:r>
-              <a:rPr lang="en-US" b="0" u="none" baseline="0" dirty="0" smtClean="0"/>
-              <a:t>captcha </a:t>
-            </a:r>
-            <a:r>
-              <a:rPr lang="en-US" b="0" u="none" baseline="0" dirty="0" smtClean="0"/>
-              <a:t>is completed by the human user</a:t>
+              <a:t>Consequences: Teensy can begin executing attack commands after the captcha is completed by the human user</a:t>
             </a:r>
             <a:endParaRPr lang="en-US" b="1" u="none" baseline="0" dirty="0" smtClean="0"/>
           </a:p>
@@ -2251,11 +2206,7 @@
             </a:pPr>
             <a:r>
               <a:rPr lang="en-US" u="none" baseline="0" dirty="0" smtClean="0"/>
-              <a:t>Driver </a:t>
-            </a:r>
-            <a:r>
-              <a:rPr lang="en-US" u="none" baseline="0" dirty="0" smtClean="0"/>
-              <a:t>Modification Improvements: </a:t>
+              <a:t>Driver Modification Improvements: </a:t>
             </a:r>
             <a:r>
               <a:rPr lang="en-US" b="1" u="none" baseline="0" dirty="0" smtClean="0"/>
@@ -2787,6 +2738,14 @@
           <a:bodyPr/>
           <a:lstStyle/>
           <a:p>
+            <a:r>
+              <a:rPr lang="en-US" dirty="0" smtClean="0"/>
+              <a:t>Microcontrollers such</a:t>
+            </a:r>
+            <a:r>
+              <a:rPr lang="en-US" baseline="0" dirty="0" smtClean="0"/>
+              <a:t> as the Teensy are highly configurable, so display emulation or file storage may be possible.</a:t>
+            </a:r>
             <a:endParaRPr lang="en-US" dirty="0"/>
           </a:p>
         </p:txBody>
@@ -2871,6 +2830,10 @@
           <a:bodyPr/>
           <a:lstStyle/>
           <a:p>
+            <a:r>
+              <a:rPr lang="en-US" dirty="0" smtClean="0"/>
+              <a:t>Set up a server in my house, can send files to it from anywhere</a:t>
+            </a:r>
             <a:endParaRPr lang="en-US" dirty="0"/>
           </a:p>
         </p:txBody>
@@ -2955,6 +2918,42 @@
           <a:bodyPr/>
           <a:lstStyle/>
           <a:p>
+            <a:r>
+              <a:rPr lang="en-US" dirty="0" smtClean="0"/>
+              <a:t>The</a:t>
+            </a:r>
+            <a:r>
+              <a:rPr lang="en-US" baseline="0" dirty="0" smtClean="0"/>
+              <a:t> screen that shows up may fool people into thinking it is a system message, and type in password to download drivers.</a:t>
+            </a:r>
+          </a:p>
+          <a:p>
+            <a:r>
+              <a:rPr lang="en-US" baseline="0" dirty="0" smtClean="0"/>
+              <a:t>A for loop is quickly written and cleared that waits for input and saves it to a file.</a:t>
+            </a:r>
+          </a:p>
+          <a:p>
+            <a:r>
+              <a:rPr lang="en-US" baseline="0" dirty="0" smtClean="0"/>
+              <a:t>Now Teensy can do any command that requires root </a:t>
+            </a:r>
+            <a:r>
+              <a:rPr lang="en-US" baseline="0" dirty="0" err="1" smtClean="0"/>
+              <a:t>privledges</a:t>
+            </a:r>
+            <a:r>
+              <a:rPr lang="en-US" baseline="0" dirty="0" smtClean="0"/>
+              <a:t> (</a:t>
+            </a:r>
+            <a:r>
+              <a:rPr lang="en-US" baseline="0" dirty="0" err="1" smtClean="0"/>
+              <a:t>sudo</a:t>
+            </a:r>
+            <a:r>
+              <a:rPr lang="en-US" baseline="0" dirty="0" smtClean="0"/>
+              <a:t> can accept pw via pipe)</a:t>
+            </a:r>
             <a:endParaRPr lang="en-US" dirty="0"/>
           </a:p>
         </p:txBody>
@@ -3039,6 +3038,14 @@
           <a:bodyPr/>
           <a:lstStyle/>
           <a:p>
+            <a:r>
+              <a:rPr lang="en-US" dirty="0" smtClean="0"/>
+              <a:t>Run</a:t>
+            </a:r>
+            <a:r>
+              <a:rPr lang="en-US" baseline="0" dirty="0" smtClean="0"/>
+              <a:t> commands to disable the guest session and create a root user named “Guest Session”. Attacker can now login physically or remotely and do whatever he wants.</a:t>
+            </a:r>
             <a:endParaRPr lang="en-US" dirty="0"/>
           </a:p>
         </p:txBody>
@@ -8365,8 +8372,8 @@
         </p:blipFill>
         <p:spPr bwMode="auto">
           <a:xfrm>
-            <a:off x="2387905" y="867388"/>
-            <a:ext cx="6486998" cy="4696750"/>
+            <a:off x="1551457" y="1134606"/>
+            <a:ext cx="6852516" cy="4961394"/>
           </a:xfrm>
           <a:prstGeom prst="rect">
             <a:avLst/>
@@ -8383,249 +8390,279 @@
           </a:extLst>
         </p:spPr>
       </p:pic>
-      <p:sp>
-        <p:nvSpPr>
-          <p:cNvPr id="5" name="Oval 4"/>
-          <p:cNvSpPr/>
+      <p:grpSp>
+        <p:nvGrpSpPr>
+          <p:cNvPr id="12" name="Group 11"/>
+          <p:cNvGrpSpPr/>
           <p:nvPr/>
-        </p:nvSpPr>
-        <p:spPr>
+        </p:nvGrpSpPr>
+        <p:grpSpPr>
           <a:xfrm>
-            <a:off x="228600" y="4419600"/>
-            <a:ext cx="304800" cy="304800"/>
+            <a:off x="1039519" y="5100999"/>
+            <a:ext cx="2182028" cy="1234430"/>
+            <a:chOff x="1899722" y="4916956"/>
+            <a:chExt cx="2182028" cy="1234430"/>
           </a:xfrm>
-          <a:prstGeom prst="ellipse">
-            <a:avLst/>
-          </a:prstGeom>
-          <a:effectLst/>
-        </p:spPr>
-        <p:style>
-          <a:lnRef idx="1">
-            <a:schemeClr val="accent6"/>
-          </a:lnRef>
-          <a:fillRef idx="2">
-            <a:schemeClr val="accent6"/>
-          </a:fillRef>
-          <a:effectRef idx="1">
-            <a:schemeClr val="accent6"/>
-          </a:effectRef>
-          <a:fontRef idx="minor">
-            <a:schemeClr val="dk1"/>
-          </a:fontRef>
-        </p:style>
-        <p:txBody>
-          <a:bodyPr rtlCol="0" anchor="ctr"/>
-          <a:lstStyle/>
-          <a:p>
-            <a:pPr algn="ctr"/>
-            <a:endParaRPr lang="en-US" sz="1400" dirty="0">
-              <a:solidFill>
-                <a:prstClr val="black"/>
-              </a:solidFill>
-            </a:endParaRPr>
-          </a:p>
-        </p:txBody>
-      </p:sp>
-      <p:sp>
-        <p:nvSpPr>
-          <p:cNvPr id="6" name="Rounded Rectangle 5"/>
-          <p:cNvSpPr/>
-          <p:nvPr/>
-        </p:nvSpPr>
-        <p:spPr>
-          <a:xfrm>
-            <a:off x="124628" y="4904601"/>
-            <a:ext cx="495299" cy="228600"/>
-          </a:xfrm>
-          <a:prstGeom prst="roundRect">
-            <a:avLst/>
-          </a:prstGeom>
-          <a:effectLst/>
-        </p:spPr>
-        <p:style>
-          <a:lnRef idx="1">
-            <a:schemeClr val="accent6"/>
-          </a:lnRef>
-          <a:fillRef idx="2">
-            <a:schemeClr val="accent6"/>
-          </a:fillRef>
-          <a:effectRef idx="1">
-            <a:schemeClr val="accent6"/>
-          </a:effectRef>
-          <a:fontRef idx="minor">
-            <a:schemeClr val="dk1"/>
-          </a:fontRef>
-        </p:style>
-        <p:txBody>
-          <a:bodyPr rtlCol="0" anchor="ctr"/>
-          <a:lstStyle/>
-          <a:p>
-            <a:pPr algn="ctr"/>
-            <a:endParaRPr lang="en-US" sz="1400" dirty="0">
-              <a:solidFill>
-                <a:prstClr val="black"/>
-              </a:solidFill>
-            </a:endParaRPr>
-          </a:p>
-        </p:txBody>
-      </p:sp>
-      <p:sp>
-        <p:nvSpPr>
-          <p:cNvPr id="7" name="Flowchart: Decision 6"/>
-          <p:cNvSpPr/>
-          <p:nvPr/>
-        </p:nvSpPr>
-        <p:spPr>
-          <a:xfrm>
-            <a:off x="76200" y="5334000"/>
-            <a:ext cx="581828" cy="320030"/>
-          </a:xfrm>
-          <a:prstGeom prst="flowChartDecision">
-            <a:avLst/>
-          </a:prstGeom>
-          <a:effectLst/>
-        </p:spPr>
-        <p:style>
-          <a:lnRef idx="1">
-            <a:schemeClr val="accent6"/>
-          </a:lnRef>
-          <a:fillRef idx="2">
-            <a:schemeClr val="accent6"/>
-          </a:fillRef>
-          <a:effectRef idx="1">
-            <a:schemeClr val="accent6"/>
-          </a:effectRef>
-          <a:fontRef idx="minor">
-            <a:schemeClr val="dk1"/>
-          </a:fontRef>
-        </p:style>
-        <p:txBody>
-          <a:bodyPr rtlCol="0" anchor="ctr"/>
-          <a:lstStyle/>
-          <a:p>
-            <a:pPr algn="ctr"/>
-            <a:endParaRPr lang="en-US" sz="1400" dirty="0">
-              <a:solidFill>
-                <a:prstClr val="black"/>
-              </a:solidFill>
-            </a:endParaRPr>
-          </a:p>
-        </p:txBody>
-      </p:sp>
-      <p:sp>
-        <p:nvSpPr>
-          <p:cNvPr id="4" name="TextBox 3"/>
-          <p:cNvSpPr txBox="1"/>
-          <p:nvPr/>
-        </p:nvSpPr>
-        <p:spPr>
-          <a:xfrm>
-            <a:off x="592155" y="5361801"/>
-            <a:ext cx="1285073" cy="276999"/>
-          </a:xfrm>
-          <a:prstGeom prst="rect">
-            <a:avLst/>
-          </a:prstGeom>
-          <a:noFill/>
-        </p:spPr>
-        <p:txBody>
-          <a:bodyPr wrap="square" rtlCol="0">
-            <a:spAutoFit/>
-          </a:bodyPr>
-          <a:lstStyle/>
-          <a:p>
-            <a:r>
-              <a:rPr lang="en-US" sz="1200" dirty="0" smtClean="0">
+        </p:grpSpPr>
+        <p:sp>
+          <p:nvSpPr>
+            <p:cNvPr id="4" name="TextBox 3"/>
+            <p:cNvSpPr txBox="1"/>
+            <p:nvPr/>
+          </p:nvSpPr>
+          <p:spPr>
+            <a:xfrm>
+              <a:off x="2415677" y="5859157"/>
+              <a:ext cx="1285073" cy="276999"/>
+            </a:xfrm>
+            <a:prstGeom prst="rect">
+              <a:avLst/>
+            </a:prstGeom>
+            <a:noFill/>
+          </p:spPr>
+          <p:txBody>
+            <a:bodyPr wrap="square" rtlCol="0">
+              <a:spAutoFit/>
+            </a:bodyPr>
+            <a:lstStyle/>
+            <a:p>
+              <a:r>
+                <a:rPr lang="en-US" sz="1200" dirty="0" smtClean="0">
+                  <a:solidFill>
+                    <a:prstClr val="black"/>
+                  </a:solidFill>
+                </a:rPr>
+                <a:t>= Conditional</a:t>
+              </a:r>
+              <a:endParaRPr lang="en-US" sz="1200" dirty="0">
                 <a:solidFill>
                   <a:prstClr val="black"/>
                 </a:solidFill>
-              </a:rPr>
-              <a:t>= Conditional</a:t>
-            </a:r>
-            <a:endParaRPr lang="en-US" sz="1200" dirty="0">
-              <a:solidFill>
-                <a:prstClr val="black"/>
-              </a:solidFill>
-            </a:endParaRPr>
-          </a:p>
-        </p:txBody>
-      </p:sp>
-      <p:sp>
-        <p:nvSpPr>
-          <p:cNvPr id="9" name="TextBox 8"/>
-          <p:cNvSpPr txBox="1"/>
-          <p:nvPr/>
-        </p:nvSpPr>
-        <p:spPr>
-          <a:xfrm>
-            <a:off x="581828" y="4904601"/>
-            <a:ext cx="1524000" cy="276999"/>
-          </a:xfrm>
-          <a:prstGeom prst="rect">
-            <a:avLst/>
-          </a:prstGeom>
-          <a:noFill/>
-        </p:spPr>
-        <p:txBody>
-          <a:bodyPr wrap="square" rtlCol="0">
-            <a:spAutoFit/>
-          </a:bodyPr>
-          <a:lstStyle/>
-          <a:p>
-            <a:r>
-              <a:rPr lang="en-US" sz="1200" dirty="0" smtClean="0">
-                <a:solidFill>
-                  <a:prstClr val="black"/>
-                </a:solidFill>
-              </a:rPr>
-              <a:t>= System Actions</a:t>
-            </a:r>
-            <a:endParaRPr lang="en-US" sz="1200" dirty="0">
-              <a:solidFill>
-                <a:prstClr val="black"/>
-              </a:solidFill>
-            </a:endParaRPr>
-          </a:p>
-        </p:txBody>
-      </p:sp>
-      <p:sp>
-        <p:nvSpPr>
-          <p:cNvPr id="10" name="TextBox 9"/>
-          <p:cNvSpPr txBox="1"/>
-          <p:nvPr/>
-        </p:nvSpPr>
-        <p:spPr>
-          <a:xfrm>
-            <a:off x="581829" y="4422403"/>
-            <a:ext cx="1676399" cy="276999"/>
-          </a:xfrm>
-          <a:prstGeom prst="rect">
-            <a:avLst/>
-          </a:prstGeom>
-          <a:noFill/>
-        </p:spPr>
-        <p:txBody>
-          <a:bodyPr wrap="square" rtlCol="0">
-            <a:spAutoFit/>
-          </a:bodyPr>
-          <a:lstStyle/>
-          <a:p>
-            <a:r>
-              <a:rPr lang="en-US" sz="1200" dirty="0" smtClean="0">
-                <a:solidFill>
-                  <a:prstClr val="black"/>
-                </a:solidFill>
-              </a:rPr>
-              <a:t>= User Interactions </a:t>
-            </a:r>
-            <a:endParaRPr lang="en-US" sz="1200" dirty="0">
-              <a:solidFill>
-                <a:prstClr val="black"/>
-              </a:solidFill>
-            </a:endParaRPr>
-          </a:p>
-        </p:txBody>
-      </p:sp>
+              </a:endParaRPr>
+            </a:p>
+          </p:txBody>
+        </p:sp>
+        <p:grpSp>
+          <p:nvGrpSpPr>
+            <p:cNvPr id="3" name="Group 2"/>
+            <p:cNvGrpSpPr/>
+            <p:nvPr/>
+          </p:nvGrpSpPr>
+          <p:grpSpPr>
+            <a:xfrm>
+              <a:off x="1899722" y="4916956"/>
+              <a:ext cx="2182028" cy="1234430"/>
+              <a:chOff x="1871950" y="4901726"/>
+              <a:chExt cx="2182028" cy="1234430"/>
+            </a:xfrm>
+          </p:grpSpPr>
+          <p:sp>
+            <p:nvSpPr>
+              <p:cNvPr id="5" name="Oval 4"/>
+              <p:cNvSpPr/>
+              <p:nvPr/>
+            </p:nvSpPr>
+            <p:spPr>
+              <a:xfrm>
+                <a:off x="2024350" y="4901726"/>
+                <a:ext cx="304800" cy="304800"/>
+              </a:xfrm>
+              <a:prstGeom prst="ellipse">
+                <a:avLst/>
+              </a:prstGeom>
+              <a:effectLst/>
+            </p:spPr>
+            <p:style>
+              <a:lnRef idx="1">
+                <a:schemeClr val="accent6"/>
+              </a:lnRef>
+              <a:fillRef idx="2">
+                <a:schemeClr val="accent6"/>
+              </a:fillRef>
+              <a:effectRef idx="1">
+                <a:schemeClr val="accent6"/>
+              </a:effectRef>
+              <a:fontRef idx="minor">
+                <a:schemeClr val="dk1"/>
+              </a:fontRef>
+            </p:style>
+            <p:txBody>
+              <a:bodyPr rtlCol="0" anchor="ctr"/>
+              <a:lstStyle/>
+              <a:p>
+                <a:pPr algn="ctr"/>
+                <a:endParaRPr lang="en-US" sz="1400" dirty="0">
+                  <a:solidFill>
+                    <a:prstClr val="black"/>
+                  </a:solidFill>
+                </a:endParaRPr>
+              </a:p>
+            </p:txBody>
+          </p:sp>
+          <p:sp>
+            <p:nvSpPr>
+              <p:cNvPr id="6" name="Rounded Rectangle 5"/>
+              <p:cNvSpPr/>
+              <p:nvPr/>
+            </p:nvSpPr>
+            <p:spPr>
+              <a:xfrm>
+                <a:off x="1920378" y="5386727"/>
+                <a:ext cx="495299" cy="228600"/>
+              </a:xfrm>
+              <a:prstGeom prst="roundRect">
+                <a:avLst/>
+              </a:prstGeom>
+              <a:effectLst/>
+            </p:spPr>
+            <p:style>
+              <a:lnRef idx="1">
+                <a:schemeClr val="accent6"/>
+              </a:lnRef>
+              <a:fillRef idx="2">
+                <a:schemeClr val="accent6"/>
+              </a:fillRef>
+              <a:effectRef idx="1">
+                <a:schemeClr val="accent6"/>
+              </a:effectRef>
+              <a:fontRef idx="minor">
+                <a:schemeClr val="dk1"/>
+              </a:fontRef>
+            </p:style>
+            <p:txBody>
+              <a:bodyPr rtlCol="0" anchor="ctr"/>
+              <a:lstStyle/>
+              <a:p>
+                <a:pPr algn="ctr"/>
+                <a:endParaRPr lang="en-US" sz="1400" dirty="0">
+                  <a:solidFill>
+                    <a:prstClr val="black"/>
+                  </a:solidFill>
+                </a:endParaRPr>
+              </a:p>
+            </p:txBody>
+          </p:sp>
+          <p:sp>
+            <p:nvSpPr>
+              <p:cNvPr id="7" name="Flowchart: Decision 6"/>
+              <p:cNvSpPr/>
+              <p:nvPr/>
+            </p:nvSpPr>
+            <p:spPr>
+              <a:xfrm>
+                <a:off x="1871950" y="5816126"/>
+                <a:ext cx="581828" cy="320030"/>
+              </a:xfrm>
+              <a:prstGeom prst="flowChartDecision">
+                <a:avLst/>
+              </a:prstGeom>
+              <a:effectLst/>
+            </p:spPr>
+            <p:style>
+              <a:lnRef idx="1">
+                <a:schemeClr val="accent6"/>
+              </a:lnRef>
+              <a:fillRef idx="2">
+                <a:schemeClr val="accent6"/>
+              </a:fillRef>
+              <a:effectRef idx="1">
+                <a:schemeClr val="accent6"/>
+              </a:effectRef>
+              <a:fontRef idx="minor">
+                <a:schemeClr val="dk1"/>
+              </a:fontRef>
+            </p:style>
+            <p:txBody>
+              <a:bodyPr rtlCol="0" anchor="ctr"/>
+              <a:lstStyle/>
+              <a:p>
+                <a:pPr algn="ctr"/>
+                <a:endParaRPr lang="en-US" sz="1400" dirty="0">
+                  <a:solidFill>
+                    <a:prstClr val="black"/>
+                  </a:solidFill>
+                </a:endParaRPr>
+              </a:p>
+            </p:txBody>
+          </p:sp>
+          <p:sp>
+            <p:nvSpPr>
+              <p:cNvPr id="9" name="TextBox 8"/>
+              <p:cNvSpPr txBox="1"/>
+              <p:nvPr/>
+            </p:nvSpPr>
+            <p:spPr>
+              <a:xfrm>
+                <a:off x="2377578" y="5386727"/>
+                <a:ext cx="1524000" cy="276999"/>
+              </a:xfrm>
+              <a:prstGeom prst="rect">
+                <a:avLst/>
+              </a:prstGeom>
+              <a:noFill/>
+            </p:spPr>
+            <p:txBody>
+              <a:bodyPr wrap="square" rtlCol="0">
+                <a:spAutoFit/>
+              </a:bodyPr>
+              <a:lstStyle/>
+              <a:p>
+                <a:r>
+                  <a:rPr lang="en-US" sz="1200" dirty="0" smtClean="0">
+                    <a:solidFill>
+                      <a:prstClr val="black"/>
+                    </a:solidFill>
+                  </a:rPr>
+                  <a:t>= System Actions</a:t>
+                </a:r>
+                <a:endParaRPr lang="en-US" sz="1200" dirty="0">
+                  <a:solidFill>
+                    <a:prstClr val="black"/>
+                  </a:solidFill>
+                </a:endParaRPr>
+              </a:p>
+            </p:txBody>
+          </p:sp>
+          <p:sp>
+            <p:nvSpPr>
+              <p:cNvPr id="10" name="TextBox 9"/>
+              <p:cNvSpPr txBox="1"/>
+              <p:nvPr/>
+            </p:nvSpPr>
+            <p:spPr>
+              <a:xfrm>
+                <a:off x="2377579" y="4904529"/>
+                <a:ext cx="1676399" cy="276999"/>
+              </a:xfrm>
+              <a:prstGeom prst="rect">
+                <a:avLst/>
+              </a:prstGeom>
+              <a:noFill/>
+            </p:spPr>
+            <p:txBody>
+              <a:bodyPr wrap="square" rtlCol="0">
+                <a:spAutoFit/>
+              </a:bodyPr>
+              <a:lstStyle/>
+              <a:p>
+                <a:r>
+                  <a:rPr lang="en-US" sz="1200" dirty="0" smtClean="0">
+                    <a:solidFill>
+                      <a:prstClr val="black"/>
+                    </a:solidFill>
+                  </a:rPr>
+                  <a:t>= User Interactions </a:t>
+                </a:r>
+                <a:endParaRPr lang="en-US" sz="1200" dirty="0">
+                  <a:solidFill>
+                    <a:prstClr val="black"/>
+                  </a:solidFill>
+                </a:endParaRPr>
+              </a:p>
+            </p:txBody>
+          </p:sp>
+        </p:grpSp>
+      </p:grpSp>
     </p:spTree>
     <p:extLst>
       <p:ext uri="{BB962C8B-B14F-4D97-AF65-F5344CB8AC3E}">
@@ -9421,11 +9458,7 @@
           <a:p>
             <a:r>
               <a:rPr lang="en-US" dirty="0" smtClean="0"/>
-              <a:t>Restricts </a:t>
-            </a:r>
-            <a:r>
-              <a:rPr lang="en-US" dirty="0" smtClean="0"/>
-              <a:t>mouse and keyboard</a:t>
+              <a:t>Restricts mouse and keyboard</a:t>
             </a:r>
           </a:p>
           <a:p>
@@ -9434,7 +9467,6 @@
               <a:rPr lang="en-US" dirty="0" smtClean="0"/>
               <a:t>Mouse clicking disabled</a:t>
             </a:r>
-            <a:endParaRPr lang="en-US" dirty="0" smtClean="0"/>
           </a:p>
           <a:p>
             <a:pPr lvl="1"/>
@@ -9446,11 +9478,7 @@
           <a:p>
             <a:r>
               <a:rPr lang="en-US" dirty="0" smtClean="0"/>
-              <a:t>Calls </a:t>
-            </a:r>
-            <a:r>
-              <a:rPr lang="en-US" dirty="0" smtClean="0"/>
-              <a:t>captcha GUI</a:t>
+              <a:t>Calls captcha GUI</a:t>
             </a:r>
           </a:p>
           <a:p>
@@ -9459,20 +9487,11 @@
               <a:rPr lang="en-US" dirty="0" smtClean="0"/>
               <a:t>Contains mechanism to ensure that only one instance of the captcha GUI is running at any given time</a:t>
             </a:r>
-            <a:endParaRPr lang="en-US" dirty="0" smtClean="0"/>
           </a:p>
           <a:p>
             <a:r>
               <a:rPr lang="en-US" dirty="0" smtClean="0"/>
-              <a:t>Un-restricts devices when </a:t>
-            </a:r>
-            <a:r>
-              <a:rPr lang="en-US" dirty="0" smtClean="0"/>
-              <a:t>captcha </a:t>
-            </a:r>
-            <a:r>
-              <a:rPr lang="en-US" dirty="0" smtClean="0"/>
-              <a:t>is completed</a:t>
+              <a:t>Un-restricts devices when captcha is completed</a:t>
             </a:r>
           </a:p>
         </p:txBody>
@@ -9494,11 +9513,7 @@
           <a:p>
             <a:r>
               <a:rPr lang="en-US" dirty="0" smtClean="0"/>
-              <a:t>Bash </a:t>
-            </a:r>
-            <a:r>
-              <a:rPr lang="en-US" dirty="0" smtClean="0"/>
-              <a:t>Script</a:t>
+              <a:t>Bash Script</a:t>
             </a:r>
             <a:endParaRPr lang="en-US" dirty="0"/>
           </a:p>
@@ -9613,15 +9628,7 @@
             </a:pPr>
             <a:r>
               <a:rPr lang="en-US" sz="1600" dirty="0" smtClean="0"/>
-              <a:t>Use </a:t>
-            </a:r>
-            <a:r>
-              <a:rPr lang="en-US" sz="1600" dirty="0" smtClean="0"/>
-              <a:t>hovering over keys on virtual </a:t>
-            </a:r>
-            <a:r>
-              <a:rPr lang="en-US" sz="1600" dirty="0" smtClean="0"/>
-              <a:t>keyboard - mouse</a:t>
+              <a:t>Use hovering over keys on virtual keyboard - mouse</a:t>
             </a:r>
           </a:p>
           <a:p>
@@ -9945,15 +9952,7 @@
             <a:pPr lvl="2"/>
             <a:r>
               <a:rPr lang="en-US" dirty="0" smtClean="0"/>
-              <a:t>No appearance of the </a:t>
-            </a:r>
-            <a:r>
-              <a:rPr lang="en-US" dirty="0" smtClean="0"/>
-              <a:t>captcha </a:t>
-            </a:r>
-            <a:r>
-              <a:rPr lang="en-US" dirty="0" smtClean="0"/>
-              <a:t>GUI</a:t>
+              <a:t>No appearance of the captcha GUI</a:t>
             </a:r>
           </a:p>
           <a:p>
@@ -9978,15 +9977,7 @@
             </a:r>
             <a:r>
               <a:rPr lang="en-US" sz="2100" dirty="0" smtClean="0"/>
-              <a:t>verify the </a:t>
-            </a:r>
-            <a:r>
-              <a:rPr lang="en-US" sz="2100" dirty="0" smtClean="0"/>
-              <a:t>captcha </a:t>
-            </a:r>
-            <a:r>
-              <a:rPr lang="en-US" sz="2100" dirty="0" smtClean="0"/>
-              <a:t>program runs for expected human interface devices</a:t>
+              <a:t>verify the captcha program runs for expected human interface devices</a:t>
             </a:r>
           </a:p>
           <a:p>
@@ -10005,15 +9996,7 @@
             </a:r>
             <a:r>
               <a:rPr lang="en-US" sz="1900" dirty="0" smtClean="0"/>
-              <a:t>Keyboard and mouse functionalities restricted while the </a:t>
-            </a:r>
-            <a:r>
-              <a:rPr lang="en-US" sz="1900" dirty="0" smtClean="0"/>
-              <a:t>captcha </a:t>
-            </a:r>
-            <a:r>
-              <a:rPr lang="en-US" sz="1900" dirty="0" smtClean="0"/>
-              <a:t>program is active and restored after validation</a:t>
+              <a:t>Keyboard and mouse functionalities restricted while the captcha program is active and restored after validation</a:t>
             </a:r>
             <a:endParaRPr lang="en-US" sz="1900" dirty="0"/>
           </a:p>
@@ -10389,43 +10372,22 @@
             <a:pPr lvl="2"/>
             <a:r>
               <a:rPr lang="en-US" dirty="0" smtClean="0"/>
-              <a:t>Keyboard-based </a:t>
-            </a:r>
-            <a:r>
-              <a:rPr lang="en-US" dirty="0" smtClean="0"/>
-              <a:t>attacks:</a:t>
+              <a:t>Keyboard-based attacks:</a:t>
             </a:r>
           </a:p>
           <a:p>
             <a:pPr lvl="3"/>
             <a:r>
               <a:rPr lang="en-US" sz="2100" dirty="0" smtClean="0"/>
-              <a:t>Teensy has the ability to open a terminal window before the </a:t>
-            </a:r>
+              <a:t>Teensy has the ability to open a terminal window before the captcha GUI loads</a:t>
+            </a:r>
+          </a:p>
+          <a:p>
+            <a:pPr lvl="3"/>
             <a:r>
               <a:rPr lang="en-US" sz="2100" dirty="0" smtClean="0"/>
-              <a:t>captcha</a:t>
-            </a:r>
-            <a:r>
-              <a:rPr lang="en-US" sz="2100" dirty="0" smtClean="0"/>
-              <a:t> </a:t>
-            </a:r>
-            <a:r>
-              <a:rPr lang="en-US" sz="2100" dirty="0" smtClean="0"/>
-              <a:t>GUI loads</a:t>
-            </a:r>
-          </a:p>
-          <a:p>
-            <a:pPr lvl="3"/>
-            <a:r>
-              <a:rPr lang="en-US" sz="2100" dirty="0" smtClean="0"/>
-              <a:t>Attacks unsuccessful in executing malicious </a:t>
-            </a:r>
-            <a:r>
-              <a:rPr lang="en-US" sz="2100" dirty="0" smtClean="0"/>
-              <a:t>commands</a:t>
-            </a:r>
-            <a:endParaRPr lang="en-US" sz="2100" dirty="0" smtClean="0"/>
+              <a:t>Attacks unsuccessful in executing malicious commands</a:t>
+            </a:r>
           </a:p>
         </p:txBody>
       </p:sp>
@@ -10493,15 +10455,7 @@
             </a:pPr>
             <a:r>
               <a:rPr lang="en-US" sz="2000" dirty="0" smtClean="0"/>
-              <a:t>USB devices have become the standard for connecting devices, such as keyboard and mice, to computers.  The security and protection of the computers that they are being </a:t>
-            </a:r>
-            <a:r>
-              <a:rPr lang="en-US" sz="2000" dirty="0" smtClean="0"/>
-              <a:t>connected </a:t>
-            </a:r>
-            <a:r>
-              <a:rPr lang="en-US" sz="2000" dirty="0" smtClean="0"/>
-              <a:t>to is a concern.</a:t>
+              <a:t>USB devices have become the standard for connecting devices, such as keyboard and mice, to computers.  The security and protection of the computers that they are being connected to is a concern.</a:t>
             </a:r>
           </a:p>
           <a:p>
@@ -10685,11 +10639,7 @@
           <a:p>
             <a:r>
               <a:rPr lang="en-US" sz="2400" dirty="0" smtClean="0"/>
-              <a:t>Captcha </a:t>
-            </a:r>
-            <a:r>
-              <a:rPr lang="en-US" sz="2400" dirty="0" smtClean="0"/>
-              <a:t>GUI may be completed using any connected keyboard or mouse</a:t>
+              <a:t>Captcha GUI may be completed using any connected keyboard or mouse</a:t>
             </a:r>
           </a:p>
           <a:p>
@@ -10790,26 +10740,14 @@
           <a:p>
             <a:r>
               <a:rPr lang="en-US" sz="2300" dirty="0" smtClean="0"/>
-              <a:t>Captcha </a:t>
-            </a:r>
-            <a:r>
-              <a:rPr lang="en-US" sz="2300" dirty="0" smtClean="0"/>
-              <a:t>Improvements</a:t>
+              <a:t>Captcha Improvements</a:t>
             </a:r>
           </a:p>
           <a:p>
             <a:pPr lvl="1"/>
             <a:r>
               <a:rPr lang="en-US" sz="1900" dirty="0" smtClean="0"/>
-              <a:t>Use more advanced </a:t>
-            </a:r>
-            <a:r>
-              <a:rPr lang="en-US" sz="1900" dirty="0" smtClean="0"/>
-              <a:t>captcha </a:t>
-            </a:r>
-            <a:r>
-              <a:rPr lang="en-US" sz="1900" dirty="0" smtClean="0"/>
-              <a:t>characteristics or a professionally developed version</a:t>
+              <a:t>Use more advanced captcha characteristics or a professionally developed version</a:t>
             </a:r>
           </a:p>
           <a:p>
@@ -10826,30 +10764,14 @@
             <a:pPr lvl="1"/>
             <a:r>
               <a:rPr lang="en-US" sz="1900" dirty="0" smtClean="0"/>
-              <a:t>Port restriction of HID functionalities and execution of the </a:t>
-            </a:r>
+              <a:t>Port restriction of HID functionalities and execution of the captcha program to the driver code (remove Bash script call)</a:t>
+            </a:r>
+          </a:p>
+          <a:p>
+            <a:pPr lvl="1"/>
             <a:r>
               <a:rPr lang="en-US" sz="1900" dirty="0" smtClean="0"/>
-              <a:t>captcha </a:t>
-            </a:r>
-            <a:r>
-              <a:rPr lang="en-US" sz="1900" dirty="0" smtClean="0"/>
-              <a:t>program to the driver code (remove Bash script call)</a:t>
-            </a:r>
-          </a:p>
-          <a:p>
-            <a:pPr lvl="1"/>
-            <a:r>
-              <a:rPr lang="en-US" sz="1900" dirty="0" smtClean="0"/>
-              <a:t>Programmatically ensure that the </a:t>
-            </a:r>
-            <a:r>
-              <a:rPr lang="en-US" sz="1900" dirty="0" smtClean="0"/>
-              <a:t>captcha </a:t>
-            </a:r>
-            <a:r>
-              <a:rPr lang="en-US" sz="1900" dirty="0" smtClean="0"/>
-              <a:t>is completed by the device that triggered it</a:t>
+              <a:t>Programmatically ensure that the captcha is completed by the device that triggered it</a:t>
             </a:r>
           </a:p>
           <a:p>
@@ -11337,27 +11259,7 @@
             </a:pPr>
             <a:r>
               <a:rPr lang="en-US" sz="1600" dirty="0" smtClean="0"/>
-              <a:t>Create a suite of attacks on a Linux </a:t>
-            </a:r>
-            <a:r>
-              <a:rPr lang="en-US" sz="1600" dirty="0" smtClean="0"/>
-              <a:t>OS using </a:t>
-            </a:r>
-            <a:r>
-              <a:rPr lang="en-US" sz="1600" dirty="0" smtClean="0"/>
-              <a:t>the Teensy microcontroller </a:t>
-            </a:r>
-            <a:r>
-              <a:rPr lang="en-US" sz="1600" dirty="0" smtClean="0"/>
-              <a:t>to </a:t>
-            </a:r>
-            <a:r>
-              <a:rPr lang="en-US" sz="1600" dirty="0" smtClean="0"/>
-              <a:t>emulate </a:t>
-            </a:r>
-            <a:r>
-              <a:rPr lang="en-US" sz="1600" dirty="0" smtClean="0"/>
-              <a:t>a keyboard and mouse.</a:t>
+              <a:t>Create a suite of attacks on a Linux OS using the Teensy microcontroller to emulate a keyboard and mouse.</a:t>
             </a:r>
           </a:p>
           <a:p>
@@ -11631,8 +11533,62 @@
             <a:pPr lvl="1"/>
             <a:r>
               <a:rPr lang="en-US" sz="1600" dirty="0" smtClean="0"/>
-              <a:t>Using Teensy microcontroller to create a permanent connection to a remote server that is controller by the attacker.</a:t>
-            </a:r>
+              <a:t>Using Teensy microcontroller to create a permanent connection to a remote server that is controller by the attacker</a:t>
+            </a:r>
+            <a:r>
+              <a:rPr lang="en-US" sz="1600" dirty="0" smtClean="0"/>
+              <a:t>.</a:t>
+            </a:r>
+          </a:p>
+          <a:p>
+            <a:r>
+              <a:rPr lang="en-US" sz="2000" dirty="0"/>
+              <a:t>K. </a:t>
+            </a:r>
+            <a:r>
+              <a:rPr lang="en-US" sz="2000" dirty="0" err="1"/>
+              <a:t>Nohl</a:t>
+            </a:r>
+            <a:r>
+              <a:rPr lang="en-US" sz="2000" dirty="0"/>
+              <a:t> and J. </a:t>
+            </a:r>
+            <a:r>
+              <a:rPr lang="en-US" sz="2000" dirty="0" err="1"/>
+              <a:t>Lell</a:t>
+            </a:r>
+            <a:r>
+              <a:rPr lang="en-US" sz="2000" dirty="0"/>
+              <a:t> – “</a:t>
+            </a:r>
+            <a:r>
+              <a:rPr lang="en-US" sz="2000" dirty="0" err="1"/>
+              <a:t>BadUSB</a:t>
+            </a:r>
+            <a:r>
+              <a:rPr lang="en-US" sz="2000" dirty="0"/>
+              <a:t>”</a:t>
+            </a:r>
+          </a:p>
+          <a:p>
+            <a:pPr lvl="1"/>
+            <a:r>
+              <a:rPr lang="en-US" sz="1600" dirty="0"/>
+              <a:t>Describes how an emulated keyboard </a:t>
+            </a:r>
+            <a:r>
+              <a:rPr lang="en-US" sz="1600" dirty="0" smtClean="0"/>
+              <a:t>could </a:t>
+            </a:r>
+            <a:r>
+              <a:rPr lang="en-US" sz="1600" dirty="0"/>
+              <a:t>steal the administrative password on a Linux OS</a:t>
+            </a:r>
+            <a:r>
+              <a:rPr lang="en-US" sz="1600" dirty="0" smtClean="0"/>
+              <a:t>.</a:t>
+            </a:r>
+            <a:endParaRPr lang="en-US" sz="1600" dirty="0" smtClean="0"/>
           </a:p>
           <a:p>
             <a:r>
@@ -11684,37 +11640,14 @@
             <a:pPr lvl="1"/>
             <a:r>
               <a:rPr lang="en-US" sz="1600" dirty="0" smtClean="0"/>
-              <a:t>Authentication based on keystroke </a:t>
-            </a:r>
+              <a:t>Authentication based on keystroke dynamics.</a:t>
+            </a:r>
+          </a:p>
+          <a:p>
+            <a:pPr lvl="1"/>
             <a:r>
               <a:rPr lang="en-US" sz="1600" dirty="0" smtClean="0"/>
-              <a:t>dynamics.</a:t>
-            </a:r>
-            <a:endParaRPr lang="en-US" sz="1600" dirty="0" smtClean="0"/>
-          </a:p>
-          <a:p>
-            <a:pPr lvl="1"/>
-            <a:r>
-              <a:rPr lang="en-US" sz="1600" dirty="0" smtClean="0"/>
-              <a:t>Would not work if attack is very </a:t>
-            </a:r>
-            <a:r>
-              <a:rPr lang="en-US" sz="1600" dirty="0" smtClean="0"/>
-              <a:t>short.</a:t>
-            </a:r>
-            <a:endParaRPr lang="en-US" sz="1600" dirty="0" smtClean="0"/>
-          </a:p>
-          <a:p>
-            <a:r>
-              <a:rPr lang="en-US" sz="2000" dirty="0" smtClean="0"/>
-              <a:t>K. Nohl and J. Lell – “BadUSB”</a:t>
-            </a:r>
-          </a:p>
-          <a:p>
-            <a:pPr lvl="1"/>
-            <a:r>
-              <a:rPr lang="en-US" sz="1600" dirty="0" smtClean="0"/>
-              <a:t>Describes how an emulated keyboard could steal the administrative password on a Linux OS.</a:t>
+              <a:t>Would not work if attack is very short.</a:t>
             </a:r>
           </a:p>
           <a:p>
@@ -13025,8 +12958,9 @@
           <a:p>
             <a:r>
               <a:rPr lang="en-US" dirty="0" smtClean="0"/>
-              <a:t>Steal Password</a:t>
-            </a:r>
+              <a:t>Add Fake User</a:t>
+            </a:r>
+            <a:endParaRPr lang="en-US" dirty="0" smtClean="0"/>
           </a:p>
         </p:txBody>
       </p:sp>

</xml_diff>

<commit_message>
Fixed spacing on one of the slides.
</commit_message>
<xml_diff>
--- a/Project/Final_Project_Presentation_Fasburg_Reiff_Thomas.pptx
+++ b/Project/Final_Project_Presentation_Fasburg_Reiff_Thomas.pptx
@@ -131,7 +131,7 @@
   </p:defaultTextStyle>
   <p:extLst>
     <p:ext uri="{EFAFB233-063F-42B5-8137-9DF3F51BA10A}">
-      <p15:sldGuideLst xmlns:p15="http://schemas.microsoft.com/office/powerpoint/2012/main" xmlns="">
+      <p15:sldGuideLst xmlns:p15="http://schemas.microsoft.com/office/powerpoint/2012/main">
         <p15:guide id="1" orient="horz" pos="2160">
           <p15:clr>
             <a:srgbClr val="A4A3A4"/>
@@ -8398,10 +8398,10 @@
         </p:nvGrpSpPr>
         <p:grpSpPr>
           <a:xfrm>
-            <a:off x="1039519" y="5100999"/>
-            <a:ext cx="2182028" cy="1234430"/>
-            <a:chOff x="1899722" y="4916956"/>
-            <a:chExt cx="2182028" cy="1234430"/>
+            <a:off x="152400" y="4800600"/>
+            <a:ext cx="2209800" cy="1066800"/>
+            <a:chOff x="1899722" y="4993156"/>
+            <a:chExt cx="2209800" cy="1066800"/>
           </a:xfrm>
         </p:grpSpPr>
         <p:sp>
@@ -8412,7 +8412,7 @@
           </p:nvSpPr>
           <p:spPr>
             <a:xfrm>
-              <a:off x="2415677" y="5859157"/>
+              <a:off x="2415677" y="5767727"/>
               <a:ext cx="1285073" cy="276999"/>
             </a:xfrm>
             <a:prstGeom prst="rect">
@@ -8450,10 +8450,10 @@
           </p:nvGrpSpPr>
           <p:grpSpPr>
             <a:xfrm>
-              <a:off x="1899722" y="4916956"/>
-              <a:ext cx="2182028" cy="1234430"/>
-              <a:chOff x="1871950" y="4901726"/>
-              <a:chExt cx="2182028" cy="1234430"/>
+              <a:off x="1899722" y="4993156"/>
+              <a:ext cx="2209800" cy="1066800"/>
+              <a:chOff x="1871950" y="4977926"/>
+              <a:chExt cx="2209800" cy="1066800"/>
             </a:xfrm>
           </p:grpSpPr>
           <p:sp>
@@ -8464,7 +8464,7 @@
             </p:nvSpPr>
             <p:spPr>
               <a:xfrm>
-                <a:off x="2024350" y="4901726"/>
+                <a:off x="2052122" y="4977926"/>
                 <a:ext cx="304800" cy="304800"/>
               </a:xfrm>
               <a:prstGeom prst="ellipse">
@@ -8550,7 +8550,7 @@
             </p:nvSpPr>
             <p:spPr>
               <a:xfrm>
-                <a:off x="1871950" y="5816126"/>
+                <a:off x="1871950" y="5724696"/>
                 <a:ext cx="581828" cy="320030"/>
               </a:xfrm>
               <a:prstGeom prst="flowChartDecision">
@@ -8631,7 +8631,7 @@
             </p:nvSpPr>
             <p:spPr>
               <a:xfrm>
-                <a:off x="2377579" y="4904529"/>
+                <a:off x="2405351" y="4980729"/>
                 <a:ext cx="1676399" cy="276999"/>
               </a:xfrm>
               <a:prstGeom prst="rect">
@@ -11514,7 +11514,7 @@
         </p:nvSpPr>
         <p:spPr>
           <a:xfrm>
-            <a:off x="685800" y="1524000"/>
+            <a:off x="685800" y="1447800"/>
             <a:ext cx="7772400" cy="4648200"/>
           </a:xfrm>
         </p:spPr>
@@ -11533,62 +11533,57 @@
             <a:pPr lvl="1"/>
             <a:r>
               <a:rPr lang="en-US" sz="1600" dirty="0" smtClean="0"/>
-              <a:t>Using Teensy microcontroller to create a permanent connection to a remote server that is controller by the attacker</a:t>
+              <a:t>Using Teensy microcontroller to create a permanent connection to a remote server that is controller by the attacker.</a:t>
+            </a:r>
+          </a:p>
+          <a:p>
+            <a:r>
+              <a:rPr lang="en-US" sz="2000" dirty="0"/>
+              <a:t>K. </a:t>
+            </a:r>
+            <a:r>
+              <a:rPr lang="en-US" sz="2000" dirty="0" err="1"/>
+              <a:t>Nohl</a:t>
+            </a:r>
+            <a:r>
+              <a:rPr lang="en-US" sz="2000" dirty="0"/>
+              <a:t> and J. </a:t>
+            </a:r>
+            <a:r>
+              <a:rPr lang="en-US" sz="2000" dirty="0" err="1"/>
+              <a:t>Lell</a:t>
+            </a:r>
+            <a:r>
+              <a:rPr lang="en-US" sz="2000" dirty="0"/>
+              <a:t> – “</a:t>
+            </a:r>
+            <a:r>
+              <a:rPr lang="en-US" sz="2000" dirty="0" err="1"/>
+              <a:t>BadUSB</a:t>
+            </a:r>
+            <a:r>
+              <a:rPr lang="en-US" sz="2000" dirty="0"/>
+              <a:t>”</a:t>
+            </a:r>
+          </a:p>
+          <a:p>
+            <a:pPr lvl="1"/>
+            <a:r>
+              <a:rPr lang="en-US" sz="1600" dirty="0"/>
+              <a:t>Describes how an emulated keyboard </a:t>
+            </a:r>
+            <a:r>
+              <a:rPr lang="en-US" sz="1600" dirty="0" smtClean="0"/>
+              <a:t>could </a:t>
+            </a:r>
+            <a:r>
+              <a:rPr lang="en-US" sz="1600" dirty="0"/>
+              <a:t>steal the administrative password on a Linux OS</a:t>
             </a:r>
             <a:r>
               <a:rPr lang="en-US" sz="1600" dirty="0" smtClean="0"/>
               <a:t>.</a:t>
             </a:r>
-          </a:p>
-          <a:p>
-            <a:r>
-              <a:rPr lang="en-US" sz="2000" dirty="0"/>
-              <a:t>K. </a:t>
-            </a:r>
-            <a:r>
-              <a:rPr lang="en-US" sz="2000" dirty="0" err="1"/>
-              <a:t>Nohl</a:t>
-            </a:r>
-            <a:r>
-              <a:rPr lang="en-US" sz="2000" dirty="0"/>
-              <a:t> and J. </a:t>
-            </a:r>
-            <a:r>
-              <a:rPr lang="en-US" sz="2000" dirty="0" err="1"/>
-              <a:t>Lell</a:t>
-            </a:r>
-            <a:r>
-              <a:rPr lang="en-US" sz="2000" dirty="0"/>
-              <a:t> – “</a:t>
-            </a:r>
-            <a:r>
-              <a:rPr lang="en-US" sz="2000" dirty="0" err="1"/>
-              <a:t>BadUSB</a:t>
-            </a:r>
-            <a:r>
-              <a:rPr lang="en-US" sz="2000" dirty="0"/>
-              <a:t>”</a:t>
-            </a:r>
-          </a:p>
-          <a:p>
-            <a:pPr lvl="1"/>
-            <a:r>
-              <a:rPr lang="en-US" sz="1600" dirty="0"/>
-              <a:t>Describes how an emulated keyboard </a:t>
-            </a:r>
-            <a:r>
-              <a:rPr lang="en-US" sz="1600" dirty="0" smtClean="0"/>
-              <a:t>could </a:t>
-            </a:r>
-            <a:r>
-              <a:rPr lang="en-US" sz="1600" dirty="0"/>
-              <a:t>steal the administrative password on a Linux OS</a:t>
-            </a:r>
-            <a:r>
-              <a:rPr lang="en-US" sz="1600" dirty="0" smtClean="0"/>
-              <a:t>.</a:t>
-            </a:r>
-            <a:endParaRPr lang="en-US" sz="1600" dirty="0" smtClean="0"/>
           </a:p>
           <a:p>
             <a:r>
@@ -12960,7 +12955,6 @@
               <a:rPr lang="en-US" dirty="0" smtClean="0"/>
               <a:t>Add Fake User</a:t>
             </a:r>
-            <a:endParaRPr lang="en-US" dirty="0" smtClean="0"/>
           </a:p>
         </p:txBody>
       </p:sp>

</xml_diff>

<commit_message>
Sorry, last commit. Spell check done.
</commit_message>
<xml_diff>
--- a/Project/Final_Project_Presentation_Fasburg_Reiff_Thomas.pptx
+++ b/Project/Final_Project_Presentation_Fasburg_Reiff_Thomas.pptx
@@ -2939,20 +2939,12 @@
               <a:t>Now Teensy can do any command that requires root </a:t>
             </a:r>
             <a:r>
-              <a:rPr lang="en-US" baseline="0" dirty="0" err="1" smtClean="0"/>
-              <a:t>privledges</a:t>
-            </a:r>
-            <a:r>
               <a:rPr lang="en-US" baseline="0" dirty="0" smtClean="0"/>
-              <a:t> (</a:t>
-            </a:r>
-            <a:r>
-              <a:rPr lang="en-US" baseline="0" dirty="0" err="1" smtClean="0"/>
-              <a:t>sudo</a:t>
+              <a:t>privileges </a:t>
             </a:r>
             <a:r>
               <a:rPr lang="en-US" baseline="0" dirty="0" smtClean="0"/>
-              <a:t> can accept pw via pipe)</a:t>
+              <a:t>(sudo can accept pw via pipe)</a:t>
             </a:r>
             <a:endParaRPr lang="en-US" dirty="0"/>
           </a:p>
@@ -11539,31 +11531,7 @@
           <a:p>
             <a:r>
               <a:rPr lang="en-US" sz="2000" dirty="0"/>
-              <a:t>K. </a:t>
-            </a:r>
-            <a:r>
-              <a:rPr lang="en-US" sz="2000" dirty="0" err="1"/>
-              <a:t>Nohl</a:t>
-            </a:r>
-            <a:r>
-              <a:rPr lang="en-US" sz="2000" dirty="0"/>
-              <a:t> and J. </a:t>
-            </a:r>
-            <a:r>
-              <a:rPr lang="en-US" sz="2000" dirty="0" err="1"/>
-              <a:t>Lell</a:t>
-            </a:r>
-            <a:r>
-              <a:rPr lang="en-US" sz="2000" dirty="0"/>
-              <a:t> – “</a:t>
-            </a:r>
-            <a:r>
-              <a:rPr lang="en-US" sz="2000" dirty="0" err="1"/>
-              <a:t>BadUSB</a:t>
-            </a:r>
-            <a:r>
-              <a:rPr lang="en-US" sz="2000" dirty="0"/>
-              <a:t>”</a:t>
+              <a:t>K. Nohl and J. Lell – “BadUSB”</a:t>
             </a:r>
           </a:p>
           <a:p>

</xml_diff>